<commit_message>
Add UML class diagram for the Distribute command into Developer Guide. Upload DistributeComponentClassDiagram.pptx. Add photos for the DistributeComponentClassDiagram.
</commit_message>
<xml_diff>
--- a/docs/diagrams/DistributeComponentClassDiagram.pptx
+++ b/docs/diagrams/DistributeComponentClassDiagram.pptx
@@ -5,12 +5,11 @@
     <p:sldMasterId id="2147483648" r:id="rId1"/>
   </p:sldMasterIdLst>
   <p:notesMasterIdLst>
-    <p:notesMasterId r:id="rId5"/>
+    <p:notesMasterId r:id="rId4"/>
   </p:notesMasterIdLst>
   <p:sldIdLst>
-    <p:sldId id="266" r:id="rId2"/>
-    <p:sldId id="264" r:id="rId3"/>
-    <p:sldId id="265" r:id="rId4"/>
+    <p:sldId id="264" r:id="rId2"/>
+    <p:sldId id="265" r:id="rId3"/>
   </p:sldIdLst>
   <p:sldSz cx="9144000" cy="6858000" type="screen4x3"/>
   <p:notesSz cx="6858000" cy="9144000"/>
@@ -521,10 +520,6 @@
           <a:bodyPr/>
           <a:lstStyle/>
           <a:p>
-            <a:r>
-              <a:rPr lang="en-US" dirty="0"/>
-              <a:t>Default model diagram</a:t>
-            </a:r>
             <a:endParaRPr lang="en-SG" dirty="0"/>
           </a:p>
         </p:txBody>
@@ -546,91 +541,7 @@
           <a:p>
             <a:fld id="{5A7AB025-77E3-4BD1-A2FD-B3183DBA47A3}" type="slidenum">
               <a:rPr lang="en-US" smtClean="0"/>
-              <a:t>1</a:t>
-            </a:fld>
-            <a:endParaRPr lang="en-US"/>
-          </a:p>
-        </p:txBody>
-      </p:sp>
-    </p:spTree>
-    <p:extLst>
-      <p:ext uri="{BB962C8B-B14F-4D97-AF65-F5344CB8AC3E}">
-        <p14:creationId xmlns:p14="http://schemas.microsoft.com/office/powerpoint/2010/main" val="718128420"/>
-      </p:ext>
-    </p:extLst>
-  </p:cSld>
-  <p:clrMapOvr>
-    <a:masterClrMapping/>
-  </p:clrMapOvr>
-</p:notes>
-</file>
-
-<file path=ppt/notesSlides/notesSlide2.xml><?xml version="1.0" encoding="utf-8"?>
-<p:notes xmlns:a="http://schemas.openxmlformats.org/drawingml/2006/main" xmlns:r="http://schemas.openxmlformats.org/officeDocument/2006/relationships" xmlns:p="http://schemas.openxmlformats.org/presentationml/2006/main">
-  <p:cSld>
-    <p:spTree>
-      <p:nvGrpSpPr>
-        <p:cNvPr id="1" name=""/>
-        <p:cNvGrpSpPr/>
-        <p:nvPr/>
-      </p:nvGrpSpPr>
-      <p:grpSpPr>
-        <a:xfrm>
-          <a:off x="0" y="0"/>
-          <a:ext cx="0" cy="0"/>
-          <a:chOff x="0" y="0"/>
-          <a:chExt cx="0" cy="0"/>
-        </a:xfrm>
-      </p:grpSpPr>
-      <p:sp>
-        <p:nvSpPr>
-          <p:cNvPr id="2" name="Slide Image Placeholder 1"/>
-          <p:cNvSpPr>
-            <a:spLocks noGrp="1" noRot="1" noChangeAspect="1"/>
-          </p:cNvSpPr>
-          <p:nvPr>
-            <p:ph type="sldImg"/>
-          </p:nvPr>
-        </p:nvSpPr>
-        <p:spPr/>
-      </p:sp>
-      <p:sp>
-        <p:nvSpPr>
-          <p:cNvPr id="3" name="Notes Placeholder 2"/>
-          <p:cNvSpPr>
-            <a:spLocks noGrp="1"/>
-          </p:cNvSpPr>
-          <p:nvPr>
-            <p:ph type="body" idx="1"/>
-          </p:nvPr>
-        </p:nvSpPr>
-        <p:spPr/>
-        <p:txBody>
-          <a:bodyPr/>
-          <a:lstStyle/>
-          <a:p>
-            <a:endParaRPr lang="en-SG" dirty="0"/>
-          </a:p>
-        </p:txBody>
-      </p:sp>
-      <p:sp>
-        <p:nvSpPr>
-          <p:cNvPr id="4" name="Slide Number Placeholder 3"/>
-          <p:cNvSpPr>
-            <a:spLocks noGrp="1"/>
-          </p:cNvSpPr>
-          <p:nvPr>
-            <p:ph type="sldNum" sz="quarter" idx="5"/>
-          </p:nvPr>
-        </p:nvSpPr>
-        <p:spPr/>
-        <p:txBody>
-          <a:bodyPr/>
-          <a:lstStyle/>
-          <a:p>
-            <a:fld id="{5A7AB025-77E3-4BD1-A2FD-B3183DBA47A3}" type="slidenum">
-              <a:rPr lang="en-US" smtClean="0"/>
-              <a:t>3</a:t>
+              <a:t>2</a:t>
             </a:fld>
             <a:endParaRPr lang="en-US"/>
           </a:p>
@@ -3618,2831 +3529,6 @@
       </p:grpSpPr>
       <p:sp>
         <p:nvSpPr>
-          <p:cNvPr id="2" name="Rectangle 65">
-            <a:extLst>
-              <a:ext uri="{FF2B5EF4-FFF2-40B4-BE49-F238E27FC236}">
-                <a16:creationId xmlns:a16="http://schemas.microsoft.com/office/drawing/2014/main" id="{75B4DF71-7267-474E-8FB8-9290E600937B}"/>
-              </a:ext>
-            </a:extLst>
-          </p:cNvPr>
-          <p:cNvSpPr/>
-          <p:nvPr/>
-        </p:nvSpPr>
-        <p:spPr>
-          <a:xfrm>
-            <a:off x="1119865" y="1676400"/>
-            <a:ext cx="7490735" cy="3059747"/>
-          </a:xfrm>
-          <a:prstGeom prst="roundRect">
-            <a:avLst>
-              <a:gd name="adj" fmla="val 3484"/>
-            </a:avLst>
-          </a:prstGeom>
-          <a:solidFill>
-            <a:schemeClr val="accent4">
-              <a:lumMod val="20000"/>
-              <a:lumOff val="80000"/>
-            </a:schemeClr>
-          </a:solidFill>
-          <a:ln w="19050">
-            <a:noFill/>
-          </a:ln>
-          <a:effectLst/>
-        </p:spPr>
-        <p:style>
-          <a:lnRef idx="1">
-            <a:schemeClr val="accent2"/>
-          </a:lnRef>
-          <a:fillRef idx="2">
-            <a:schemeClr val="accent2"/>
-          </a:fillRef>
-          <a:effectRef idx="1">
-            <a:schemeClr val="accent2"/>
-          </a:effectRef>
-          <a:fontRef idx="minor">
-            <a:schemeClr val="dk1"/>
-          </a:fontRef>
-        </p:style>
-        <p:txBody>
-          <a:bodyPr rtlCol="0" anchor="t"/>
-          <a:lstStyle/>
-          <a:p>
-            <a:r>
-              <a:rPr lang="en-US" sz="1200" b="1" dirty="0">
-                <a:solidFill>
-                  <a:srgbClr val="7030A0"/>
-                </a:solidFill>
-              </a:rPr>
-              <a:t>Model</a:t>
-            </a:r>
-            <a:endParaRPr lang="en-SG" sz="1200" b="1" dirty="0">
-              <a:solidFill>
-                <a:srgbClr val="7030A0"/>
-              </a:solidFill>
-            </a:endParaRPr>
-          </a:p>
-        </p:txBody>
-      </p:sp>
-      <p:sp>
-        <p:nvSpPr>
-          <p:cNvPr id="3" name="Rectangle 8">
-            <a:extLst>
-              <a:ext uri="{FF2B5EF4-FFF2-40B4-BE49-F238E27FC236}">
-                <a16:creationId xmlns:a16="http://schemas.microsoft.com/office/drawing/2014/main" id="{3370ABEB-82C7-4453-8CA4-9AC7AB87D62C}"/>
-              </a:ext>
-            </a:extLst>
-          </p:cNvPr>
-          <p:cNvSpPr/>
-          <p:nvPr/>
-        </p:nvSpPr>
-        <p:spPr>
-          <a:xfrm>
-            <a:off x="2877180" y="3463240"/>
-            <a:ext cx="1093635" cy="346760"/>
-          </a:xfrm>
-          <a:prstGeom prst="rect">
-            <a:avLst/>
-          </a:prstGeom>
-          <a:solidFill>
-            <a:srgbClr val="7030A0"/>
-          </a:solidFill>
-          <a:ln w="19050">
-            <a:solidFill>
-              <a:srgbClr val="7030A0"/>
-            </a:solidFill>
-          </a:ln>
-          <a:effectLst/>
-        </p:spPr>
-        <p:style>
-          <a:lnRef idx="1">
-            <a:schemeClr val="accent2"/>
-          </a:lnRef>
-          <a:fillRef idx="2">
-            <a:schemeClr val="accent2"/>
-          </a:fillRef>
-          <a:effectRef idx="1">
-            <a:schemeClr val="accent2"/>
-          </a:effectRef>
-          <a:fontRef idx="minor">
-            <a:schemeClr val="dk1"/>
-          </a:fontRef>
-        </p:style>
-        <p:txBody>
-          <a:bodyPr rtlCol="0" anchor="ctr"/>
-          <a:lstStyle/>
-          <a:p>
-            <a:pPr algn="ctr"/>
-            <a:r>
-              <a:rPr lang="en-US" sz="1050" dirty="0">
-                <a:solidFill>
-                  <a:schemeClr val="bg1"/>
-                </a:solidFill>
-              </a:rPr>
-              <a:t>UserPref</a:t>
-            </a:r>
-            <a:endParaRPr lang="en-SG" sz="1050" dirty="0">
-              <a:solidFill>
-                <a:schemeClr val="bg1"/>
-              </a:solidFill>
-            </a:endParaRPr>
-          </a:p>
-        </p:txBody>
-      </p:sp>
-      <p:sp>
-        <p:nvSpPr>
-          <p:cNvPr id="4" name="Rectangle 62">
-            <a:extLst>
-              <a:ext uri="{FF2B5EF4-FFF2-40B4-BE49-F238E27FC236}">
-                <a16:creationId xmlns:a16="http://schemas.microsoft.com/office/drawing/2014/main" id="{ADEBB707-D30D-4E3E-80C3-5CF603C931D5}"/>
-              </a:ext>
-            </a:extLst>
-          </p:cNvPr>
-          <p:cNvSpPr/>
-          <p:nvPr/>
-        </p:nvSpPr>
-        <p:spPr>
-          <a:xfrm rot="16200000">
-            <a:off x="1661548" y="3097750"/>
-            <a:ext cx="1093635" cy="346760"/>
-          </a:xfrm>
-          <a:prstGeom prst="rect">
-            <a:avLst/>
-          </a:prstGeom>
-          <a:solidFill>
-            <a:srgbClr val="7030A0"/>
-          </a:solidFill>
-          <a:ln w="19050">
-            <a:solidFill>
-              <a:srgbClr val="7030A0"/>
-            </a:solidFill>
-          </a:ln>
-          <a:effectLst/>
-        </p:spPr>
-        <p:style>
-          <a:lnRef idx="1">
-            <a:schemeClr val="accent2"/>
-          </a:lnRef>
-          <a:fillRef idx="2">
-            <a:schemeClr val="accent2"/>
-          </a:fillRef>
-          <a:effectRef idx="1">
-            <a:schemeClr val="accent2"/>
-          </a:effectRef>
-          <a:fontRef idx="minor">
-            <a:schemeClr val="dk1"/>
-          </a:fontRef>
-        </p:style>
-        <p:txBody>
-          <a:bodyPr rtlCol="0" anchor="ctr"/>
-          <a:lstStyle/>
-          <a:p>
-            <a:pPr algn="ctr"/>
-            <a:r>
-              <a:rPr lang="en-US" sz="1050" dirty="0">
-                <a:solidFill>
-                  <a:schemeClr val="bg1"/>
-                </a:solidFill>
-              </a:rPr>
-              <a:t>ModelManager</a:t>
-            </a:r>
-            <a:endParaRPr lang="en-SG" sz="1050" dirty="0">
-              <a:solidFill>
-                <a:schemeClr val="bg1"/>
-              </a:solidFill>
-            </a:endParaRPr>
-          </a:p>
-        </p:txBody>
-      </p:sp>
-      <p:cxnSp>
-        <p:nvCxnSpPr>
-          <p:cNvPr id="5" name="Elbow Connector 106">
-            <a:extLst>
-              <a:ext uri="{FF2B5EF4-FFF2-40B4-BE49-F238E27FC236}">
-                <a16:creationId xmlns:a16="http://schemas.microsoft.com/office/drawing/2014/main" id="{FAA02287-CCA3-4D3C-AFEC-2DD86817ADC0}"/>
-              </a:ext>
-            </a:extLst>
-          </p:cNvPr>
-          <p:cNvCxnSpPr>
-            <a:cxnSpLocks/>
-          </p:cNvCxnSpPr>
-          <p:nvPr/>
-        </p:nvCxnSpPr>
-        <p:spPr>
-          <a:xfrm rot="5400000" flipH="1" flipV="1">
-            <a:off x="4155901" y="1308943"/>
-            <a:ext cx="613122" cy="4459404"/>
-          </a:xfrm>
-          <a:prstGeom prst="bentConnector3">
-            <a:avLst>
-              <a:gd name="adj1" fmla="val -26668"/>
-            </a:avLst>
-          </a:prstGeom>
-          <a:ln w="19050">
-            <a:solidFill>
-              <a:srgbClr val="7030A0"/>
-            </a:solidFill>
-            <a:prstDash val="solid"/>
-            <a:headEnd type="none" w="med" len="med"/>
-            <a:tailEnd type="arrow" w="med" len="med"/>
-          </a:ln>
-          <a:effectLst/>
-        </p:spPr>
-        <p:style>
-          <a:lnRef idx="1">
-            <a:schemeClr val="accent2"/>
-          </a:lnRef>
-          <a:fillRef idx="2">
-            <a:schemeClr val="accent2"/>
-          </a:fillRef>
-          <a:effectRef idx="1">
-            <a:schemeClr val="accent2"/>
-          </a:effectRef>
-          <a:fontRef idx="minor">
-            <a:schemeClr val="dk1"/>
-          </a:fontRef>
-        </p:style>
-      </p:cxnSp>
-      <p:sp>
-        <p:nvSpPr>
-          <p:cNvPr id="6" name="Rectangle 62">
-            <a:extLst>
-              <a:ext uri="{FF2B5EF4-FFF2-40B4-BE49-F238E27FC236}">
-                <a16:creationId xmlns:a16="http://schemas.microsoft.com/office/drawing/2014/main" id="{14F68EB6-0E67-48BC-A59A-CDCF4F113A3B}"/>
-              </a:ext>
-            </a:extLst>
-          </p:cNvPr>
-          <p:cNvSpPr/>
-          <p:nvPr/>
-        </p:nvSpPr>
-        <p:spPr>
-          <a:xfrm rot="16200000">
-            <a:off x="956202" y="2861202"/>
-            <a:ext cx="1093635" cy="346760"/>
-          </a:xfrm>
-          <a:prstGeom prst="rect">
-            <a:avLst/>
-          </a:prstGeom>
-          <a:solidFill>
-            <a:srgbClr val="7030A0"/>
-          </a:solidFill>
-          <a:ln w="19050">
-            <a:solidFill>
-              <a:srgbClr val="7030A0"/>
-            </a:solidFill>
-          </a:ln>
-          <a:effectLst/>
-        </p:spPr>
-        <p:style>
-          <a:lnRef idx="1">
-            <a:schemeClr val="accent2"/>
-          </a:lnRef>
-          <a:fillRef idx="2">
-            <a:schemeClr val="accent2"/>
-          </a:fillRef>
-          <a:effectRef idx="1">
-            <a:schemeClr val="accent2"/>
-          </a:effectRef>
-          <a:fontRef idx="minor">
-            <a:schemeClr val="dk1"/>
-          </a:fontRef>
-        </p:style>
-        <p:txBody>
-          <a:bodyPr rtlCol="0" anchor="ctr"/>
-          <a:lstStyle/>
-          <a:p>
-            <a:pPr algn="ctr"/>
-            <a:r>
-              <a:rPr lang="en-US" sz="1050" dirty="0">
-                <a:solidFill>
-                  <a:schemeClr val="bg1"/>
-                </a:solidFill>
-              </a:rPr>
-              <a:t>&lt;&lt;interface&gt;&gt;</a:t>
-            </a:r>
-          </a:p>
-          <a:p>
-            <a:pPr algn="ctr"/>
-            <a:r>
-              <a:rPr lang="en-US" sz="1050" dirty="0">
-                <a:solidFill>
-                  <a:schemeClr val="bg1"/>
-                </a:solidFill>
-              </a:rPr>
-              <a:t>Model</a:t>
-            </a:r>
-            <a:endParaRPr lang="en-SG" sz="1050" dirty="0">
-              <a:solidFill>
-                <a:schemeClr val="bg1"/>
-              </a:solidFill>
-            </a:endParaRPr>
-          </a:p>
-        </p:txBody>
-      </p:sp>
-      <p:sp>
-        <p:nvSpPr>
-          <p:cNvPr id="7" name="Isosceles Triangle 102">
-            <a:extLst>
-              <a:ext uri="{FF2B5EF4-FFF2-40B4-BE49-F238E27FC236}">
-                <a16:creationId xmlns:a16="http://schemas.microsoft.com/office/drawing/2014/main" id="{8867E551-DD29-40B5-9979-601CF52C9A71}"/>
-              </a:ext>
-            </a:extLst>
-          </p:cNvPr>
-          <p:cNvSpPr/>
-          <p:nvPr/>
-        </p:nvSpPr>
-        <p:spPr>
-          <a:xfrm rot="16200000">
-            <a:off x="1626910" y="2952291"/>
-            <a:ext cx="270504" cy="175523"/>
-          </a:xfrm>
-          <a:prstGeom prst="triangle">
-            <a:avLst/>
-          </a:prstGeom>
-          <a:solidFill>
-            <a:srgbClr val="7030A0"/>
-          </a:solidFill>
-          <a:ln w="19050">
-            <a:solidFill>
-              <a:srgbClr val="7030A0"/>
-            </a:solidFill>
-          </a:ln>
-          <a:effectLst/>
-        </p:spPr>
-        <p:style>
-          <a:lnRef idx="1">
-            <a:schemeClr val="accent6"/>
-          </a:lnRef>
-          <a:fillRef idx="2">
-            <a:schemeClr val="accent6"/>
-          </a:fillRef>
-          <a:effectRef idx="1">
-            <a:schemeClr val="accent6"/>
-          </a:effectRef>
-          <a:fontRef idx="minor">
-            <a:schemeClr val="dk1"/>
-          </a:fontRef>
-        </p:style>
-        <p:txBody>
-          <a:bodyPr rtlCol="0" anchor="ctr"/>
-          <a:lstStyle/>
-          <a:p>
-            <a:pPr algn="ctr"/>
-            <a:endParaRPr lang="en-SG" sz="1050"/>
-          </a:p>
-        </p:txBody>
-      </p:sp>
-      <p:cxnSp>
-        <p:nvCxnSpPr>
-          <p:cNvPr id="8" name="Straight Arrow Connector 7">
-            <a:extLst>
-              <a:ext uri="{FF2B5EF4-FFF2-40B4-BE49-F238E27FC236}">
-                <a16:creationId xmlns:a16="http://schemas.microsoft.com/office/drawing/2014/main" id="{70D1FCC9-712C-43AF-AC56-916E04E3E826}"/>
-              </a:ext>
-            </a:extLst>
-          </p:cNvPr>
-          <p:cNvCxnSpPr>
-            <a:stCxn id="11" idx="3"/>
-            <a:endCxn id="3" idx="1"/>
-          </p:cNvCxnSpPr>
-          <p:nvPr/>
-        </p:nvCxnSpPr>
-        <p:spPr>
-          <a:xfrm>
-            <a:off x="2609828" y="3636620"/>
-            <a:ext cx="267352" cy="0"/>
-          </a:xfrm>
-          <a:prstGeom prst="straightConnector1">
-            <a:avLst/>
-          </a:prstGeom>
-          <a:ln w="19050">
-            <a:solidFill>
-              <a:srgbClr val="7030A0"/>
-            </a:solidFill>
-            <a:headEnd type="none" w="med" len="med"/>
-            <a:tailEnd type="arrow" w="med" len="med"/>
-          </a:ln>
-          <a:effectLst/>
-        </p:spPr>
-        <p:style>
-          <a:lnRef idx="1">
-            <a:schemeClr val="accent2"/>
-          </a:lnRef>
-          <a:fillRef idx="2">
-            <a:schemeClr val="accent2"/>
-          </a:fillRef>
-          <a:effectRef idx="1">
-            <a:schemeClr val="accent2"/>
-          </a:effectRef>
-          <a:fontRef idx="minor">
-            <a:schemeClr val="dk1"/>
-          </a:fontRef>
-        </p:style>
-      </p:cxnSp>
-      <p:cxnSp>
-        <p:nvCxnSpPr>
-          <p:cNvPr id="9" name="Elbow Connector 122">
-            <a:extLst>
-              <a:ext uri="{FF2B5EF4-FFF2-40B4-BE49-F238E27FC236}">
-                <a16:creationId xmlns:a16="http://schemas.microsoft.com/office/drawing/2014/main" id="{E5411768-FF93-4378-8DA1-DA7B755C8F34}"/>
-              </a:ext>
-            </a:extLst>
-          </p:cNvPr>
-          <p:cNvCxnSpPr/>
-          <p:nvPr/>
-        </p:nvCxnSpPr>
-        <p:spPr>
-          <a:xfrm>
-            <a:off x="910091" y="3040053"/>
-            <a:ext cx="419548" cy="2860"/>
-          </a:xfrm>
-          <a:prstGeom prst="bentConnector3">
-            <a:avLst>
-              <a:gd name="adj1" fmla="val 50000"/>
-            </a:avLst>
-          </a:prstGeom>
-          <a:ln w="19050">
-            <a:solidFill>
-              <a:schemeClr val="bg1">
-                <a:lumMod val="75000"/>
-              </a:schemeClr>
-            </a:solidFill>
-            <a:prstDash val="sysDot"/>
-            <a:headEnd type="none" w="med" len="med"/>
-            <a:tailEnd type="arrow" w="med" len="med"/>
-          </a:ln>
-          <a:effectLst/>
-        </p:spPr>
-        <p:style>
-          <a:lnRef idx="1">
-            <a:schemeClr val="accent2"/>
-          </a:lnRef>
-          <a:fillRef idx="2">
-            <a:schemeClr val="accent2"/>
-          </a:fillRef>
-          <a:effectRef idx="1">
-            <a:schemeClr val="accent2"/>
-          </a:effectRef>
-          <a:fontRef idx="minor">
-            <a:schemeClr val="dk1"/>
-          </a:fontRef>
-        </p:style>
-      </p:cxnSp>
-      <p:cxnSp>
-        <p:nvCxnSpPr>
-          <p:cNvPr id="10" name="Straight Connector 9">
-            <a:extLst>
-              <a:ext uri="{FF2B5EF4-FFF2-40B4-BE49-F238E27FC236}">
-                <a16:creationId xmlns:a16="http://schemas.microsoft.com/office/drawing/2014/main" id="{D773C679-C751-4190-9052-B4DC7091964A}"/>
-              </a:ext>
-            </a:extLst>
-          </p:cNvPr>
-          <p:cNvCxnSpPr>
-            <a:stCxn id="7" idx="3"/>
-          </p:cNvCxnSpPr>
-          <p:nvPr/>
-        </p:nvCxnSpPr>
-        <p:spPr>
-          <a:xfrm flipV="1">
-            <a:off x="1849924" y="3040052"/>
-            <a:ext cx="216105" cy="1"/>
-          </a:xfrm>
-          <a:prstGeom prst="line">
-            <a:avLst/>
-          </a:prstGeom>
-          <a:ln w="19050">
-            <a:solidFill>
-              <a:srgbClr val="7030A0"/>
-            </a:solidFill>
-            <a:prstDash val="sysDot"/>
-            <a:headEnd type="none" w="med" len="med"/>
-            <a:tailEnd type="none" w="med" len="med"/>
-          </a:ln>
-          <a:effectLst/>
-        </p:spPr>
-        <p:style>
-          <a:lnRef idx="1">
-            <a:schemeClr val="accent2"/>
-          </a:lnRef>
-          <a:fillRef idx="2">
-            <a:schemeClr val="accent2"/>
-          </a:fillRef>
-          <a:effectRef idx="1">
-            <a:schemeClr val="accent2"/>
-          </a:effectRef>
-          <a:fontRef idx="minor">
-            <a:schemeClr val="dk1"/>
-          </a:fontRef>
-        </p:style>
-      </p:cxnSp>
-      <p:sp>
-        <p:nvSpPr>
-          <p:cNvPr id="11" name="Flowchart: Decision 96">
-            <a:extLst>
-              <a:ext uri="{FF2B5EF4-FFF2-40B4-BE49-F238E27FC236}">
-                <a16:creationId xmlns:a16="http://schemas.microsoft.com/office/drawing/2014/main" id="{DAAC30CD-78F2-41FF-B175-CE09A1F490C9}"/>
-              </a:ext>
-            </a:extLst>
-          </p:cNvPr>
-          <p:cNvSpPr/>
-          <p:nvPr/>
-        </p:nvSpPr>
-        <p:spPr>
-          <a:xfrm>
-            <a:off x="2373780" y="3549930"/>
-            <a:ext cx="236048" cy="173380"/>
-          </a:xfrm>
-          <a:prstGeom prst="flowChartDecision">
-            <a:avLst/>
-          </a:prstGeom>
-          <a:noFill/>
-          <a:ln w="19050">
-            <a:solidFill>
-              <a:srgbClr val="7030A0"/>
-            </a:solidFill>
-          </a:ln>
-          <a:effectLst/>
-        </p:spPr>
-        <p:style>
-          <a:lnRef idx="1">
-            <a:schemeClr val="accent6"/>
-          </a:lnRef>
-          <a:fillRef idx="2">
-            <a:schemeClr val="accent6"/>
-          </a:fillRef>
-          <a:effectRef idx="1">
-            <a:schemeClr val="accent6"/>
-          </a:effectRef>
-          <a:fontRef idx="minor">
-            <a:schemeClr val="dk1"/>
-          </a:fontRef>
-        </p:style>
-        <p:txBody>
-          <a:bodyPr rtlCol="0" anchor="ctr"/>
-          <a:lstStyle/>
-          <a:p>
-            <a:pPr algn="ctr"/>
-            <a:endParaRPr lang="en-US" sz="1050"/>
-          </a:p>
-        </p:txBody>
-      </p:sp>
-      <p:sp>
-        <p:nvSpPr>
-          <p:cNvPr id="12" name="Rectangle 8">
-            <a:extLst>
-              <a:ext uri="{FF2B5EF4-FFF2-40B4-BE49-F238E27FC236}">
-                <a16:creationId xmlns:a16="http://schemas.microsoft.com/office/drawing/2014/main" id="{232E9F80-B7E4-4036-945D-3D6FA080047A}"/>
-              </a:ext>
-            </a:extLst>
-          </p:cNvPr>
-          <p:cNvSpPr/>
-          <p:nvPr/>
-        </p:nvSpPr>
-        <p:spPr>
-          <a:xfrm>
-            <a:off x="2786406" y="2834911"/>
-            <a:ext cx="1447688" cy="346760"/>
-          </a:xfrm>
-          <a:prstGeom prst="rect">
-            <a:avLst/>
-          </a:prstGeom>
-          <a:ln w="19050">
-            <a:solidFill>
-              <a:srgbClr val="7030A0"/>
-            </a:solidFill>
-          </a:ln>
-          <a:effectLst/>
-        </p:spPr>
-        <p:style>
-          <a:lnRef idx="1">
-            <a:schemeClr val="accent4"/>
-          </a:lnRef>
-          <a:fillRef idx="2">
-            <a:schemeClr val="accent4"/>
-          </a:fillRef>
-          <a:effectRef idx="1">
-            <a:schemeClr val="accent4"/>
-          </a:effectRef>
-          <a:fontRef idx="minor">
-            <a:schemeClr val="dk1"/>
-          </a:fontRef>
-        </p:style>
-        <p:txBody>
-          <a:bodyPr rtlCol="0" anchor="ctr"/>
-          <a:lstStyle/>
-          <a:p>
-            <a:pPr algn="ctr"/>
-            <a:r>
-              <a:rPr lang="en-US" sz="1050" dirty="0">
-                <a:solidFill>
-                  <a:srgbClr val="7030A0"/>
-                </a:solidFill>
-              </a:rPr>
-              <a:t>VersionedAddressBook</a:t>
-            </a:r>
-            <a:endParaRPr lang="en-SG" sz="1050" dirty="0">
-              <a:solidFill>
-                <a:srgbClr val="7030A0"/>
-              </a:solidFill>
-            </a:endParaRPr>
-          </a:p>
-        </p:txBody>
-      </p:sp>
-      <p:cxnSp>
-        <p:nvCxnSpPr>
-          <p:cNvPr id="13" name="Straight Arrow Connector 12">
-            <a:extLst>
-              <a:ext uri="{FF2B5EF4-FFF2-40B4-BE49-F238E27FC236}">
-                <a16:creationId xmlns:a16="http://schemas.microsoft.com/office/drawing/2014/main" id="{A2D2A062-D8A9-4F33-8621-24ED8D0868A9}"/>
-              </a:ext>
-            </a:extLst>
-          </p:cNvPr>
-          <p:cNvCxnSpPr>
-            <a:cxnSpLocks/>
-            <a:stCxn id="14" idx="3"/>
-            <a:endCxn id="12" idx="1"/>
-          </p:cNvCxnSpPr>
-          <p:nvPr/>
-        </p:nvCxnSpPr>
-        <p:spPr>
-          <a:xfrm>
-            <a:off x="2624360" y="3003033"/>
-            <a:ext cx="162046" cy="5258"/>
-          </a:xfrm>
-          <a:prstGeom prst="straightConnector1">
-            <a:avLst/>
-          </a:prstGeom>
-          <a:ln w="19050">
-            <a:solidFill>
-              <a:srgbClr val="7030A0"/>
-            </a:solidFill>
-            <a:headEnd type="none" w="med" len="med"/>
-            <a:tailEnd type="arrow" w="med" len="med"/>
-          </a:ln>
-          <a:effectLst/>
-        </p:spPr>
-        <p:style>
-          <a:lnRef idx="1">
-            <a:schemeClr val="accent2"/>
-          </a:lnRef>
-          <a:fillRef idx="2">
-            <a:schemeClr val="accent2"/>
-          </a:fillRef>
-          <a:effectRef idx="1">
-            <a:schemeClr val="accent2"/>
-          </a:effectRef>
-          <a:fontRef idx="minor">
-            <a:schemeClr val="dk1"/>
-          </a:fontRef>
-        </p:style>
-      </p:cxnSp>
-      <p:sp>
-        <p:nvSpPr>
-          <p:cNvPr id="14" name="Flowchart: Decision 96">
-            <a:extLst>
-              <a:ext uri="{FF2B5EF4-FFF2-40B4-BE49-F238E27FC236}">
-                <a16:creationId xmlns:a16="http://schemas.microsoft.com/office/drawing/2014/main" id="{4B0494E7-F1AA-432B-8967-F6C5371BE1CC}"/>
-              </a:ext>
-            </a:extLst>
-          </p:cNvPr>
-          <p:cNvSpPr/>
-          <p:nvPr/>
-        </p:nvSpPr>
-        <p:spPr>
-          <a:xfrm>
-            <a:off x="2388312" y="2916343"/>
-            <a:ext cx="236048" cy="173380"/>
-          </a:xfrm>
-          <a:prstGeom prst="flowChartDecision">
-            <a:avLst/>
-          </a:prstGeom>
-          <a:noFill/>
-          <a:ln w="19050">
-            <a:solidFill>
-              <a:srgbClr val="7030A0"/>
-            </a:solidFill>
-          </a:ln>
-          <a:effectLst/>
-        </p:spPr>
-        <p:style>
-          <a:lnRef idx="1">
-            <a:schemeClr val="accent6"/>
-          </a:lnRef>
-          <a:fillRef idx="2">
-            <a:schemeClr val="accent6"/>
-          </a:fillRef>
-          <a:effectRef idx="1">
-            <a:schemeClr val="accent6"/>
-          </a:effectRef>
-          <a:fontRef idx="minor">
-            <a:schemeClr val="dk1"/>
-          </a:fontRef>
-        </p:style>
-        <p:txBody>
-          <a:bodyPr rtlCol="0" anchor="ctr"/>
-          <a:lstStyle/>
-          <a:p>
-            <a:pPr algn="ctr"/>
-            <a:endParaRPr lang="en-US" sz="1050"/>
-          </a:p>
-        </p:txBody>
-      </p:sp>
-      <p:sp>
-        <p:nvSpPr>
-          <p:cNvPr id="15" name="Rectangle 8">
-            <a:extLst>
-              <a:ext uri="{FF2B5EF4-FFF2-40B4-BE49-F238E27FC236}">
-                <a16:creationId xmlns:a16="http://schemas.microsoft.com/office/drawing/2014/main" id="{B97FF4B7-143C-4DEB-AD98-470E7414B19A}"/>
-              </a:ext>
-            </a:extLst>
-          </p:cNvPr>
-          <p:cNvSpPr/>
-          <p:nvPr/>
-        </p:nvSpPr>
-        <p:spPr>
-          <a:xfrm>
-            <a:off x="4762209" y="2863434"/>
-            <a:ext cx="1156969" cy="346760"/>
-          </a:xfrm>
-          <a:prstGeom prst="rect">
-            <a:avLst/>
-          </a:prstGeom>
-          <a:ln w="19050">
-            <a:solidFill>
-              <a:srgbClr val="7030A0"/>
-            </a:solidFill>
-          </a:ln>
-          <a:effectLst/>
-        </p:spPr>
-        <p:style>
-          <a:lnRef idx="1">
-            <a:schemeClr val="accent4"/>
-          </a:lnRef>
-          <a:fillRef idx="2">
-            <a:schemeClr val="accent4"/>
-          </a:fillRef>
-          <a:effectRef idx="1">
-            <a:schemeClr val="accent4"/>
-          </a:effectRef>
-          <a:fontRef idx="minor">
-            <a:schemeClr val="dk1"/>
-          </a:fontRef>
-        </p:style>
-        <p:txBody>
-          <a:bodyPr rtlCol="0" anchor="ctr"/>
-          <a:lstStyle/>
-          <a:p>
-            <a:pPr algn="ctr"/>
-            <a:r>
-              <a:rPr lang="en-US" sz="1050" dirty="0">
-                <a:solidFill>
-                  <a:srgbClr val="7030A0"/>
-                </a:solidFill>
-              </a:rPr>
-              <a:t>UniquePersonList</a:t>
-            </a:r>
-            <a:endParaRPr lang="en-SG" sz="1050" dirty="0">
-              <a:solidFill>
-                <a:srgbClr val="7030A0"/>
-              </a:solidFill>
-            </a:endParaRPr>
-          </a:p>
-        </p:txBody>
-      </p:sp>
-      <p:sp>
-        <p:nvSpPr>
-          <p:cNvPr id="16" name="Flowchart: Decision 96">
-            <a:extLst>
-              <a:ext uri="{FF2B5EF4-FFF2-40B4-BE49-F238E27FC236}">
-                <a16:creationId xmlns:a16="http://schemas.microsoft.com/office/drawing/2014/main" id="{F5670AE0-297B-46AA-88C4-B995927DE2A0}"/>
-              </a:ext>
-            </a:extLst>
-          </p:cNvPr>
-          <p:cNvSpPr/>
-          <p:nvPr/>
-        </p:nvSpPr>
-        <p:spPr>
-          <a:xfrm>
-            <a:off x="4233246" y="2948201"/>
-            <a:ext cx="236048" cy="173380"/>
-          </a:xfrm>
-          <a:prstGeom prst="flowChartDecision">
-            <a:avLst/>
-          </a:prstGeom>
-          <a:solidFill>
-            <a:srgbClr val="7030A0"/>
-          </a:solidFill>
-          <a:ln w="19050">
-            <a:solidFill>
-              <a:srgbClr val="7030A0"/>
-            </a:solidFill>
-          </a:ln>
-          <a:effectLst/>
-        </p:spPr>
-        <p:style>
-          <a:lnRef idx="1">
-            <a:schemeClr val="accent6"/>
-          </a:lnRef>
-          <a:fillRef idx="2">
-            <a:schemeClr val="accent6"/>
-          </a:fillRef>
-          <a:effectRef idx="1">
-            <a:schemeClr val="accent6"/>
-          </a:effectRef>
-          <a:fontRef idx="minor">
-            <a:schemeClr val="dk1"/>
-          </a:fontRef>
-        </p:style>
-        <p:txBody>
-          <a:bodyPr rtlCol="0" anchor="ctr"/>
-          <a:lstStyle/>
-          <a:p>
-            <a:pPr algn="ctr"/>
-            <a:endParaRPr lang="en-US" sz="1050"/>
-          </a:p>
-        </p:txBody>
-      </p:sp>
-      <p:cxnSp>
-        <p:nvCxnSpPr>
-          <p:cNvPr id="17" name="Elbow Connector 29">
-            <a:extLst>
-              <a:ext uri="{FF2B5EF4-FFF2-40B4-BE49-F238E27FC236}">
-                <a16:creationId xmlns:a16="http://schemas.microsoft.com/office/drawing/2014/main" id="{3BE377F2-923D-494E-A774-145BA8B13CC2}"/>
-              </a:ext>
-            </a:extLst>
-          </p:cNvPr>
-          <p:cNvCxnSpPr>
-            <a:cxnSpLocks/>
-            <a:stCxn id="16" idx="3"/>
-            <a:endCxn id="15" idx="1"/>
-          </p:cNvCxnSpPr>
-          <p:nvPr/>
-        </p:nvCxnSpPr>
-        <p:spPr>
-          <a:xfrm>
-            <a:off x="4469294" y="3034891"/>
-            <a:ext cx="292915" cy="1923"/>
-          </a:xfrm>
-          <a:prstGeom prst="bentConnector3">
-            <a:avLst/>
-          </a:prstGeom>
-          <a:ln w="19050">
-            <a:solidFill>
-              <a:srgbClr val="7030A0"/>
-            </a:solidFill>
-            <a:headEnd type="none" w="med" len="med"/>
-            <a:tailEnd type="arrow" w="med" len="med"/>
-          </a:ln>
-          <a:effectLst/>
-        </p:spPr>
-        <p:style>
-          <a:lnRef idx="1">
-            <a:schemeClr val="accent2"/>
-          </a:lnRef>
-          <a:fillRef idx="2">
-            <a:schemeClr val="accent2"/>
-          </a:fillRef>
-          <a:effectRef idx="1">
-            <a:schemeClr val="accent2"/>
-          </a:effectRef>
-          <a:fontRef idx="minor">
-            <a:schemeClr val="dk1"/>
-          </a:fontRef>
-        </p:style>
-      </p:cxnSp>
-      <p:sp>
-        <p:nvSpPr>
-          <p:cNvPr id="18" name="Rectangle 8">
-            <a:extLst>
-              <a:ext uri="{FF2B5EF4-FFF2-40B4-BE49-F238E27FC236}">
-                <a16:creationId xmlns:a16="http://schemas.microsoft.com/office/drawing/2014/main" id="{261169FA-9ADA-47F5-B2EA-27200AE67225}"/>
-              </a:ext>
-            </a:extLst>
-          </p:cNvPr>
-          <p:cNvSpPr/>
-          <p:nvPr/>
-        </p:nvSpPr>
-        <p:spPr>
-          <a:xfrm>
-            <a:off x="6313677" y="2858066"/>
-            <a:ext cx="708186" cy="346760"/>
-          </a:xfrm>
-          <a:prstGeom prst="rect">
-            <a:avLst/>
-          </a:prstGeom>
-          <a:ln w="19050">
-            <a:solidFill>
-              <a:srgbClr val="7030A0"/>
-            </a:solidFill>
-          </a:ln>
-          <a:effectLst/>
-        </p:spPr>
-        <p:style>
-          <a:lnRef idx="1">
-            <a:schemeClr val="accent4"/>
-          </a:lnRef>
-          <a:fillRef idx="2">
-            <a:schemeClr val="accent4"/>
-          </a:fillRef>
-          <a:effectRef idx="1">
-            <a:schemeClr val="accent4"/>
-          </a:effectRef>
-          <a:fontRef idx="minor">
-            <a:schemeClr val="dk1"/>
-          </a:fontRef>
-        </p:style>
-        <p:txBody>
-          <a:bodyPr rtlCol="0" anchor="ctr"/>
-          <a:lstStyle/>
-          <a:p>
-            <a:pPr algn="ctr"/>
-            <a:r>
-              <a:rPr lang="en-US" sz="1050" dirty="0">
-                <a:solidFill>
-                  <a:srgbClr val="7030A0"/>
-                </a:solidFill>
-              </a:rPr>
-              <a:t>Person</a:t>
-            </a:r>
-            <a:endParaRPr lang="en-SG" sz="1050" dirty="0">
-              <a:solidFill>
-                <a:srgbClr val="7030A0"/>
-              </a:solidFill>
-            </a:endParaRPr>
-          </a:p>
-        </p:txBody>
-      </p:sp>
-      <p:sp>
-        <p:nvSpPr>
-          <p:cNvPr id="19" name="Flowchart: Decision 96">
-            <a:extLst>
-              <a:ext uri="{FF2B5EF4-FFF2-40B4-BE49-F238E27FC236}">
-                <a16:creationId xmlns:a16="http://schemas.microsoft.com/office/drawing/2014/main" id="{EEF097D0-4D10-411A-BC8F-39F4A80677CB}"/>
-              </a:ext>
-            </a:extLst>
-          </p:cNvPr>
-          <p:cNvSpPr/>
-          <p:nvPr/>
-        </p:nvSpPr>
-        <p:spPr>
-          <a:xfrm>
-            <a:off x="5918460" y="2941065"/>
-            <a:ext cx="236048" cy="173380"/>
-          </a:xfrm>
-          <a:prstGeom prst="flowChartDecision">
-            <a:avLst/>
-          </a:prstGeom>
-          <a:noFill/>
-          <a:ln w="19050">
-            <a:solidFill>
-              <a:srgbClr val="7030A0"/>
-            </a:solidFill>
-          </a:ln>
-          <a:effectLst/>
-        </p:spPr>
-        <p:style>
-          <a:lnRef idx="1">
-            <a:schemeClr val="accent6"/>
-          </a:lnRef>
-          <a:fillRef idx="2">
-            <a:schemeClr val="accent6"/>
-          </a:fillRef>
-          <a:effectRef idx="1">
-            <a:schemeClr val="accent6"/>
-          </a:effectRef>
-          <a:fontRef idx="minor">
-            <a:schemeClr val="dk1"/>
-          </a:fontRef>
-        </p:style>
-        <p:txBody>
-          <a:bodyPr rtlCol="0" anchor="ctr"/>
-          <a:lstStyle/>
-          <a:p>
-            <a:pPr algn="ctr"/>
-            <a:endParaRPr lang="en-US" sz="1050"/>
-          </a:p>
-        </p:txBody>
-      </p:sp>
-      <p:cxnSp>
-        <p:nvCxnSpPr>
-          <p:cNvPr id="20" name="Elbow Connector 63">
-            <a:extLst>
-              <a:ext uri="{FF2B5EF4-FFF2-40B4-BE49-F238E27FC236}">
-                <a16:creationId xmlns:a16="http://schemas.microsoft.com/office/drawing/2014/main" id="{9AB58566-5BF1-47A0-869B-0B68B9F4E305}"/>
-              </a:ext>
-            </a:extLst>
-          </p:cNvPr>
-          <p:cNvCxnSpPr>
-            <a:cxnSpLocks/>
-            <a:stCxn id="19" idx="3"/>
-            <a:endCxn id="18" idx="1"/>
-          </p:cNvCxnSpPr>
-          <p:nvPr/>
-        </p:nvCxnSpPr>
-        <p:spPr>
-          <a:xfrm>
-            <a:off x="6154508" y="3027755"/>
-            <a:ext cx="159169" cy="3691"/>
-          </a:xfrm>
-          <a:prstGeom prst="bentConnector3">
-            <a:avLst/>
-          </a:prstGeom>
-          <a:ln w="19050">
-            <a:solidFill>
-              <a:srgbClr val="7030A0"/>
-            </a:solidFill>
-            <a:headEnd type="none" w="med" len="med"/>
-            <a:tailEnd type="arrow" w="med" len="med"/>
-          </a:ln>
-          <a:effectLst/>
-        </p:spPr>
-        <p:style>
-          <a:lnRef idx="1">
-            <a:schemeClr val="accent2"/>
-          </a:lnRef>
-          <a:fillRef idx="2">
-            <a:schemeClr val="accent2"/>
-          </a:fillRef>
-          <a:effectRef idx="1">
-            <a:schemeClr val="accent2"/>
-          </a:effectRef>
-          <a:fontRef idx="minor">
-            <a:schemeClr val="dk1"/>
-          </a:fontRef>
-        </p:style>
-      </p:cxnSp>
-      <p:sp>
-        <p:nvSpPr>
-          <p:cNvPr id="21" name="Rectangle 8">
-            <a:extLst>
-              <a:ext uri="{FF2B5EF4-FFF2-40B4-BE49-F238E27FC236}">
-                <a16:creationId xmlns:a16="http://schemas.microsoft.com/office/drawing/2014/main" id="{3C4D56E8-1CD6-45C9-8194-D7A93754EB5B}"/>
-              </a:ext>
-            </a:extLst>
-          </p:cNvPr>
-          <p:cNvSpPr/>
-          <p:nvPr/>
-        </p:nvSpPr>
-        <p:spPr>
-          <a:xfrm>
-            <a:off x="7712397" y="2564238"/>
-            <a:ext cx="708186" cy="285783"/>
-          </a:xfrm>
-          <a:prstGeom prst="rect">
-            <a:avLst/>
-          </a:prstGeom>
-          <a:ln w="19050">
-            <a:solidFill>
-              <a:srgbClr val="7030A0"/>
-            </a:solidFill>
-          </a:ln>
-          <a:effectLst/>
-        </p:spPr>
-        <p:style>
-          <a:lnRef idx="1">
-            <a:schemeClr val="accent4"/>
-          </a:lnRef>
-          <a:fillRef idx="2">
-            <a:schemeClr val="accent4"/>
-          </a:fillRef>
-          <a:effectRef idx="1">
-            <a:schemeClr val="accent4"/>
-          </a:effectRef>
-          <a:fontRef idx="minor">
-            <a:schemeClr val="dk1"/>
-          </a:fontRef>
-        </p:style>
-        <p:txBody>
-          <a:bodyPr rtlCol="0" anchor="ctr"/>
-          <a:lstStyle/>
-          <a:p>
-            <a:pPr algn="ctr"/>
-            <a:r>
-              <a:rPr lang="en-US" sz="1050" dirty="0">
-                <a:solidFill>
-                  <a:srgbClr val="7030A0"/>
-                </a:solidFill>
-              </a:rPr>
-              <a:t>Name</a:t>
-            </a:r>
-            <a:endParaRPr lang="en-SG" sz="1050" dirty="0">
-              <a:solidFill>
-                <a:srgbClr val="7030A0"/>
-              </a:solidFill>
-            </a:endParaRPr>
-          </a:p>
-        </p:txBody>
-      </p:sp>
-      <p:sp>
-        <p:nvSpPr>
-          <p:cNvPr id="22" name="Flowchart: Decision 96">
-            <a:extLst>
-              <a:ext uri="{FF2B5EF4-FFF2-40B4-BE49-F238E27FC236}">
-                <a16:creationId xmlns:a16="http://schemas.microsoft.com/office/drawing/2014/main" id="{4D40E409-5952-4DE5-B540-6E669A999BB0}"/>
-              </a:ext>
-            </a:extLst>
-          </p:cNvPr>
-          <p:cNvSpPr/>
-          <p:nvPr/>
-        </p:nvSpPr>
-        <p:spPr>
-          <a:xfrm>
-            <a:off x="7041947" y="2948201"/>
-            <a:ext cx="236048" cy="173380"/>
-          </a:xfrm>
-          <a:prstGeom prst="flowChartDecision">
-            <a:avLst/>
-          </a:prstGeom>
-          <a:solidFill>
-            <a:srgbClr val="7030A0"/>
-          </a:solidFill>
-          <a:ln w="19050">
-            <a:solidFill>
-              <a:srgbClr val="7030A0"/>
-            </a:solidFill>
-          </a:ln>
-          <a:effectLst/>
-        </p:spPr>
-        <p:style>
-          <a:lnRef idx="1">
-            <a:schemeClr val="accent6"/>
-          </a:lnRef>
-          <a:fillRef idx="2">
-            <a:schemeClr val="accent6"/>
-          </a:fillRef>
-          <a:effectRef idx="1">
-            <a:schemeClr val="accent6"/>
-          </a:effectRef>
-          <a:fontRef idx="minor">
-            <a:schemeClr val="dk1"/>
-          </a:fontRef>
-        </p:style>
-        <p:txBody>
-          <a:bodyPr rtlCol="0" anchor="ctr"/>
-          <a:lstStyle/>
-          <a:p>
-            <a:pPr algn="ctr"/>
-            <a:endParaRPr lang="en-US" sz="1050"/>
-          </a:p>
-        </p:txBody>
-      </p:sp>
-      <p:cxnSp>
-        <p:nvCxnSpPr>
-          <p:cNvPr id="23" name="Elbow Connector 78">
-            <a:extLst>
-              <a:ext uri="{FF2B5EF4-FFF2-40B4-BE49-F238E27FC236}">
-                <a16:creationId xmlns:a16="http://schemas.microsoft.com/office/drawing/2014/main" id="{95D119F0-6B59-442C-AA64-9C808B6E06E2}"/>
-              </a:ext>
-            </a:extLst>
-          </p:cNvPr>
-          <p:cNvCxnSpPr>
-            <a:cxnSpLocks/>
-          </p:cNvCxnSpPr>
-          <p:nvPr/>
-        </p:nvCxnSpPr>
-        <p:spPr>
-          <a:xfrm flipV="1">
-            <a:off x="7277995" y="2706821"/>
-            <a:ext cx="434402" cy="327761"/>
-          </a:xfrm>
-          <a:prstGeom prst="bentConnector3">
-            <a:avLst/>
-          </a:prstGeom>
-          <a:ln w="19050">
-            <a:solidFill>
-              <a:srgbClr val="7030A0"/>
-            </a:solidFill>
-            <a:headEnd type="none" w="med" len="med"/>
-            <a:tailEnd type="arrow" w="med" len="med"/>
-          </a:ln>
-          <a:effectLst/>
-        </p:spPr>
-        <p:style>
-          <a:lnRef idx="1">
-            <a:schemeClr val="accent2"/>
-          </a:lnRef>
-          <a:fillRef idx="2">
-            <a:schemeClr val="accent2"/>
-          </a:fillRef>
-          <a:effectRef idx="1">
-            <a:schemeClr val="accent2"/>
-          </a:effectRef>
-          <a:fontRef idx="minor">
-            <a:schemeClr val="dk1"/>
-          </a:fontRef>
-        </p:style>
-      </p:cxnSp>
-      <p:sp>
-        <p:nvSpPr>
-          <p:cNvPr id="24" name="Rectangle 8">
-            <a:extLst>
-              <a:ext uri="{FF2B5EF4-FFF2-40B4-BE49-F238E27FC236}">
-                <a16:creationId xmlns:a16="http://schemas.microsoft.com/office/drawing/2014/main" id="{2B884803-8E36-4A69-8C60-35630D585977}"/>
-              </a:ext>
-            </a:extLst>
-          </p:cNvPr>
-          <p:cNvSpPr/>
-          <p:nvPr/>
-        </p:nvSpPr>
-        <p:spPr>
-          <a:xfrm>
-            <a:off x="7712397" y="2887216"/>
-            <a:ext cx="708186" cy="285783"/>
-          </a:xfrm>
-          <a:prstGeom prst="rect">
-            <a:avLst/>
-          </a:prstGeom>
-          <a:ln w="19050">
-            <a:solidFill>
-              <a:srgbClr val="7030A0"/>
-            </a:solidFill>
-          </a:ln>
-          <a:effectLst/>
-        </p:spPr>
-        <p:style>
-          <a:lnRef idx="1">
-            <a:schemeClr val="accent4"/>
-          </a:lnRef>
-          <a:fillRef idx="2">
-            <a:schemeClr val="accent4"/>
-          </a:fillRef>
-          <a:effectRef idx="1">
-            <a:schemeClr val="accent4"/>
-          </a:effectRef>
-          <a:fontRef idx="minor">
-            <a:schemeClr val="dk1"/>
-          </a:fontRef>
-        </p:style>
-        <p:txBody>
-          <a:bodyPr rtlCol="0" anchor="ctr"/>
-          <a:lstStyle/>
-          <a:p>
-            <a:pPr algn="ctr"/>
-            <a:r>
-              <a:rPr lang="en-US" sz="1050" dirty="0">
-                <a:solidFill>
-                  <a:srgbClr val="7030A0"/>
-                </a:solidFill>
-              </a:rPr>
-              <a:t>Phone</a:t>
-            </a:r>
-            <a:endParaRPr lang="en-SG" sz="1050" dirty="0">
-              <a:solidFill>
-                <a:srgbClr val="7030A0"/>
-              </a:solidFill>
-            </a:endParaRPr>
-          </a:p>
-        </p:txBody>
-      </p:sp>
-      <p:cxnSp>
-        <p:nvCxnSpPr>
-          <p:cNvPr id="25" name="Elbow Connector 80">
-            <a:extLst>
-              <a:ext uri="{FF2B5EF4-FFF2-40B4-BE49-F238E27FC236}">
-                <a16:creationId xmlns:a16="http://schemas.microsoft.com/office/drawing/2014/main" id="{A8ACE53C-527F-4FA0-AD0D-083FBC8C6612}"/>
-              </a:ext>
-            </a:extLst>
-          </p:cNvPr>
-          <p:cNvCxnSpPr>
-            <a:stCxn id="22" idx="3"/>
-            <a:endCxn id="24" idx="1"/>
-          </p:cNvCxnSpPr>
-          <p:nvPr/>
-        </p:nvCxnSpPr>
-        <p:spPr>
-          <a:xfrm flipV="1">
-            <a:off x="7277995" y="3030108"/>
-            <a:ext cx="434402" cy="4783"/>
-          </a:xfrm>
-          <a:prstGeom prst="bentConnector3">
-            <a:avLst/>
-          </a:prstGeom>
-          <a:ln w="19050">
-            <a:solidFill>
-              <a:srgbClr val="7030A0"/>
-            </a:solidFill>
-            <a:headEnd type="none" w="med" len="med"/>
-            <a:tailEnd type="arrow" w="med" len="med"/>
-          </a:ln>
-          <a:effectLst/>
-        </p:spPr>
-        <p:style>
-          <a:lnRef idx="1">
-            <a:schemeClr val="accent2"/>
-          </a:lnRef>
-          <a:fillRef idx="2">
-            <a:schemeClr val="accent2"/>
-          </a:fillRef>
-          <a:effectRef idx="1">
-            <a:schemeClr val="accent2"/>
-          </a:effectRef>
-          <a:fontRef idx="minor">
-            <a:schemeClr val="dk1"/>
-          </a:fontRef>
-        </p:style>
-      </p:cxnSp>
-      <p:sp>
-        <p:nvSpPr>
-          <p:cNvPr id="26" name="Rectangle 8">
-            <a:extLst>
-              <a:ext uri="{FF2B5EF4-FFF2-40B4-BE49-F238E27FC236}">
-                <a16:creationId xmlns:a16="http://schemas.microsoft.com/office/drawing/2014/main" id="{49CED457-F5B1-417F-B693-8C96198712CB}"/>
-              </a:ext>
-            </a:extLst>
-          </p:cNvPr>
-          <p:cNvSpPr/>
-          <p:nvPr/>
-        </p:nvSpPr>
-        <p:spPr>
-          <a:xfrm>
-            <a:off x="7712397" y="3210194"/>
-            <a:ext cx="708186" cy="285783"/>
-          </a:xfrm>
-          <a:prstGeom prst="rect">
-            <a:avLst/>
-          </a:prstGeom>
-          <a:ln w="19050">
-            <a:solidFill>
-              <a:srgbClr val="7030A0"/>
-            </a:solidFill>
-          </a:ln>
-          <a:effectLst/>
-        </p:spPr>
-        <p:style>
-          <a:lnRef idx="1">
-            <a:schemeClr val="accent4"/>
-          </a:lnRef>
-          <a:fillRef idx="2">
-            <a:schemeClr val="accent4"/>
-          </a:fillRef>
-          <a:effectRef idx="1">
-            <a:schemeClr val="accent4"/>
-          </a:effectRef>
-          <a:fontRef idx="minor">
-            <a:schemeClr val="dk1"/>
-          </a:fontRef>
-        </p:style>
-        <p:txBody>
-          <a:bodyPr rtlCol="0" anchor="ctr"/>
-          <a:lstStyle/>
-          <a:p>
-            <a:pPr algn="ctr"/>
-            <a:r>
-              <a:rPr lang="en-US" sz="1050" dirty="0">
-                <a:solidFill>
-                  <a:srgbClr val="7030A0"/>
-                </a:solidFill>
-              </a:rPr>
-              <a:t>Email</a:t>
-            </a:r>
-            <a:endParaRPr lang="en-SG" sz="1050" dirty="0">
-              <a:solidFill>
-                <a:srgbClr val="7030A0"/>
-              </a:solidFill>
-            </a:endParaRPr>
-          </a:p>
-        </p:txBody>
-      </p:sp>
-      <p:cxnSp>
-        <p:nvCxnSpPr>
-          <p:cNvPr id="27" name="Elbow Connector 83">
-            <a:extLst>
-              <a:ext uri="{FF2B5EF4-FFF2-40B4-BE49-F238E27FC236}">
-                <a16:creationId xmlns:a16="http://schemas.microsoft.com/office/drawing/2014/main" id="{6322D9A4-2A90-4B55-BCDD-DF9962FFBDBC}"/>
-              </a:ext>
-            </a:extLst>
-          </p:cNvPr>
-          <p:cNvCxnSpPr>
-            <a:stCxn id="22" idx="3"/>
-            <a:endCxn id="26" idx="1"/>
-          </p:cNvCxnSpPr>
-          <p:nvPr/>
-        </p:nvCxnSpPr>
-        <p:spPr>
-          <a:xfrm>
-            <a:off x="7277995" y="3034891"/>
-            <a:ext cx="434402" cy="318195"/>
-          </a:xfrm>
-          <a:prstGeom prst="bentConnector3">
-            <a:avLst/>
-          </a:prstGeom>
-          <a:ln w="19050">
-            <a:solidFill>
-              <a:srgbClr val="7030A0"/>
-            </a:solidFill>
-            <a:headEnd type="none" w="med" len="med"/>
-            <a:tailEnd type="arrow" w="med" len="med"/>
-          </a:ln>
-          <a:effectLst/>
-        </p:spPr>
-        <p:style>
-          <a:lnRef idx="1">
-            <a:schemeClr val="accent2"/>
-          </a:lnRef>
-          <a:fillRef idx="2">
-            <a:schemeClr val="accent2"/>
-          </a:fillRef>
-          <a:effectRef idx="1">
-            <a:schemeClr val="accent2"/>
-          </a:effectRef>
-          <a:fontRef idx="minor">
-            <a:schemeClr val="dk1"/>
-          </a:fontRef>
-        </p:style>
-      </p:cxnSp>
-      <p:sp>
-        <p:nvSpPr>
-          <p:cNvPr id="28" name="Rectangle 8">
-            <a:extLst>
-              <a:ext uri="{FF2B5EF4-FFF2-40B4-BE49-F238E27FC236}">
-                <a16:creationId xmlns:a16="http://schemas.microsoft.com/office/drawing/2014/main" id="{E5C85C98-855C-4549-A42F-6609476D8D78}"/>
-              </a:ext>
-            </a:extLst>
-          </p:cNvPr>
-          <p:cNvSpPr/>
-          <p:nvPr/>
-        </p:nvSpPr>
-        <p:spPr>
-          <a:xfrm>
-            <a:off x="7712397" y="3533171"/>
-            <a:ext cx="708186" cy="285783"/>
-          </a:xfrm>
-          <a:prstGeom prst="rect">
-            <a:avLst/>
-          </a:prstGeom>
-          <a:ln w="19050">
-            <a:solidFill>
-              <a:srgbClr val="7030A0"/>
-            </a:solidFill>
-          </a:ln>
-          <a:effectLst/>
-        </p:spPr>
-        <p:style>
-          <a:lnRef idx="1">
-            <a:schemeClr val="accent4"/>
-          </a:lnRef>
-          <a:fillRef idx="2">
-            <a:schemeClr val="accent4"/>
-          </a:fillRef>
-          <a:effectRef idx="1">
-            <a:schemeClr val="accent4"/>
-          </a:effectRef>
-          <a:fontRef idx="minor">
-            <a:schemeClr val="dk1"/>
-          </a:fontRef>
-        </p:style>
-        <p:txBody>
-          <a:bodyPr rtlCol="0" anchor="ctr"/>
-          <a:lstStyle/>
-          <a:p>
-            <a:pPr algn="ctr"/>
-            <a:r>
-              <a:rPr lang="en-US" sz="1050" dirty="0">
-                <a:solidFill>
-                  <a:srgbClr val="7030A0"/>
-                </a:solidFill>
-              </a:rPr>
-              <a:t>Address</a:t>
-            </a:r>
-            <a:endParaRPr lang="en-SG" sz="1050" dirty="0">
-              <a:solidFill>
-                <a:srgbClr val="7030A0"/>
-              </a:solidFill>
-            </a:endParaRPr>
-          </a:p>
-        </p:txBody>
-      </p:sp>
-      <p:cxnSp>
-        <p:nvCxnSpPr>
-          <p:cNvPr id="29" name="Elbow Connector 85">
-            <a:extLst>
-              <a:ext uri="{FF2B5EF4-FFF2-40B4-BE49-F238E27FC236}">
-                <a16:creationId xmlns:a16="http://schemas.microsoft.com/office/drawing/2014/main" id="{C3F39357-D919-4091-9F83-31EC760EF2DB}"/>
-              </a:ext>
-            </a:extLst>
-          </p:cNvPr>
-          <p:cNvCxnSpPr>
-            <a:stCxn id="22" idx="3"/>
-            <a:endCxn id="28" idx="1"/>
-          </p:cNvCxnSpPr>
-          <p:nvPr/>
-        </p:nvCxnSpPr>
-        <p:spPr>
-          <a:xfrm>
-            <a:off x="7277995" y="3034891"/>
-            <a:ext cx="434402" cy="641172"/>
-          </a:xfrm>
-          <a:prstGeom prst="bentConnector3">
-            <a:avLst/>
-          </a:prstGeom>
-          <a:ln w="19050">
-            <a:solidFill>
-              <a:srgbClr val="7030A0"/>
-            </a:solidFill>
-            <a:headEnd type="none" w="med" len="med"/>
-            <a:tailEnd type="arrow" w="med" len="med"/>
-          </a:ln>
-          <a:effectLst/>
-        </p:spPr>
-        <p:style>
-          <a:lnRef idx="1">
-            <a:schemeClr val="accent2"/>
-          </a:lnRef>
-          <a:fillRef idx="2">
-            <a:schemeClr val="accent2"/>
-          </a:fillRef>
-          <a:effectRef idx="1">
-            <a:schemeClr val="accent2"/>
-          </a:effectRef>
-          <a:fontRef idx="minor">
-            <a:schemeClr val="dk1"/>
-          </a:fontRef>
-        </p:style>
-      </p:cxnSp>
-      <p:sp>
-        <p:nvSpPr>
-          <p:cNvPr id="30" name="TextBox 29">
-            <a:extLst>
-              <a:ext uri="{FF2B5EF4-FFF2-40B4-BE49-F238E27FC236}">
-                <a16:creationId xmlns:a16="http://schemas.microsoft.com/office/drawing/2014/main" id="{AFA87473-863F-4733-996E-1F5EABBDBF38}"/>
-              </a:ext>
-            </a:extLst>
-          </p:cNvPr>
-          <p:cNvSpPr txBox="1"/>
-          <p:nvPr/>
-        </p:nvSpPr>
-        <p:spPr>
-          <a:xfrm rot="16200000">
-            <a:off x="6362886" y="3586305"/>
-            <a:ext cx="881018" cy="261610"/>
-          </a:xfrm>
-          <a:prstGeom prst="rect">
-            <a:avLst/>
-          </a:prstGeom>
-          <a:noFill/>
-        </p:spPr>
-        <p:txBody>
-          <a:bodyPr wrap="square" rtlCol="0">
-            <a:spAutoFit/>
-          </a:bodyPr>
-          <a:lstStyle/>
-          <a:p>
-            <a:pPr algn="r"/>
-            <a:r>
-              <a:rPr lang="en-US" sz="1100" dirty="0">
-                <a:solidFill>
-                  <a:srgbClr val="7030A0"/>
-                </a:solidFill>
-              </a:rPr>
-              <a:t>filtered list</a:t>
-            </a:r>
-            <a:endParaRPr lang="en-SG" sz="1100" dirty="0">
-              <a:solidFill>
-                <a:srgbClr val="7030A0"/>
-              </a:solidFill>
-            </a:endParaRPr>
-          </a:p>
-        </p:txBody>
-      </p:sp>
-      <p:sp>
-        <p:nvSpPr>
-          <p:cNvPr id="31" name="Rectangle 8">
-            <a:extLst>
-              <a:ext uri="{FF2B5EF4-FFF2-40B4-BE49-F238E27FC236}">
-                <a16:creationId xmlns:a16="http://schemas.microsoft.com/office/drawing/2014/main" id="{61C325A6-D937-4FDE-AF9C-636FDD0323F3}"/>
-              </a:ext>
-            </a:extLst>
-          </p:cNvPr>
-          <p:cNvSpPr/>
-          <p:nvPr/>
-        </p:nvSpPr>
-        <p:spPr>
-          <a:xfrm>
-            <a:off x="2057401" y="4239491"/>
-            <a:ext cx="1066800" cy="346760"/>
-          </a:xfrm>
-          <a:prstGeom prst="rect">
-            <a:avLst/>
-          </a:prstGeom>
-          <a:ln w="19050">
-            <a:solidFill>
-              <a:srgbClr val="7030A0"/>
-            </a:solidFill>
-          </a:ln>
-          <a:effectLst/>
-        </p:spPr>
-        <p:style>
-          <a:lnRef idx="1">
-            <a:schemeClr val="accent4"/>
-          </a:lnRef>
-          <a:fillRef idx="2">
-            <a:schemeClr val="accent4"/>
-          </a:fillRef>
-          <a:effectRef idx="1">
-            <a:schemeClr val="accent4"/>
-          </a:effectRef>
-          <a:fontRef idx="minor">
-            <a:schemeClr val="dk1"/>
-          </a:fontRef>
-        </p:style>
-        <p:txBody>
-          <a:bodyPr rtlCol="0" anchor="ctr"/>
-          <a:lstStyle/>
-          <a:p>
-            <a:pPr algn="ctr"/>
-            <a:r>
-              <a:rPr lang="en-US" sz="1050" dirty="0">
-                <a:solidFill>
-                  <a:srgbClr val="7030A0"/>
-                </a:solidFill>
-              </a:rPr>
-              <a:t>&lt;&lt;interface&gt;&gt;</a:t>
-            </a:r>
-            <a:br>
-              <a:rPr lang="en-US" sz="1050" dirty="0">
-                <a:solidFill>
-                  <a:srgbClr val="7030A0"/>
-                </a:solidFill>
-              </a:rPr>
-            </a:br>
-            <a:r>
-              <a:rPr lang="en-US" sz="1050" dirty="0">
-                <a:solidFill>
-                  <a:srgbClr val="7030A0"/>
-                </a:solidFill>
-              </a:rPr>
-              <a:t>ObservableList</a:t>
-            </a:r>
-            <a:endParaRPr lang="en-SG" sz="1050" dirty="0">
-              <a:solidFill>
-                <a:srgbClr val="7030A0"/>
-              </a:solidFill>
-            </a:endParaRPr>
-          </a:p>
-        </p:txBody>
-      </p:sp>
-      <p:cxnSp>
-        <p:nvCxnSpPr>
-          <p:cNvPr id="32" name="Elbow Connector 122">
-            <a:extLst>
-              <a:ext uri="{FF2B5EF4-FFF2-40B4-BE49-F238E27FC236}">
-                <a16:creationId xmlns:a16="http://schemas.microsoft.com/office/drawing/2014/main" id="{87C000AC-3505-4D96-AF66-861F5CD48AF6}"/>
-              </a:ext>
-            </a:extLst>
-          </p:cNvPr>
-          <p:cNvCxnSpPr>
-            <a:stCxn id="6" idx="1"/>
-            <a:endCxn id="31" idx="1"/>
-          </p:cNvCxnSpPr>
-          <p:nvPr/>
-        </p:nvCxnSpPr>
-        <p:spPr>
-          <a:xfrm rot="16200000" flipH="1">
-            <a:off x="1364475" y="3719944"/>
-            <a:ext cx="831471" cy="554381"/>
-          </a:xfrm>
-          <a:prstGeom prst="bentConnector2">
-            <a:avLst/>
-          </a:prstGeom>
-          <a:ln w="19050">
-            <a:solidFill>
-              <a:srgbClr val="7030A0"/>
-            </a:solidFill>
-            <a:prstDash val="sysDot"/>
-            <a:headEnd type="none" w="med" len="med"/>
-            <a:tailEnd type="arrow" w="med" len="med"/>
-          </a:ln>
-          <a:effectLst/>
-        </p:spPr>
-        <p:style>
-          <a:lnRef idx="1">
-            <a:schemeClr val="accent2"/>
-          </a:lnRef>
-          <a:fillRef idx="2">
-            <a:schemeClr val="accent2"/>
-          </a:fillRef>
-          <a:effectRef idx="1">
-            <a:schemeClr val="accent2"/>
-          </a:effectRef>
-          <a:fontRef idx="minor">
-            <a:schemeClr val="dk1"/>
-          </a:fontRef>
-        </p:style>
-      </p:cxnSp>
-      <p:sp>
-        <p:nvSpPr>
-          <p:cNvPr id="33" name="TextBox 32">
-            <a:extLst>
-              <a:ext uri="{FF2B5EF4-FFF2-40B4-BE49-F238E27FC236}">
-                <a16:creationId xmlns:a16="http://schemas.microsoft.com/office/drawing/2014/main" id="{26AA4354-D2C1-4946-9339-D96CF84F730D}"/>
-              </a:ext>
-            </a:extLst>
-          </p:cNvPr>
-          <p:cNvSpPr txBox="1"/>
-          <p:nvPr/>
-        </p:nvSpPr>
-        <p:spPr>
-          <a:xfrm>
-            <a:off x="4324972" y="3058864"/>
-            <a:ext cx="189257" cy="178683"/>
-          </a:xfrm>
-          <a:prstGeom prst="rect">
-            <a:avLst/>
-          </a:prstGeom>
-          <a:noFill/>
-        </p:spPr>
-        <p:txBody>
-          <a:bodyPr wrap="square" lIns="0" tIns="0" rIns="0" bIns="0" rtlCol="0">
-            <a:noAutofit/>
-          </a:bodyPr>
-          <a:lstStyle/>
-          <a:p>
-            <a:pPr algn="ctr"/>
-            <a:r>
-              <a:rPr lang="en-US" sz="1100" dirty="0">
-                <a:solidFill>
-                  <a:srgbClr val="7030A0"/>
-                </a:solidFill>
-              </a:rPr>
-              <a:t>1</a:t>
-            </a:r>
-            <a:endParaRPr lang="en-SG" sz="1100" dirty="0">
-              <a:solidFill>
-                <a:srgbClr val="7030A0"/>
-              </a:solidFill>
-            </a:endParaRPr>
-          </a:p>
-        </p:txBody>
-      </p:sp>
-      <p:sp>
-        <p:nvSpPr>
-          <p:cNvPr id="34" name="TextBox 33">
-            <a:extLst>
-              <a:ext uri="{FF2B5EF4-FFF2-40B4-BE49-F238E27FC236}">
-                <a16:creationId xmlns:a16="http://schemas.microsoft.com/office/drawing/2014/main" id="{0E18D663-2564-4AD7-9189-FA5EC0D7FE54}"/>
-              </a:ext>
-            </a:extLst>
-          </p:cNvPr>
-          <p:cNvSpPr txBox="1"/>
-          <p:nvPr/>
-        </p:nvSpPr>
-        <p:spPr>
-          <a:xfrm>
-            <a:off x="6135256" y="3097917"/>
-            <a:ext cx="189257" cy="178683"/>
-          </a:xfrm>
-          <a:prstGeom prst="rect">
-            <a:avLst/>
-          </a:prstGeom>
-          <a:noFill/>
-        </p:spPr>
-        <p:txBody>
-          <a:bodyPr wrap="square" lIns="0" tIns="0" rIns="0" bIns="0" rtlCol="0">
-            <a:noAutofit/>
-          </a:bodyPr>
-          <a:lstStyle/>
-          <a:p>
-            <a:pPr algn="ctr"/>
-            <a:r>
-              <a:rPr lang="en-US" sz="1100" dirty="0">
-                <a:solidFill>
-                  <a:srgbClr val="7030A0"/>
-                </a:solidFill>
-              </a:rPr>
-              <a:t>*</a:t>
-            </a:r>
-            <a:endParaRPr lang="en-SG" sz="1100" dirty="0">
-              <a:solidFill>
-                <a:srgbClr val="7030A0"/>
-              </a:solidFill>
-            </a:endParaRPr>
-          </a:p>
-        </p:txBody>
-      </p:sp>
-      <p:sp>
-        <p:nvSpPr>
-          <p:cNvPr id="35" name="TextBox 34">
-            <a:extLst>
-              <a:ext uri="{FF2B5EF4-FFF2-40B4-BE49-F238E27FC236}">
-                <a16:creationId xmlns:a16="http://schemas.microsoft.com/office/drawing/2014/main" id="{7D433395-843E-4020-B9A0-EC8CCA130E59}"/>
-              </a:ext>
-            </a:extLst>
-          </p:cNvPr>
-          <p:cNvSpPr txBox="1"/>
-          <p:nvPr/>
-        </p:nvSpPr>
-        <p:spPr>
-          <a:xfrm>
-            <a:off x="2560167" y="2753818"/>
-            <a:ext cx="78378" cy="193767"/>
-          </a:xfrm>
-          <a:prstGeom prst="rect">
-            <a:avLst/>
-          </a:prstGeom>
-          <a:noFill/>
-        </p:spPr>
-        <p:txBody>
-          <a:bodyPr wrap="square" lIns="0" tIns="0" rIns="0" bIns="0" rtlCol="0">
-            <a:noAutofit/>
-          </a:bodyPr>
-          <a:lstStyle/>
-          <a:p>
-            <a:pPr algn="ctr"/>
-            <a:r>
-              <a:rPr lang="en-US" sz="1100" dirty="0">
-                <a:solidFill>
-                  <a:srgbClr val="7030A0"/>
-                </a:solidFill>
-              </a:rPr>
-              <a:t>1</a:t>
-            </a:r>
-            <a:endParaRPr lang="en-SG" sz="1100" dirty="0">
-              <a:solidFill>
-                <a:srgbClr val="7030A0"/>
-              </a:solidFill>
-            </a:endParaRPr>
-          </a:p>
-        </p:txBody>
-      </p:sp>
-      <p:sp>
-        <p:nvSpPr>
-          <p:cNvPr id="36" name="TextBox 35">
-            <a:extLst>
-              <a:ext uri="{FF2B5EF4-FFF2-40B4-BE49-F238E27FC236}">
-                <a16:creationId xmlns:a16="http://schemas.microsoft.com/office/drawing/2014/main" id="{7C32C7C3-912A-4B84-ADAE-4639D57E9D35}"/>
-              </a:ext>
-            </a:extLst>
-          </p:cNvPr>
-          <p:cNvSpPr txBox="1"/>
-          <p:nvPr/>
-        </p:nvSpPr>
-        <p:spPr>
-          <a:xfrm>
-            <a:off x="2707070" y="3667737"/>
-            <a:ext cx="189257" cy="178683"/>
-          </a:xfrm>
-          <a:prstGeom prst="rect">
-            <a:avLst/>
-          </a:prstGeom>
-          <a:noFill/>
-        </p:spPr>
-        <p:txBody>
-          <a:bodyPr wrap="square" lIns="0" tIns="0" rIns="0" bIns="0" rtlCol="0">
-            <a:noAutofit/>
-          </a:bodyPr>
-          <a:lstStyle/>
-          <a:p>
-            <a:pPr algn="ctr"/>
-            <a:r>
-              <a:rPr lang="en-US" sz="1100" dirty="0">
-                <a:solidFill>
-                  <a:srgbClr val="7030A0"/>
-                </a:solidFill>
-              </a:rPr>
-              <a:t>1</a:t>
-            </a:r>
-            <a:endParaRPr lang="en-SG" sz="1100" dirty="0">
-              <a:solidFill>
-                <a:srgbClr val="7030A0"/>
-              </a:solidFill>
-            </a:endParaRPr>
-          </a:p>
-        </p:txBody>
-      </p:sp>
-      <p:sp>
-        <p:nvSpPr>
-          <p:cNvPr id="37" name="TextBox 36">
-            <a:extLst>
-              <a:ext uri="{FF2B5EF4-FFF2-40B4-BE49-F238E27FC236}">
-                <a16:creationId xmlns:a16="http://schemas.microsoft.com/office/drawing/2014/main" id="{E99D107F-551A-4269-B8AA-F17880F36171}"/>
-              </a:ext>
-            </a:extLst>
-          </p:cNvPr>
-          <p:cNvSpPr txBox="1"/>
-          <p:nvPr/>
-        </p:nvSpPr>
-        <p:spPr>
-          <a:xfrm>
-            <a:off x="6449896" y="3204826"/>
-            <a:ext cx="189257" cy="178683"/>
-          </a:xfrm>
-          <a:prstGeom prst="rect">
-            <a:avLst/>
-          </a:prstGeom>
-          <a:noFill/>
-        </p:spPr>
-        <p:txBody>
-          <a:bodyPr wrap="square" lIns="0" tIns="0" rIns="0" bIns="0" rtlCol="0">
-            <a:noAutofit/>
-          </a:bodyPr>
-          <a:lstStyle/>
-          <a:p>
-            <a:pPr algn="ctr"/>
-            <a:r>
-              <a:rPr lang="en-US" sz="1100" dirty="0">
-                <a:solidFill>
-                  <a:srgbClr val="7030A0"/>
-                </a:solidFill>
-              </a:rPr>
-              <a:t>1</a:t>
-            </a:r>
-            <a:endParaRPr lang="en-SG" sz="1100" dirty="0">
-              <a:solidFill>
-                <a:srgbClr val="7030A0"/>
-              </a:solidFill>
-            </a:endParaRPr>
-          </a:p>
-        </p:txBody>
-      </p:sp>
-      <p:sp>
-        <p:nvSpPr>
-          <p:cNvPr id="38" name="Rectangle 8">
-            <a:extLst>
-              <a:ext uri="{FF2B5EF4-FFF2-40B4-BE49-F238E27FC236}">
-                <a16:creationId xmlns:a16="http://schemas.microsoft.com/office/drawing/2014/main" id="{0C66B7F7-7B4D-420A-BF3E-4714CF7CB222}"/>
-              </a:ext>
-            </a:extLst>
-          </p:cNvPr>
-          <p:cNvSpPr/>
-          <p:nvPr/>
-        </p:nvSpPr>
-        <p:spPr>
-          <a:xfrm>
-            <a:off x="4755872" y="2206861"/>
-            <a:ext cx="1156969" cy="285783"/>
-          </a:xfrm>
-          <a:prstGeom prst="rect">
-            <a:avLst/>
-          </a:prstGeom>
-          <a:ln w="19050">
-            <a:solidFill>
-              <a:srgbClr val="7030A0"/>
-            </a:solidFill>
-          </a:ln>
-          <a:effectLst/>
-        </p:spPr>
-        <p:style>
-          <a:lnRef idx="1">
-            <a:schemeClr val="accent4"/>
-          </a:lnRef>
-          <a:fillRef idx="2">
-            <a:schemeClr val="accent4"/>
-          </a:fillRef>
-          <a:effectRef idx="1">
-            <a:schemeClr val="accent4"/>
-          </a:effectRef>
-          <a:fontRef idx="minor">
-            <a:schemeClr val="dk1"/>
-          </a:fontRef>
-        </p:style>
-        <p:txBody>
-          <a:bodyPr rtlCol="0" anchor="ctr"/>
-          <a:lstStyle/>
-          <a:p>
-            <a:pPr algn="ctr"/>
-            <a:r>
-              <a:rPr lang="en-US" sz="1050" dirty="0">
-                <a:solidFill>
-                  <a:srgbClr val="7030A0"/>
-                </a:solidFill>
-              </a:rPr>
-              <a:t>UniqueTagList</a:t>
-            </a:r>
-            <a:endParaRPr lang="en-SG" sz="1050" dirty="0">
-              <a:solidFill>
-                <a:srgbClr val="7030A0"/>
-              </a:solidFill>
-            </a:endParaRPr>
-          </a:p>
-        </p:txBody>
-      </p:sp>
-      <p:cxnSp>
-        <p:nvCxnSpPr>
-          <p:cNvPr id="39" name="Elbow Connector 78">
-            <a:extLst>
-              <a:ext uri="{FF2B5EF4-FFF2-40B4-BE49-F238E27FC236}">
-                <a16:creationId xmlns:a16="http://schemas.microsoft.com/office/drawing/2014/main" id="{57069F9B-9DE3-4AB7-9076-C34C8806B58C}"/>
-              </a:ext>
-            </a:extLst>
-          </p:cNvPr>
-          <p:cNvCxnSpPr>
-            <a:cxnSpLocks/>
-            <a:stCxn id="33" idx="0"/>
-            <a:endCxn id="38" idx="1"/>
-          </p:cNvCxnSpPr>
-          <p:nvPr/>
-        </p:nvCxnSpPr>
-        <p:spPr>
-          <a:xfrm rot="5400000" flipH="1" flipV="1">
-            <a:off x="4233181" y="2536174"/>
-            <a:ext cx="709111" cy="336271"/>
-          </a:xfrm>
-          <a:prstGeom prst="bentConnector2">
-            <a:avLst/>
-          </a:prstGeom>
-          <a:ln w="19050">
-            <a:solidFill>
-              <a:srgbClr val="7030A0"/>
-            </a:solidFill>
-            <a:headEnd type="none" w="med" len="med"/>
-            <a:tailEnd type="arrow" w="med" len="med"/>
-          </a:ln>
-          <a:effectLst/>
-        </p:spPr>
-        <p:style>
-          <a:lnRef idx="1">
-            <a:schemeClr val="accent2"/>
-          </a:lnRef>
-          <a:fillRef idx="2">
-            <a:schemeClr val="accent2"/>
-          </a:fillRef>
-          <a:effectRef idx="1">
-            <a:schemeClr val="accent2"/>
-          </a:effectRef>
-          <a:fontRef idx="minor">
-            <a:schemeClr val="dk1"/>
-          </a:fontRef>
-        </p:style>
-      </p:cxnSp>
-      <p:sp>
-        <p:nvSpPr>
-          <p:cNvPr id="40" name="TextBox 39">
-            <a:extLst>
-              <a:ext uri="{FF2B5EF4-FFF2-40B4-BE49-F238E27FC236}">
-                <a16:creationId xmlns:a16="http://schemas.microsoft.com/office/drawing/2014/main" id="{65C79A6C-BE35-4803-8E9C-B5DFCFB4E3BF}"/>
-              </a:ext>
-            </a:extLst>
-          </p:cNvPr>
-          <p:cNvSpPr txBox="1"/>
-          <p:nvPr/>
-        </p:nvSpPr>
-        <p:spPr>
-          <a:xfrm>
-            <a:off x="6714344" y="2430721"/>
-            <a:ext cx="189257" cy="178683"/>
-          </a:xfrm>
-          <a:prstGeom prst="rect">
-            <a:avLst/>
-          </a:prstGeom>
-          <a:noFill/>
-        </p:spPr>
-        <p:txBody>
-          <a:bodyPr wrap="square" lIns="0" tIns="0" rIns="0" bIns="0" rtlCol="0">
-            <a:noAutofit/>
-          </a:bodyPr>
-          <a:lstStyle/>
-          <a:p>
-            <a:pPr algn="ctr"/>
-            <a:r>
-              <a:rPr lang="en-US" sz="1100" dirty="0">
-                <a:solidFill>
-                  <a:srgbClr val="7030A0"/>
-                </a:solidFill>
-              </a:rPr>
-              <a:t>*</a:t>
-            </a:r>
-            <a:endParaRPr lang="en-SG" sz="1100" dirty="0">
-              <a:solidFill>
-                <a:srgbClr val="7030A0"/>
-              </a:solidFill>
-            </a:endParaRPr>
-          </a:p>
-        </p:txBody>
-      </p:sp>
-      <p:sp>
-        <p:nvSpPr>
-          <p:cNvPr id="41" name="Flowchart: Decision 96">
-            <a:extLst>
-              <a:ext uri="{FF2B5EF4-FFF2-40B4-BE49-F238E27FC236}">
-                <a16:creationId xmlns:a16="http://schemas.microsoft.com/office/drawing/2014/main" id="{E586A4AC-49C1-410C-AA67-06362102177B}"/>
-              </a:ext>
-            </a:extLst>
-          </p:cNvPr>
-          <p:cNvSpPr/>
-          <p:nvPr/>
-        </p:nvSpPr>
-        <p:spPr>
-          <a:xfrm rot="16200000">
-            <a:off x="6553482" y="2664721"/>
-            <a:ext cx="236048" cy="173380"/>
-          </a:xfrm>
-          <a:prstGeom prst="flowChartDecision">
-            <a:avLst/>
-          </a:prstGeom>
-          <a:noFill/>
-          <a:ln w="19050">
-            <a:solidFill>
-              <a:srgbClr val="7030A0"/>
-            </a:solidFill>
-          </a:ln>
-          <a:effectLst/>
-        </p:spPr>
-        <p:style>
-          <a:lnRef idx="1">
-            <a:schemeClr val="accent6"/>
-          </a:lnRef>
-          <a:fillRef idx="2">
-            <a:schemeClr val="accent6"/>
-          </a:fillRef>
-          <a:effectRef idx="1">
-            <a:schemeClr val="accent6"/>
-          </a:effectRef>
-          <a:fontRef idx="minor">
-            <a:schemeClr val="dk1"/>
-          </a:fontRef>
-        </p:style>
-        <p:txBody>
-          <a:bodyPr rtlCol="0" anchor="ctr"/>
-          <a:lstStyle/>
-          <a:p>
-            <a:pPr algn="ctr"/>
-            <a:endParaRPr lang="en-US" sz="1050"/>
-          </a:p>
-        </p:txBody>
-      </p:sp>
-      <p:cxnSp>
-        <p:nvCxnSpPr>
-          <p:cNvPr id="42" name="Elbow Connector 63">
-            <a:extLst>
-              <a:ext uri="{FF2B5EF4-FFF2-40B4-BE49-F238E27FC236}">
-                <a16:creationId xmlns:a16="http://schemas.microsoft.com/office/drawing/2014/main" id="{7A48DD0C-0F0C-447C-A444-9D3A771C3C21}"/>
-              </a:ext>
-            </a:extLst>
-          </p:cNvPr>
-          <p:cNvCxnSpPr>
-            <a:cxnSpLocks/>
-            <a:endCxn id="43" idx="1"/>
-          </p:cNvCxnSpPr>
-          <p:nvPr/>
-        </p:nvCxnSpPr>
-        <p:spPr>
-          <a:xfrm flipV="1">
-            <a:off x="5884280" y="2233006"/>
-            <a:ext cx="432916" cy="111294"/>
-          </a:xfrm>
-          <a:prstGeom prst="bentConnector3">
-            <a:avLst/>
-          </a:prstGeom>
-          <a:ln w="19050">
-            <a:solidFill>
-              <a:srgbClr val="7030A0"/>
-            </a:solidFill>
-            <a:headEnd type="none" w="med" len="med"/>
-            <a:tailEnd type="arrow" w="med" len="med"/>
-          </a:ln>
-          <a:effectLst/>
-        </p:spPr>
-        <p:style>
-          <a:lnRef idx="1">
-            <a:schemeClr val="accent2"/>
-          </a:lnRef>
-          <a:fillRef idx="2">
-            <a:schemeClr val="accent2"/>
-          </a:fillRef>
-          <a:effectRef idx="1">
-            <a:schemeClr val="accent2"/>
-          </a:effectRef>
-          <a:fontRef idx="minor">
-            <a:schemeClr val="dk1"/>
-          </a:fontRef>
-        </p:style>
-      </p:cxnSp>
-      <p:sp>
-        <p:nvSpPr>
-          <p:cNvPr id="43" name="Rectangle 8">
-            <a:extLst>
-              <a:ext uri="{FF2B5EF4-FFF2-40B4-BE49-F238E27FC236}">
-                <a16:creationId xmlns:a16="http://schemas.microsoft.com/office/drawing/2014/main" id="{54391EFD-02A8-4125-8C98-B00968256FE5}"/>
-              </a:ext>
-            </a:extLst>
-          </p:cNvPr>
-          <p:cNvSpPr/>
-          <p:nvPr/>
-        </p:nvSpPr>
-        <p:spPr>
-          <a:xfrm>
-            <a:off x="6317196" y="2059626"/>
-            <a:ext cx="708186" cy="346760"/>
-          </a:xfrm>
-          <a:prstGeom prst="rect">
-            <a:avLst/>
-          </a:prstGeom>
-          <a:ln w="19050">
-            <a:solidFill>
-              <a:srgbClr val="7030A0"/>
-            </a:solidFill>
-          </a:ln>
-          <a:effectLst/>
-        </p:spPr>
-        <p:style>
-          <a:lnRef idx="1">
-            <a:schemeClr val="accent4"/>
-          </a:lnRef>
-          <a:fillRef idx="2">
-            <a:schemeClr val="accent4"/>
-          </a:fillRef>
-          <a:effectRef idx="1">
-            <a:schemeClr val="accent4"/>
-          </a:effectRef>
-          <a:fontRef idx="minor">
-            <a:schemeClr val="dk1"/>
-          </a:fontRef>
-        </p:style>
-        <p:txBody>
-          <a:bodyPr rtlCol="0" anchor="ctr"/>
-          <a:lstStyle/>
-          <a:p>
-            <a:pPr algn="ctr"/>
-            <a:r>
-              <a:rPr lang="en-US" sz="1050" dirty="0">
-                <a:solidFill>
-                  <a:srgbClr val="7030A0"/>
-                </a:solidFill>
-              </a:rPr>
-              <a:t>Tag</a:t>
-            </a:r>
-            <a:endParaRPr lang="en-SG" sz="1050" dirty="0">
-              <a:solidFill>
-                <a:srgbClr val="7030A0"/>
-              </a:solidFill>
-            </a:endParaRPr>
-          </a:p>
-        </p:txBody>
-      </p:sp>
-      <p:sp>
-        <p:nvSpPr>
-          <p:cNvPr id="44" name="TextBox 43">
-            <a:extLst>
-              <a:ext uri="{FF2B5EF4-FFF2-40B4-BE49-F238E27FC236}">
-                <a16:creationId xmlns:a16="http://schemas.microsoft.com/office/drawing/2014/main" id="{9DF39569-2526-42CD-B55F-8B7A2886A65A}"/>
-              </a:ext>
-            </a:extLst>
-          </p:cNvPr>
-          <p:cNvSpPr txBox="1"/>
-          <p:nvPr/>
-        </p:nvSpPr>
-        <p:spPr>
-          <a:xfrm>
-            <a:off x="6135256" y="2278014"/>
-            <a:ext cx="189257" cy="178683"/>
-          </a:xfrm>
-          <a:prstGeom prst="rect">
-            <a:avLst/>
-          </a:prstGeom>
-          <a:noFill/>
-        </p:spPr>
-        <p:txBody>
-          <a:bodyPr wrap="square" lIns="0" tIns="0" rIns="0" bIns="0" rtlCol="0">
-            <a:noAutofit/>
-          </a:bodyPr>
-          <a:lstStyle/>
-          <a:p>
-            <a:pPr algn="ctr"/>
-            <a:r>
-              <a:rPr lang="en-US" sz="1100" dirty="0">
-                <a:solidFill>
-                  <a:srgbClr val="7030A0"/>
-                </a:solidFill>
-              </a:rPr>
-              <a:t>*</a:t>
-            </a:r>
-            <a:endParaRPr lang="en-SG" sz="1100" dirty="0">
-              <a:solidFill>
-                <a:srgbClr val="7030A0"/>
-              </a:solidFill>
-            </a:endParaRPr>
-          </a:p>
-        </p:txBody>
-      </p:sp>
-      <p:sp>
-        <p:nvSpPr>
-          <p:cNvPr id="45" name="TextBox 44">
-            <a:extLst>
-              <a:ext uri="{FF2B5EF4-FFF2-40B4-BE49-F238E27FC236}">
-                <a16:creationId xmlns:a16="http://schemas.microsoft.com/office/drawing/2014/main" id="{E7A5E593-C0ED-48C1-B72B-61B49E03FF82}"/>
-              </a:ext>
-            </a:extLst>
-          </p:cNvPr>
-          <p:cNvSpPr txBox="1"/>
-          <p:nvPr/>
-        </p:nvSpPr>
-        <p:spPr>
-          <a:xfrm>
-            <a:off x="4367100" y="2172972"/>
-            <a:ext cx="189257" cy="178683"/>
-          </a:xfrm>
-          <a:prstGeom prst="rect">
-            <a:avLst/>
-          </a:prstGeom>
-          <a:noFill/>
-        </p:spPr>
-        <p:txBody>
-          <a:bodyPr wrap="square" lIns="0" tIns="0" rIns="0" bIns="0" rtlCol="0">
-            <a:noAutofit/>
-          </a:bodyPr>
-          <a:lstStyle/>
-          <a:p>
-            <a:pPr algn="ctr"/>
-            <a:r>
-              <a:rPr lang="en-US" sz="1100" dirty="0">
-                <a:solidFill>
-                  <a:srgbClr val="7030A0"/>
-                </a:solidFill>
-              </a:rPr>
-              <a:t>1</a:t>
-            </a:r>
-            <a:endParaRPr lang="en-SG" sz="1100" dirty="0">
-              <a:solidFill>
-                <a:srgbClr val="7030A0"/>
-              </a:solidFill>
-            </a:endParaRPr>
-          </a:p>
-        </p:txBody>
-      </p:sp>
-      <p:sp>
-        <p:nvSpPr>
-          <p:cNvPr id="46" name="Flowchart: Decision 96">
-            <a:extLst>
-              <a:ext uri="{FF2B5EF4-FFF2-40B4-BE49-F238E27FC236}">
-                <a16:creationId xmlns:a16="http://schemas.microsoft.com/office/drawing/2014/main" id="{8B00B43A-8B36-4F0F-8480-909195835469}"/>
-              </a:ext>
-            </a:extLst>
-          </p:cNvPr>
-          <p:cNvSpPr/>
-          <p:nvPr/>
-        </p:nvSpPr>
-        <p:spPr>
-          <a:xfrm>
-            <a:off x="5911329" y="2262081"/>
-            <a:ext cx="236048" cy="173380"/>
-          </a:xfrm>
-          <a:prstGeom prst="flowChartDecision">
-            <a:avLst/>
-          </a:prstGeom>
-          <a:solidFill>
-            <a:srgbClr val="7030A0"/>
-          </a:solidFill>
-          <a:ln w="19050">
-            <a:solidFill>
-              <a:srgbClr val="7030A0"/>
-            </a:solidFill>
-          </a:ln>
-          <a:effectLst/>
-        </p:spPr>
-        <p:style>
-          <a:lnRef idx="1">
-            <a:schemeClr val="accent6"/>
-          </a:lnRef>
-          <a:fillRef idx="2">
-            <a:schemeClr val="accent6"/>
-          </a:fillRef>
-          <a:effectRef idx="1">
-            <a:schemeClr val="accent6"/>
-          </a:effectRef>
-          <a:fontRef idx="minor">
-            <a:schemeClr val="dk1"/>
-          </a:fontRef>
-        </p:style>
-        <p:txBody>
-          <a:bodyPr rtlCol="0" anchor="ctr"/>
-          <a:lstStyle/>
-          <a:p>
-            <a:pPr algn="ctr"/>
-            <a:endParaRPr lang="en-US" sz="1050"/>
-          </a:p>
-        </p:txBody>
-      </p:sp>
-      <p:cxnSp>
-        <p:nvCxnSpPr>
-          <p:cNvPr id="47" name="Elbow Connector 78">
-            <a:extLst>
-              <a:ext uri="{FF2B5EF4-FFF2-40B4-BE49-F238E27FC236}">
-                <a16:creationId xmlns:a16="http://schemas.microsoft.com/office/drawing/2014/main" id="{994165BC-7A67-499C-B431-9785E40BF6B4}"/>
-              </a:ext>
-            </a:extLst>
-          </p:cNvPr>
-          <p:cNvCxnSpPr>
-            <a:cxnSpLocks/>
-            <a:stCxn id="41" idx="3"/>
-            <a:endCxn id="43" idx="2"/>
-          </p:cNvCxnSpPr>
-          <p:nvPr/>
-        </p:nvCxnSpPr>
-        <p:spPr>
-          <a:xfrm rot="16200000" flipV="1">
-            <a:off x="6557898" y="2519778"/>
-            <a:ext cx="227001" cy="217"/>
-          </a:xfrm>
-          <a:prstGeom prst="bentConnector3">
-            <a:avLst>
-              <a:gd name="adj1" fmla="val 50000"/>
-            </a:avLst>
-          </a:prstGeom>
-          <a:ln w="19050">
-            <a:solidFill>
-              <a:srgbClr val="7030A0"/>
-            </a:solidFill>
-            <a:headEnd type="none" w="med" len="med"/>
-            <a:tailEnd type="arrow" w="med" len="med"/>
-          </a:ln>
-          <a:effectLst/>
-        </p:spPr>
-        <p:style>
-          <a:lnRef idx="1">
-            <a:schemeClr val="accent2"/>
-          </a:lnRef>
-          <a:fillRef idx="2">
-            <a:schemeClr val="accent2"/>
-          </a:fillRef>
-          <a:effectRef idx="1">
-            <a:schemeClr val="accent2"/>
-          </a:effectRef>
-          <a:fontRef idx="minor">
-            <a:schemeClr val="dk1"/>
-          </a:fontRef>
-        </p:style>
-      </p:cxnSp>
-      <p:cxnSp>
-        <p:nvCxnSpPr>
-          <p:cNvPr id="48" name="Elbow Connector 63">
-            <a:extLst>
-              <a:ext uri="{FF2B5EF4-FFF2-40B4-BE49-F238E27FC236}">
-                <a16:creationId xmlns:a16="http://schemas.microsoft.com/office/drawing/2014/main" id="{7EB1B0EE-0E5F-4F8F-980A-7EEE5A87C992}"/>
-              </a:ext>
-            </a:extLst>
-          </p:cNvPr>
-          <p:cNvCxnSpPr>
-            <a:stCxn id="49" idx="3"/>
-          </p:cNvCxnSpPr>
-          <p:nvPr/>
-        </p:nvCxnSpPr>
-        <p:spPr>
-          <a:xfrm rot="5400000">
-            <a:off x="3470636" y="2687353"/>
-            <a:ext cx="293825" cy="5938"/>
-          </a:xfrm>
-          <a:prstGeom prst="bentConnector3">
-            <a:avLst>
-              <a:gd name="adj1" fmla="val 50000"/>
-            </a:avLst>
-          </a:prstGeom>
-          <a:ln w="19050">
-            <a:solidFill>
-              <a:srgbClr val="7030A0"/>
-            </a:solidFill>
-            <a:prstDash val="sysDot"/>
-            <a:headEnd type="none" w="med" len="med"/>
-            <a:tailEnd type="none" w="med" len="med"/>
-          </a:ln>
-          <a:effectLst/>
-        </p:spPr>
-        <p:style>
-          <a:lnRef idx="1">
-            <a:schemeClr val="accent2"/>
-          </a:lnRef>
-          <a:fillRef idx="2">
-            <a:schemeClr val="accent2"/>
-          </a:fillRef>
-          <a:effectRef idx="1">
-            <a:schemeClr val="accent2"/>
-          </a:effectRef>
-          <a:fontRef idx="minor">
-            <a:schemeClr val="dk1"/>
-          </a:fontRef>
-        </p:style>
-      </p:cxnSp>
-      <p:sp>
-        <p:nvSpPr>
-          <p:cNvPr id="49" name="Isosceles Triangle 102">
-            <a:extLst>
-              <a:ext uri="{FF2B5EF4-FFF2-40B4-BE49-F238E27FC236}">
-                <a16:creationId xmlns:a16="http://schemas.microsoft.com/office/drawing/2014/main" id="{A5AA9AC6-2265-4FBE-993C-9C104039CECF}"/>
-              </a:ext>
-            </a:extLst>
-          </p:cNvPr>
-          <p:cNvSpPr/>
-          <p:nvPr/>
-        </p:nvSpPr>
-        <p:spPr>
-          <a:xfrm rot="10800000" flipV="1">
-            <a:off x="3479324" y="2386348"/>
-            <a:ext cx="282387" cy="157062"/>
-          </a:xfrm>
-          <a:prstGeom prst="triangle">
-            <a:avLst/>
-          </a:prstGeom>
-          <a:ln w="19050">
-            <a:solidFill>
-              <a:srgbClr val="7030A0"/>
-            </a:solidFill>
-          </a:ln>
-          <a:effectLst/>
-        </p:spPr>
-        <p:style>
-          <a:lnRef idx="1">
-            <a:schemeClr val="accent4"/>
-          </a:lnRef>
-          <a:fillRef idx="2">
-            <a:schemeClr val="accent4"/>
-          </a:fillRef>
-          <a:effectRef idx="1">
-            <a:schemeClr val="accent4"/>
-          </a:effectRef>
-          <a:fontRef idx="minor">
-            <a:schemeClr val="dk1"/>
-          </a:fontRef>
-        </p:style>
-        <p:txBody>
-          <a:bodyPr rtlCol="0" anchor="ctr"/>
-          <a:lstStyle/>
-          <a:p>
-            <a:pPr algn="ctr"/>
-            <a:endParaRPr lang="en-SG" sz="1050" b="1">
-              <a:solidFill>
-                <a:srgbClr val="92D050"/>
-              </a:solidFill>
-            </a:endParaRPr>
-          </a:p>
-        </p:txBody>
-      </p:sp>
-      <p:sp>
-        <p:nvSpPr>
-          <p:cNvPr id="50" name="Rectangle 8">
-            <a:extLst>
-              <a:ext uri="{FF2B5EF4-FFF2-40B4-BE49-F238E27FC236}">
-                <a16:creationId xmlns:a16="http://schemas.microsoft.com/office/drawing/2014/main" id="{AB1DF68C-3489-499B-8721-53F2346A9CBF}"/>
-              </a:ext>
-            </a:extLst>
-          </p:cNvPr>
-          <p:cNvSpPr/>
-          <p:nvPr/>
-        </p:nvSpPr>
-        <p:spPr>
-          <a:xfrm>
-            <a:off x="1177947" y="1998144"/>
-            <a:ext cx="1443661" cy="364396"/>
-          </a:xfrm>
-          <a:prstGeom prst="rect">
-            <a:avLst/>
-          </a:prstGeom>
-          <a:ln w="19050">
-            <a:solidFill>
-              <a:srgbClr val="7030A0"/>
-            </a:solidFill>
-          </a:ln>
-          <a:effectLst/>
-        </p:spPr>
-        <p:style>
-          <a:lnRef idx="1">
-            <a:schemeClr val="accent4"/>
-          </a:lnRef>
-          <a:fillRef idx="2">
-            <a:schemeClr val="accent4"/>
-          </a:fillRef>
-          <a:effectRef idx="1">
-            <a:schemeClr val="accent4"/>
-          </a:effectRef>
-          <a:fontRef idx="minor">
-            <a:schemeClr val="dk1"/>
-          </a:fontRef>
-        </p:style>
-        <p:txBody>
-          <a:bodyPr rtlCol="0" anchor="ctr"/>
-          <a:lstStyle/>
-          <a:p>
-            <a:pPr algn="ctr"/>
-            <a:r>
-              <a:rPr lang="en-US" sz="1050" dirty="0">
-                <a:solidFill>
-                  <a:srgbClr val="7030A0"/>
-                </a:solidFill>
-              </a:rPr>
-              <a:t>&lt;&lt;interface&gt;&gt;</a:t>
-            </a:r>
-            <a:br>
-              <a:rPr lang="en-US" sz="1050" dirty="0">
-                <a:solidFill>
-                  <a:srgbClr val="7030A0"/>
-                </a:solidFill>
-              </a:rPr>
-            </a:br>
-            <a:r>
-              <a:rPr lang="en-US" sz="1050" dirty="0">
-                <a:solidFill>
-                  <a:srgbClr val="7030A0"/>
-                </a:solidFill>
-              </a:rPr>
-              <a:t>ReadOnlyAddressBook</a:t>
-            </a:r>
-            <a:endParaRPr lang="en-SG" sz="1050" dirty="0">
-              <a:solidFill>
-                <a:srgbClr val="7030A0"/>
-              </a:solidFill>
-            </a:endParaRPr>
-          </a:p>
-        </p:txBody>
-      </p:sp>
-      <p:sp>
-        <p:nvSpPr>
-          <p:cNvPr id="51" name="Rectangle 8">
-            <a:extLst>
-              <a:ext uri="{FF2B5EF4-FFF2-40B4-BE49-F238E27FC236}">
-                <a16:creationId xmlns:a16="http://schemas.microsoft.com/office/drawing/2014/main" id="{412DA21D-89CE-4A9F-B514-630BE0F188CF}"/>
-              </a:ext>
-            </a:extLst>
-          </p:cNvPr>
-          <p:cNvSpPr/>
-          <p:nvPr/>
-        </p:nvSpPr>
-        <p:spPr>
-          <a:xfrm>
-            <a:off x="3087206" y="1998144"/>
-            <a:ext cx="1060683" cy="364396"/>
-          </a:xfrm>
-          <a:prstGeom prst="rect">
-            <a:avLst/>
-          </a:prstGeom>
-          <a:ln w="19050">
-            <a:solidFill>
-              <a:srgbClr val="7030A0"/>
-            </a:solidFill>
-          </a:ln>
-          <a:effectLst/>
-        </p:spPr>
-        <p:style>
-          <a:lnRef idx="1">
-            <a:schemeClr val="accent4"/>
-          </a:lnRef>
-          <a:fillRef idx="2">
-            <a:schemeClr val="accent4"/>
-          </a:fillRef>
-          <a:effectRef idx="1">
-            <a:schemeClr val="accent4"/>
-          </a:effectRef>
-          <a:fontRef idx="minor">
-            <a:schemeClr val="dk1"/>
-          </a:fontRef>
-        </p:style>
-        <p:txBody>
-          <a:bodyPr rtlCol="0" anchor="ctr"/>
-          <a:lstStyle/>
-          <a:p>
-            <a:pPr algn="ctr"/>
-            <a:r>
-              <a:rPr lang="en-US" sz="1050" dirty="0" err="1">
-                <a:solidFill>
-                  <a:srgbClr val="7030A0"/>
-                </a:solidFill>
-              </a:rPr>
-              <a:t>AddressBook</a:t>
-            </a:r>
-            <a:endParaRPr lang="en-SG" sz="1050" dirty="0">
-              <a:solidFill>
-                <a:srgbClr val="7030A0"/>
-              </a:solidFill>
-            </a:endParaRPr>
-          </a:p>
-        </p:txBody>
-      </p:sp>
-      <p:sp>
-        <p:nvSpPr>
-          <p:cNvPr id="52" name="Isosceles Triangle 102">
-            <a:extLst>
-              <a:ext uri="{FF2B5EF4-FFF2-40B4-BE49-F238E27FC236}">
-                <a16:creationId xmlns:a16="http://schemas.microsoft.com/office/drawing/2014/main" id="{74F1CD6A-9A30-4491-9717-95EF2EDB06A9}"/>
-              </a:ext>
-            </a:extLst>
-          </p:cNvPr>
-          <p:cNvSpPr/>
-          <p:nvPr/>
-        </p:nvSpPr>
-        <p:spPr>
-          <a:xfrm rot="16200000">
-            <a:off x="2586098" y="2068952"/>
-            <a:ext cx="271014" cy="187417"/>
-          </a:xfrm>
-          <a:prstGeom prst="triangle">
-            <a:avLst>
-              <a:gd name="adj" fmla="val 44517"/>
-            </a:avLst>
-          </a:prstGeom>
-          <a:solidFill>
-            <a:schemeClr val="accent4">
-              <a:lumMod val="20000"/>
-              <a:lumOff val="80000"/>
-            </a:schemeClr>
-          </a:solidFill>
-          <a:ln w="19050">
-            <a:solidFill>
-              <a:srgbClr val="7030A0"/>
-            </a:solidFill>
-          </a:ln>
-          <a:effectLst/>
-        </p:spPr>
-        <p:style>
-          <a:lnRef idx="1">
-            <a:schemeClr val="accent6"/>
-          </a:lnRef>
-          <a:fillRef idx="2">
-            <a:schemeClr val="accent6"/>
-          </a:fillRef>
-          <a:effectRef idx="1">
-            <a:schemeClr val="accent6"/>
-          </a:effectRef>
-          <a:fontRef idx="minor">
-            <a:schemeClr val="dk1"/>
-          </a:fontRef>
-        </p:style>
-        <p:txBody>
-          <a:bodyPr rtlCol="0" anchor="ctr"/>
-          <a:lstStyle/>
-          <a:p>
-            <a:pPr algn="ctr"/>
-            <a:endParaRPr lang="en-SG" sz="1050"/>
-          </a:p>
-        </p:txBody>
-      </p:sp>
-      <p:cxnSp>
-        <p:nvCxnSpPr>
-          <p:cNvPr id="53" name="Elbow Connector 63">
-            <a:extLst>
-              <a:ext uri="{FF2B5EF4-FFF2-40B4-BE49-F238E27FC236}">
-                <a16:creationId xmlns:a16="http://schemas.microsoft.com/office/drawing/2014/main" id="{7DA4D18C-07A1-464C-8836-B08DFE4A3525}"/>
-              </a:ext>
-            </a:extLst>
-          </p:cNvPr>
-          <p:cNvCxnSpPr>
-            <a:stCxn id="52" idx="3"/>
-            <a:endCxn id="51" idx="1"/>
-          </p:cNvCxnSpPr>
-          <p:nvPr/>
-        </p:nvCxnSpPr>
-        <p:spPr>
-          <a:xfrm>
-            <a:off x="2815314" y="2177521"/>
-            <a:ext cx="271892" cy="2821"/>
-          </a:xfrm>
-          <a:prstGeom prst="bentConnector3">
-            <a:avLst>
-              <a:gd name="adj1" fmla="val 50000"/>
-            </a:avLst>
-          </a:prstGeom>
-          <a:ln w="19050">
-            <a:solidFill>
-              <a:srgbClr val="7030A0"/>
-            </a:solidFill>
-            <a:prstDash val="sysDot"/>
-            <a:headEnd type="none" w="med" len="med"/>
-            <a:tailEnd type="none" w="med" len="med"/>
-          </a:ln>
-          <a:effectLst/>
-        </p:spPr>
-        <p:style>
-          <a:lnRef idx="1">
-            <a:schemeClr val="accent2"/>
-          </a:lnRef>
-          <a:fillRef idx="2">
-            <a:schemeClr val="accent2"/>
-          </a:fillRef>
-          <a:effectRef idx="1">
-            <a:schemeClr val="accent2"/>
-          </a:effectRef>
-          <a:fontRef idx="minor">
-            <a:schemeClr val="dk1"/>
-          </a:fontRef>
-        </p:style>
-      </p:cxnSp>
-    </p:spTree>
-    <p:extLst>
-      <p:ext uri="{BB962C8B-B14F-4D97-AF65-F5344CB8AC3E}">
-        <p14:creationId xmlns:p14="http://schemas.microsoft.com/office/powerpoint/2010/main" val="2613544741"/>
-      </p:ext>
-    </p:extLst>
-  </p:cSld>
-  <p:clrMapOvr>
-    <a:masterClrMapping/>
-  </p:clrMapOvr>
-</p:sld>
-</file>
-
-<file path=ppt/slides/slide2.xml><?xml version="1.0" encoding="utf-8"?>
-<p:sld xmlns:a="http://schemas.openxmlformats.org/drawingml/2006/main" xmlns:r="http://schemas.openxmlformats.org/officeDocument/2006/relationships" xmlns:p="http://schemas.openxmlformats.org/presentationml/2006/main">
-  <p:cSld>
-    <p:spTree>
-      <p:nvGrpSpPr>
-        <p:cNvPr id="1" name=""/>
-        <p:cNvGrpSpPr/>
-        <p:nvPr/>
-      </p:nvGrpSpPr>
-      <p:grpSpPr>
-        <a:xfrm>
-          <a:off x="0" y="0"/>
-          <a:ext cx="0" cy="0"/>
-          <a:chOff x="0" y="0"/>
-          <a:chExt cx="0" cy="0"/>
-        </a:xfrm>
-      </p:grpSpPr>
-      <p:sp>
-        <p:nvSpPr>
           <p:cNvPr id="68" name="Rectangle 65">
             <a:extLst>
               <a:ext uri="{FF2B5EF4-FFF2-40B4-BE49-F238E27FC236}">
@@ -9383,7 +6469,7 @@
 </p:sld>
 </file>
 
-<file path=ppt/slides/slide3.xml><?xml version="1.0" encoding="utf-8"?>
+<file path=ppt/slides/slide2.xml><?xml version="1.0" encoding="utf-8"?>
 <p:sld xmlns:a="http://schemas.openxmlformats.org/drawingml/2006/main" xmlns:r="http://schemas.openxmlformats.org/officeDocument/2006/relationships" xmlns:p="http://schemas.openxmlformats.org/presentationml/2006/main">
   <p:cSld>
     <p:spTree>
@@ -10957,8 +8043,8 @@
           <p:nvPr/>
         </p:nvSpPr>
         <p:spPr>
-          <a:xfrm rot="16200000">
-            <a:off x="5395421" y="3205305"/>
+          <a:xfrm>
+            <a:off x="4876768" y="3388125"/>
             <a:ext cx="881018" cy="261610"/>
           </a:xfrm>
           <a:prstGeom prst="rect">
@@ -14433,8 +11519,8 @@
         </p:nvCxnSpPr>
         <p:spPr>
           <a:xfrm>
-            <a:off x="5852160" y="5349240"/>
-            <a:ext cx="687170" cy="2502"/>
+            <a:off x="5831672" y="5349240"/>
+            <a:ext cx="707658" cy="2502"/>
           </a:xfrm>
           <a:prstGeom prst="line">
             <a:avLst/>
@@ -14569,8 +11655,544 @@
         </p:nvSpPr>
         <p:spPr>
           <a:xfrm>
-            <a:off x="5845178" y="5023850"/>
-            <a:ext cx="189257" cy="178683"/>
+            <a:off x="5867400" y="5023850"/>
+            <a:ext cx="117514" cy="178683"/>
+          </a:xfrm>
+          <a:prstGeom prst="rect">
+            <a:avLst/>
+          </a:prstGeom>
+          <a:noFill/>
+        </p:spPr>
+        <p:txBody>
+          <a:bodyPr wrap="square" lIns="0" tIns="0" rIns="0" bIns="0" rtlCol="0">
+            <a:noAutofit/>
+          </a:bodyPr>
+          <a:lstStyle/>
+          <a:p>
+            <a:pPr algn="ctr"/>
+            <a:r>
+              <a:rPr lang="en-US" sz="1100" dirty="0">
+                <a:solidFill>
+                  <a:srgbClr val="7030A0"/>
+                </a:solidFill>
+              </a:rPr>
+              <a:t>1</a:t>
+            </a:r>
+            <a:endParaRPr lang="en-SG" sz="1100" dirty="0">
+              <a:solidFill>
+                <a:srgbClr val="7030A0"/>
+              </a:solidFill>
+            </a:endParaRPr>
+          </a:p>
+        </p:txBody>
+      </p:sp>
+      <p:sp>
+        <p:nvSpPr>
+          <p:cNvPr id="121" name="Flowchart: Decision 96">
+            <a:extLst>
+              <a:ext uri="{FF2B5EF4-FFF2-40B4-BE49-F238E27FC236}">
+                <a16:creationId xmlns:a16="http://schemas.microsoft.com/office/drawing/2014/main" id="{F1B8964A-0480-43F3-9CDE-99F8C3FC7922}"/>
+              </a:ext>
+            </a:extLst>
+          </p:cNvPr>
+          <p:cNvSpPr/>
+          <p:nvPr/>
+        </p:nvSpPr>
+        <p:spPr>
+          <a:xfrm>
+            <a:off x="7071334" y="6220229"/>
+            <a:ext cx="236048" cy="173380"/>
+          </a:xfrm>
+          <a:prstGeom prst="flowChartDecision">
+            <a:avLst/>
+          </a:prstGeom>
+          <a:noFill/>
+          <a:ln w="19050">
+            <a:solidFill>
+              <a:srgbClr val="7030A0"/>
+            </a:solidFill>
+          </a:ln>
+          <a:effectLst/>
+        </p:spPr>
+        <p:style>
+          <a:lnRef idx="1">
+            <a:schemeClr val="accent6"/>
+          </a:lnRef>
+          <a:fillRef idx="2">
+            <a:schemeClr val="accent6"/>
+          </a:fillRef>
+          <a:effectRef idx="1">
+            <a:schemeClr val="accent6"/>
+          </a:effectRef>
+          <a:fontRef idx="minor">
+            <a:schemeClr val="dk1"/>
+          </a:fontRef>
+        </p:style>
+        <p:txBody>
+          <a:bodyPr rtlCol="0" anchor="ctr"/>
+          <a:lstStyle/>
+          <a:p>
+            <a:pPr algn="ctr"/>
+            <a:endParaRPr lang="en-US" sz="1050"/>
+          </a:p>
+        </p:txBody>
+      </p:sp>
+      <p:cxnSp>
+        <p:nvCxnSpPr>
+          <p:cNvPr id="122" name="Straight Arrow Connector 121">
+            <a:extLst>
+              <a:ext uri="{FF2B5EF4-FFF2-40B4-BE49-F238E27FC236}">
+                <a16:creationId xmlns:a16="http://schemas.microsoft.com/office/drawing/2014/main" id="{60C32FB7-7CF2-4E31-B35C-C7BAA365D5B5}"/>
+              </a:ext>
+            </a:extLst>
+          </p:cNvPr>
+          <p:cNvCxnSpPr>
+            <a:cxnSpLocks/>
+          </p:cNvCxnSpPr>
+          <p:nvPr/>
+        </p:nvCxnSpPr>
+        <p:spPr>
+          <a:xfrm flipV="1">
+            <a:off x="5995333" y="4910903"/>
+            <a:ext cx="0" cy="276282"/>
+          </a:xfrm>
+          <a:prstGeom prst="straightConnector1">
+            <a:avLst/>
+          </a:prstGeom>
+          <a:ln w="19050">
+            <a:solidFill>
+              <a:srgbClr val="7030A0"/>
+            </a:solidFill>
+            <a:headEnd type="none" w="med" len="med"/>
+            <a:tailEnd type="arrow" w="med" len="med"/>
+          </a:ln>
+        </p:spPr>
+        <p:style>
+          <a:lnRef idx="1">
+            <a:schemeClr val="accent1"/>
+          </a:lnRef>
+          <a:fillRef idx="0">
+            <a:schemeClr val="accent1"/>
+          </a:fillRef>
+          <a:effectRef idx="0">
+            <a:schemeClr val="accent1"/>
+          </a:effectRef>
+          <a:fontRef idx="minor">
+            <a:schemeClr val="tx1"/>
+          </a:fontRef>
+        </p:style>
+      </p:cxnSp>
+      <p:cxnSp>
+        <p:nvCxnSpPr>
+          <p:cNvPr id="123" name="Straight Arrow Connector 122">
+            <a:extLst>
+              <a:ext uri="{FF2B5EF4-FFF2-40B4-BE49-F238E27FC236}">
+                <a16:creationId xmlns:a16="http://schemas.microsoft.com/office/drawing/2014/main" id="{7A7AC4DC-0731-47A4-9D21-6FE4424202A1}"/>
+              </a:ext>
+            </a:extLst>
+          </p:cNvPr>
+          <p:cNvCxnSpPr>
+            <a:cxnSpLocks/>
+          </p:cNvCxnSpPr>
+          <p:nvPr/>
+        </p:nvCxnSpPr>
+        <p:spPr>
+          <a:xfrm flipV="1">
+            <a:off x="5979988" y="2807841"/>
+            <a:ext cx="0" cy="844944"/>
+          </a:xfrm>
+          <a:prstGeom prst="straightConnector1">
+            <a:avLst/>
+          </a:prstGeom>
+          <a:ln w="19050">
+            <a:solidFill>
+              <a:srgbClr val="7030A0"/>
+            </a:solidFill>
+            <a:headEnd type="none" w="med" len="med"/>
+            <a:tailEnd type="arrow" w="med" len="med"/>
+          </a:ln>
+        </p:spPr>
+        <p:style>
+          <a:lnRef idx="1">
+            <a:schemeClr val="accent1"/>
+          </a:lnRef>
+          <a:fillRef idx="0">
+            <a:schemeClr val="accent1"/>
+          </a:fillRef>
+          <a:effectRef idx="0">
+            <a:schemeClr val="accent1"/>
+          </a:effectRef>
+          <a:fontRef idx="minor">
+            <a:schemeClr val="tx1"/>
+          </a:fontRef>
+        </p:style>
+      </p:cxnSp>
+      <p:cxnSp>
+        <p:nvCxnSpPr>
+          <p:cNvPr id="125" name="Straight Connector 124">
+            <a:extLst>
+              <a:ext uri="{FF2B5EF4-FFF2-40B4-BE49-F238E27FC236}">
+                <a16:creationId xmlns:a16="http://schemas.microsoft.com/office/drawing/2014/main" id="{275C70AA-2A05-432D-9DDE-30176245166C}"/>
+              </a:ext>
+            </a:extLst>
+          </p:cNvPr>
+          <p:cNvCxnSpPr>
+            <a:cxnSpLocks/>
+          </p:cNvCxnSpPr>
+          <p:nvPr/>
+        </p:nvCxnSpPr>
+        <p:spPr>
+          <a:xfrm>
+            <a:off x="5967385" y="3648484"/>
+            <a:ext cx="2033615" cy="0"/>
+          </a:xfrm>
+          <a:prstGeom prst="line">
+            <a:avLst/>
+          </a:prstGeom>
+          <a:ln w="19050">
+            <a:solidFill>
+              <a:srgbClr val="7030A0"/>
+            </a:solidFill>
+          </a:ln>
+        </p:spPr>
+        <p:style>
+          <a:lnRef idx="1">
+            <a:schemeClr val="accent1"/>
+          </a:lnRef>
+          <a:fillRef idx="0">
+            <a:schemeClr val="accent1"/>
+          </a:fillRef>
+          <a:effectRef idx="0">
+            <a:schemeClr val="accent1"/>
+          </a:effectRef>
+          <a:fontRef idx="minor">
+            <a:schemeClr val="tx1"/>
+          </a:fontRef>
+        </p:style>
+      </p:cxnSp>
+      <p:cxnSp>
+        <p:nvCxnSpPr>
+          <p:cNvPr id="135" name="Straight Connector 134">
+            <a:extLst>
+              <a:ext uri="{FF2B5EF4-FFF2-40B4-BE49-F238E27FC236}">
+                <a16:creationId xmlns:a16="http://schemas.microsoft.com/office/drawing/2014/main" id="{790DD16E-E50D-46AE-A4BA-09A96108AD03}"/>
+              </a:ext>
+            </a:extLst>
+          </p:cNvPr>
+          <p:cNvCxnSpPr>
+            <a:cxnSpLocks/>
+          </p:cNvCxnSpPr>
+          <p:nvPr/>
+        </p:nvCxnSpPr>
+        <p:spPr>
+          <a:xfrm>
+            <a:off x="8001000" y="3653416"/>
+            <a:ext cx="0" cy="2653503"/>
+          </a:xfrm>
+          <a:prstGeom prst="line">
+            <a:avLst/>
+          </a:prstGeom>
+          <a:ln w="19050">
+            <a:solidFill>
+              <a:srgbClr val="7030A0"/>
+            </a:solidFill>
+          </a:ln>
+        </p:spPr>
+        <p:style>
+          <a:lnRef idx="1">
+            <a:schemeClr val="accent1"/>
+          </a:lnRef>
+          <a:fillRef idx="0">
+            <a:schemeClr val="accent1"/>
+          </a:fillRef>
+          <a:effectRef idx="0">
+            <a:schemeClr val="accent1"/>
+          </a:effectRef>
+          <a:fontRef idx="minor">
+            <a:schemeClr val="tx1"/>
+          </a:fontRef>
+        </p:style>
+      </p:cxnSp>
+      <p:cxnSp>
+        <p:nvCxnSpPr>
+          <p:cNvPr id="136" name="Straight Connector 135">
+            <a:extLst>
+              <a:ext uri="{FF2B5EF4-FFF2-40B4-BE49-F238E27FC236}">
+                <a16:creationId xmlns:a16="http://schemas.microsoft.com/office/drawing/2014/main" id="{85A9F6BA-6187-489E-9CDF-630E2ED13B72}"/>
+              </a:ext>
+            </a:extLst>
+          </p:cNvPr>
+          <p:cNvCxnSpPr>
+            <a:cxnSpLocks/>
+          </p:cNvCxnSpPr>
+          <p:nvPr/>
+        </p:nvCxnSpPr>
+        <p:spPr>
+          <a:xfrm>
+            <a:off x="7307382" y="6297803"/>
+            <a:ext cx="693618" cy="0"/>
+          </a:xfrm>
+          <a:prstGeom prst="line">
+            <a:avLst/>
+          </a:prstGeom>
+          <a:ln w="19050">
+            <a:solidFill>
+              <a:srgbClr val="7030A0"/>
+            </a:solidFill>
+          </a:ln>
+        </p:spPr>
+        <p:style>
+          <a:lnRef idx="1">
+            <a:schemeClr val="accent1"/>
+          </a:lnRef>
+          <a:fillRef idx="0">
+            <a:schemeClr val="accent1"/>
+          </a:fillRef>
+          <a:effectRef idx="0">
+            <a:schemeClr val="accent1"/>
+          </a:effectRef>
+          <a:fontRef idx="minor">
+            <a:schemeClr val="tx1"/>
+          </a:fontRef>
+        </p:style>
+      </p:cxnSp>
+      <p:cxnSp>
+        <p:nvCxnSpPr>
+          <p:cNvPr id="137" name="Straight Connector 136">
+            <a:extLst>
+              <a:ext uri="{FF2B5EF4-FFF2-40B4-BE49-F238E27FC236}">
+                <a16:creationId xmlns:a16="http://schemas.microsoft.com/office/drawing/2014/main" id="{E8947718-5ACC-4C5C-971A-F2F635483679}"/>
+              </a:ext>
+            </a:extLst>
+          </p:cNvPr>
+          <p:cNvCxnSpPr>
+            <a:cxnSpLocks/>
+          </p:cNvCxnSpPr>
+          <p:nvPr/>
+        </p:nvCxnSpPr>
+        <p:spPr>
+          <a:xfrm>
+            <a:off x="5990717" y="5187185"/>
+            <a:ext cx="1313153" cy="0"/>
+          </a:xfrm>
+          <a:prstGeom prst="line">
+            <a:avLst/>
+          </a:prstGeom>
+          <a:ln w="19050">
+            <a:solidFill>
+              <a:srgbClr val="7030A0"/>
+            </a:solidFill>
+          </a:ln>
+        </p:spPr>
+        <p:style>
+          <a:lnRef idx="1">
+            <a:schemeClr val="accent1"/>
+          </a:lnRef>
+          <a:fillRef idx="0">
+            <a:schemeClr val="accent1"/>
+          </a:fillRef>
+          <a:effectRef idx="0">
+            <a:schemeClr val="accent1"/>
+          </a:effectRef>
+          <a:fontRef idx="minor">
+            <a:schemeClr val="tx1"/>
+          </a:fontRef>
+        </p:style>
+      </p:cxnSp>
+      <p:cxnSp>
+        <p:nvCxnSpPr>
+          <p:cNvPr id="138" name="Straight Connector 137">
+            <a:extLst>
+              <a:ext uri="{FF2B5EF4-FFF2-40B4-BE49-F238E27FC236}">
+                <a16:creationId xmlns:a16="http://schemas.microsoft.com/office/drawing/2014/main" id="{FF9F108E-FD4A-4548-90C8-9E9548CFE5A1}"/>
+              </a:ext>
+            </a:extLst>
+          </p:cNvPr>
+          <p:cNvCxnSpPr>
+            <a:cxnSpLocks/>
+          </p:cNvCxnSpPr>
+          <p:nvPr/>
+        </p:nvCxnSpPr>
+        <p:spPr>
+          <a:xfrm>
+            <a:off x="7303870" y="5187185"/>
+            <a:ext cx="0" cy="1131743"/>
+          </a:xfrm>
+          <a:prstGeom prst="line">
+            <a:avLst/>
+          </a:prstGeom>
+          <a:ln w="19050">
+            <a:solidFill>
+              <a:srgbClr val="7030A0"/>
+            </a:solidFill>
+          </a:ln>
+        </p:spPr>
+        <p:style>
+          <a:lnRef idx="1">
+            <a:schemeClr val="accent1"/>
+          </a:lnRef>
+          <a:fillRef idx="0">
+            <a:schemeClr val="accent1"/>
+          </a:fillRef>
+          <a:effectRef idx="0">
+            <a:schemeClr val="accent1"/>
+          </a:effectRef>
+          <a:fontRef idx="minor">
+            <a:schemeClr val="tx1"/>
+          </a:fontRef>
+        </p:style>
+      </p:cxnSp>
+      <p:sp>
+        <p:nvSpPr>
+          <p:cNvPr id="144" name="TextBox 143">
+            <a:extLst>
+              <a:ext uri="{FF2B5EF4-FFF2-40B4-BE49-F238E27FC236}">
+                <a16:creationId xmlns:a16="http://schemas.microsoft.com/office/drawing/2014/main" id="{5E6F74EE-D2C4-47E1-AD3B-F2B10D62D4BE}"/>
+              </a:ext>
+            </a:extLst>
+          </p:cNvPr>
+          <p:cNvSpPr txBox="1"/>
+          <p:nvPr/>
+        </p:nvSpPr>
+        <p:spPr>
+          <a:xfrm>
+            <a:off x="6019800" y="5002917"/>
+            <a:ext cx="117514" cy="178683"/>
+          </a:xfrm>
+          <a:prstGeom prst="rect">
+            <a:avLst/>
+          </a:prstGeom>
+          <a:noFill/>
+        </p:spPr>
+        <p:txBody>
+          <a:bodyPr wrap="square" lIns="0" tIns="0" rIns="0" bIns="0" rtlCol="0">
+            <a:noAutofit/>
+          </a:bodyPr>
+          <a:lstStyle/>
+          <a:p>
+            <a:pPr algn="ctr"/>
+            <a:r>
+              <a:rPr lang="en-US" sz="1100" dirty="0">
+                <a:solidFill>
+                  <a:srgbClr val="7030A0"/>
+                </a:solidFill>
+              </a:rPr>
+              <a:t>1</a:t>
+            </a:r>
+            <a:endParaRPr lang="en-SG" sz="1100" dirty="0">
+              <a:solidFill>
+                <a:srgbClr val="7030A0"/>
+              </a:solidFill>
+            </a:endParaRPr>
+          </a:p>
+        </p:txBody>
+      </p:sp>
+      <p:sp>
+        <p:nvSpPr>
+          <p:cNvPr id="154" name="TextBox 153">
+            <a:extLst>
+              <a:ext uri="{FF2B5EF4-FFF2-40B4-BE49-F238E27FC236}">
+                <a16:creationId xmlns:a16="http://schemas.microsoft.com/office/drawing/2014/main" id="{CEB197DB-5470-4BA7-9B71-81211CD07C3B}"/>
+              </a:ext>
+            </a:extLst>
+          </p:cNvPr>
+          <p:cNvSpPr txBox="1"/>
+          <p:nvPr/>
+        </p:nvSpPr>
+        <p:spPr>
+          <a:xfrm>
+            <a:off x="6013836" y="2945014"/>
+            <a:ext cx="117514" cy="178683"/>
+          </a:xfrm>
+          <a:prstGeom prst="rect">
+            <a:avLst/>
+          </a:prstGeom>
+          <a:noFill/>
+        </p:spPr>
+        <p:txBody>
+          <a:bodyPr wrap="square" lIns="0" tIns="0" rIns="0" bIns="0" rtlCol="0">
+            <a:noAutofit/>
+          </a:bodyPr>
+          <a:lstStyle/>
+          <a:p>
+            <a:pPr algn="ctr"/>
+            <a:r>
+              <a:rPr lang="en-US" sz="1100" dirty="0">
+                <a:solidFill>
+                  <a:srgbClr val="7030A0"/>
+                </a:solidFill>
+              </a:rPr>
+              <a:t>*</a:t>
+            </a:r>
+            <a:endParaRPr lang="en-SG" sz="1100" dirty="0">
+              <a:solidFill>
+                <a:srgbClr val="7030A0"/>
+              </a:solidFill>
+            </a:endParaRPr>
+          </a:p>
+        </p:txBody>
+      </p:sp>
+      <p:sp>
+        <p:nvSpPr>
+          <p:cNvPr id="155" name="TextBox 154">
+            <a:extLst>
+              <a:ext uri="{FF2B5EF4-FFF2-40B4-BE49-F238E27FC236}">
+                <a16:creationId xmlns:a16="http://schemas.microsoft.com/office/drawing/2014/main" id="{468515D8-614A-4138-A27E-72287ABFCDDD}"/>
+              </a:ext>
+            </a:extLst>
+          </p:cNvPr>
+          <p:cNvSpPr txBox="1"/>
+          <p:nvPr/>
+        </p:nvSpPr>
+        <p:spPr>
+          <a:xfrm>
+            <a:off x="7168913" y="6044085"/>
+            <a:ext cx="117514" cy="178683"/>
+          </a:xfrm>
+          <a:prstGeom prst="rect">
+            <a:avLst/>
+          </a:prstGeom>
+          <a:noFill/>
+        </p:spPr>
+        <p:txBody>
+          <a:bodyPr wrap="square" lIns="0" tIns="0" rIns="0" bIns="0" rtlCol="0">
+            <a:noAutofit/>
+          </a:bodyPr>
+          <a:lstStyle/>
+          <a:p>
+            <a:pPr algn="ctr"/>
+            <a:r>
+              <a:rPr lang="en-US" sz="1100" dirty="0">
+                <a:solidFill>
+                  <a:srgbClr val="7030A0"/>
+                </a:solidFill>
+              </a:rPr>
+              <a:t>1</a:t>
+            </a:r>
+            <a:endParaRPr lang="en-SG" sz="1100" dirty="0">
+              <a:solidFill>
+                <a:srgbClr val="7030A0"/>
+              </a:solidFill>
+            </a:endParaRPr>
+          </a:p>
+        </p:txBody>
+      </p:sp>
+      <p:sp>
+        <p:nvSpPr>
+          <p:cNvPr id="156" name="TextBox 155">
+            <a:extLst>
+              <a:ext uri="{FF2B5EF4-FFF2-40B4-BE49-F238E27FC236}">
+                <a16:creationId xmlns:a16="http://schemas.microsoft.com/office/drawing/2014/main" id="{A6C3C617-FD7D-4DCD-A4B6-1F0A5F622135}"/>
+              </a:ext>
+            </a:extLst>
+          </p:cNvPr>
+          <p:cNvSpPr txBox="1"/>
+          <p:nvPr/>
+        </p:nvSpPr>
+        <p:spPr>
+          <a:xfrm>
+            <a:off x="7401025" y="6318928"/>
+            <a:ext cx="117514" cy="178683"/>
           </a:xfrm>
           <a:prstGeom prst="rect">
             <a:avLst/>

</xml_diff>

<commit_message>
Update UML Class Diagram
</commit_message>
<xml_diff>
--- a/docs/diagrams/DistributeComponentClassDiagram.pptx
+++ b/docs/diagrams/DistributeComponentClassDiagram.pptx
@@ -8430,10 +8430,10 @@
       </p:sp>
       <p:sp>
         <p:nvSpPr>
-          <p:cNvPr id="105" name="Rectangle 8">
-            <a:extLst>
-              <a:ext uri="{FF2B5EF4-FFF2-40B4-BE49-F238E27FC236}">
-                <a16:creationId xmlns:a16="http://schemas.microsoft.com/office/drawing/2014/main" id="{763AE310-C59F-4CFF-BAC8-4C7FE82B59C9}"/>
+          <p:cNvPr id="110" name="Rectangle 8">
+            <a:extLst>
+              <a:ext uri="{FF2B5EF4-FFF2-40B4-BE49-F238E27FC236}">
+                <a16:creationId xmlns:a16="http://schemas.microsoft.com/office/drawing/2014/main" id="{A3F3C150-AB2F-4409-A4E7-5F90A300AB4B}"/>
               </a:ext>
             </a:extLst>
           </p:cNvPr>
@@ -8442,8 +8442,8 @@
         </p:nvSpPr>
         <p:spPr>
           <a:xfrm>
-            <a:off x="3788407" y="1825861"/>
-            <a:ext cx="1156969" cy="285783"/>
+            <a:off x="6744932" y="1860260"/>
+            <a:ext cx="708186" cy="262335"/>
           </a:xfrm>
           <a:prstGeom prst="rect">
             <a:avLst/>
@@ -8480,7 +8480,7 @@
                   <a:srgbClr val="7030A0"/>
                 </a:solidFill>
               </a:rPr>
-              <a:t>UniqueTagList</a:t>
+              <a:t>Tag</a:t>
             </a:r>
             <a:endParaRPr lang="en-SG" sz="1050" dirty="0">
               <a:solidFill>
@@ -8492,36 +8492,35 @@
       </p:sp>
       <p:cxnSp>
         <p:nvCxnSpPr>
-          <p:cNvPr id="106" name="Elbow Connector 78">
-            <a:extLst>
-              <a:ext uri="{FF2B5EF4-FFF2-40B4-BE49-F238E27FC236}">
-                <a16:creationId xmlns:a16="http://schemas.microsoft.com/office/drawing/2014/main" id="{2D0C2DD7-93A3-4097-A518-714CD4B54E1F}"/>
+          <p:cNvPr id="115" name="Elbow Connector 63">
+            <a:extLst>
+              <a:ext uri="{FF2B5EF4-FFF2-40B4-BE49-F238E27FC236}">
+                <a16:creationId xmlns:a16="http://schemas.microsoft.com/office/drawing/2014/main" id="{1D0DA199-655E-41FD-A938-359B959927E9}"/>
               </a:ext>
             </a:extLst>
           </p:cNvPr>
           <p:cNvCxnSpPr>
-            <a:cxnSpLocks/>
-            <a:stCxn id="83" idx="3"/>
-            <a:endCxn id="105" idx="1"/>
+            <a:stCxn id="116" idx="3"/>
           </p:cNvCxnSpPr>
           <p:nvPr/>
         </p:nvCxnSpPr>
         <p:spPr>
-          <a:xfrm flipV="1">
-            <a:off x="3501829" y="1968753"/>
-            <a:ext cx="286578" cy="685138"/>
+          <a:xfrm rot="5400000">
+            <a:off x="2503171" y="2306353"/>
+            <a:ext cx="293825" cy="5938"/>
           </a:xfrm>
           <a:prstGeom prst="bentConnector3">
             <a:avLst>
-              <a:gd name="adj1" fmla="val -1052"/>
+              <a:gd name="adj1" fmla="val 50000"/>
             </a:avLst>
           </a:prstGeom>
           <a:ln w="19050">
             <a:solidFill>
               <a:srgbClr val="7030A0"/>
             </a:solidFill>
+            <a:prstDash val="sysDot"/>
             <a:headEnd type="none" w="med" len="med"/>
-            <a:tailEnd type="arrow" w="med" len="med"/>
+            <a:tailEnd type="none" w="med" len="med"/>
           </a:ln>
           <a:effectLst/>
         </p:spPr>
@@ -8542,42 +8541,128 @@
       </p:cxnSp>
       <p:sp>
         <p:nvSpPr>
-          <p:cNvPr id="107" name="TextBox 106">
-            <a:extLst>
-              <a:ext uri="{FF2B5EF4-FFF2-40B4-BE49-F238E27FC236}">
-                <a16:creationId xmlns:a16="http://schemas.microsoft.com/office/drawing/2014/main" id="{8F66F670-7C07-4A1A-8468-C547214AA9C8}"/>
-              </a:ext>
-            </a:extLst>
-          </p:cNvPr>
-          <p:cNvSpPr txBox="1"/>
-          <p:nvPr/>
-        </p:nvSpPr>
-        <p:spPr>
-          <a:xfrm>
-            <a:off x="5746879" y="2049721"/>
-            <a:ext cx="189257" cy="178683"/>
+          <p:cNvPr id="116" name="Isosceles Triangle 102">
+            <a:extLst>
+              <a:ext uri="{FF2B5EF4-FFF2-40B4-BE49-F238E27FC236}">
+                <a16:creationId xmlns:a16="http://schemas.microsoft.com/office/drawing/2014/main" id="{D9BD3BCB-F66C-4AAD-8A02-2814AD889493}"/>
+              </a:ext>
+            </a:extLst>
+          </p:cNvPr>
+          <p:cNvSpPr/>
+          <p:nvPr/>
+        </p:nvSpPr>
+        <p:spPr>
+          <a:xfrm rot="10800000" flipV="1">
+            <a:off x="2511859" y="2005348"/>
+            <a:ext cx="282387" cy="157062"/>
+          </a:xfrm>
+          <a:prstGeom prst="triangle">
+            <a:avLst/>
+          </a:prstGeom>
+          <a:ln w="19050">
+            <a:solidFill>
+              <a:srgbClr val="7030A0"/>
+            </a:solidFill>
+          </a:ln>
+          <a:effectLst/>
+        </p:spPr>
+        <p:style>
+          <a:lnRef idx="1">
+            <a:schemeClr val="accent4"/>
+          </a:lnRef>
+          <a:fillRef idx="2">
+            <a:schemeClr val="accent4"/>
+          </a:fillRef>
+          <a:effectRef idx="1">
+            <a:schemeClr val="accent4"/>
+          </a:effectRef>
+          <a:fontRef idx="minor">
+            <a:schemeClr val="dk1"/>
+          </a:fontRef>
+        </p:style>
+        <p:txBody>
+          <a:bodyPr rtlCol="0" anchor="ctr"/>
+          <a:lstStyle/>
+          <a:p>
+            <a:pPr algn="ctr"/>
+            <a:endParaRPr lang="en-SG" sz="1050" b="1">
+              <a:solidFill>
+                <a:srgbClr val="92D050"/>
+              </a:solidFill>
+            </a:endParaRPr>
+          </a:p>
+        </p:txBody>
+      </p:sp>
+      <p:sp>
+        <p:nvSpPr>
+          <p:cNvPr id="117" name="Rectangle 8">
+            <a:extLst>
+              <a:ext uri="{FF2B5EF4-FFF2-40B4-BE49-F238E27FC236}">
+                <a16:creationId xmlns:a16="http://schemas.microsoft.com/office/drawing/2014/main" id="{AF925E17-F7B8-4427-9833-2CD74A9E3FE8}"/>
+              </a:ext>
+            </a:extLst>
+          </p:cNvPr>
+          <p:cNvSpPr/>
+          <p:nvPr/>
+        </p:nvSpPr>
+        <p:spPr>
+          <a:xfrm>
+            <a:off x="210482" y="1617144"/>
+            <a:ext cx="1443661" cy="364396"/>
           </a:xfrm>
           <a:prstGeom prst="rect">
             <a:avLst/>
           </a:prstGeom>
-          <a:noFill/>
-        </p:spPr>
-        <p:txBody>
-          <a:bodyPr wrap="square" lIns="0" tIns="0" rIns="0" bIns="0" rtlCol="0">
-            <a:noAutofit/>
-          </a:bodyPr>
+          <a:ln w="19050">
+            <a:solidFill>
+              <a:srgbClr val="7030A0"/>
+            </a:solidFill>
+          </a:ln>
+          <a:effectLst/>
+        </p:spPr>
+        <p:style>
+          <a:lnRef idx="1">
+            <a:schemeClr val="accent4"/>
+          </a:lnRef>
+          <a:fillRef idx="2">
+            <a:schemeClr val="accent4"/>
+          </a:fillRef>
+          <a:effectRef idx="1">
+            <a:schemeClr val="accent4"/>
+          </a:effectRef>
+          <a:fontRef idx="minor">
+            <a:schemeClr val="dk1"/>
+          </a:fontRef>
+        </p:style>
+        <p:txBody>
+          <a:bodyPr rtlCol="0" anchor="ctr"/>
           <a:lstStyle/>
           <a:p>
             <a:pPr algn="ctr"/>
             <a:r>
-              <a:rPr lang="en-US" sz="1100" dirty="0">
+              <a:rPr lang="en-US" sz="1050" dirty="0">
                 <a:solidFill>
                   <a:srgbClr val="7030A0"/>
                 </a:solidFill>
               </a:rPr>
-              <a:t>*</a:t>
-            </a:r>
-            <a:endParaRPr lang="en-SG" sz="1100" dirty="0">
+              <a:t>&lt;&lt;interface&gt;&gt;</a:t>
+            </a:r>
+            <a:br>
+              <a:rPr lang="en-US" sz="1050" dirty="0">
+                <a:solidFill>
+                  <a:srgbClr val="7030A0"/>
+                </a:solidFill>
+              </a:rPr>
+            </a:br>
+            <a:r>
+              <a:rPr lang="en-US" sz="1050" dirty="0">
+                <a:solidFill>
+                  <a:srgbClr val="7030A0"/>
+                </a:solidFill>
+              </a:rPr>
+              <a:t>ReadOnlyAddressBook</a:t>
+            </a:r>
+            <a:endParaRPr lang="en-SG" sz="1050" dirty="0">
               <a:solidFill>
                 <a:srgbClr val="7030A0"/>
               </a:solidFill>
@@ -8587,10 +8672,10 @@
       </p:sp>
       <p:sp>
         <p:nvSpPr>
-          <p:cNvPr id="108" name="Flowchart: Decision 96">
-            <a:extLst>
-              <a:ext uri="{FF2B5EF4-FFF2-40B4-BE49-F238E27FC236}">
-                <a16:creationId xmlns:a16="http://schemas.microsoft.com/office/drawing/2014/main" id="{505DBD94-A1D1-4B6A-A43E-BA644F677203}"/>
+          <p:cNvPr id="118" name="Rectangle 8">
+            <a:extLst>
+              <a:ext uri="{FF2B5EF4-FFF2-40B4-BE49-F238E27FC236}">
+                <a16:creationId xmlns:a16="http://schemas.microsoft.com/office/drawing/2014/main" id="{58C519AB-00A8-4347-887C-20A1EF856C59}"/>
               </a:ext>
             </a:extLst>
           </p:cNvPr>
@@ -8598,14 +8683,83 @@
           <p:nvPr/>
         </p:nvSpPr>
         <p:spPr>
+          <a:xfrm>
+            <a:off x="2119741" y="1617144"/>
+            <a:ext cx="1060683" cy="364396"/>
+          </a:xfrm>
+          <a:prstGeom prst="rect">
+            <a:avLst/>
+          </a:prstGeom>
+          <a:ln w="19050">
+            <a:solidFill>
+              <a:srgbClr val="7030A0"/>
+            </a:solidFill>
+          </a:ln>
+          <a:effectLst/>
+        </p:spPr>
+        <p:style>
+          <a:lnRef idx="1">
+            <a:schemeClr val="accent4"/>
+          </a:lnRef>
+          <a:fillRef idx="2">
+            <a:schemeClr val="accent4"/>
+          </a:fillRef>
+          <a:effectRef idx="1">
+            <a:schemeClr val="accent4"/>
+          </a:effectRef>
+          <a:fontRef idx="minor">
+            <a:schemeClr val="dk1"/>
+          </a:fontRef>
+        </p:style>
+        <p:txBody>
+          <a:bodyPr rtlCol="0" anchor="ctr"/>
+          <a:lstStyle/>
+          <a:p>
+            <a:pPr algn="ctr"/>
+            <a:r>
+              <a:rPr lang="en-US" sz="1050" dirty="0">
+                <a:solidFill>
+                  <a:srgbClr val="7030A0"/>
+                </a:solidFill>
+              </a:rPr>
+              <a:t>AddressBook</a:t>
+            </a:r>
+            <a:endParaRPr lang="en-SG" sz="1050" dirty="0">
+              <a:solidFill>
+                <a:srgbClr val="7030A0"/>
+              </a:solidFill>
+            </a:endParaRPr>
+          </a:p>
+        </p:txBody>
+      </p:sp>
+      <p:sp>
+        <p:nvSpPr>
+          <p:cNvPr id="119" name="Isosceles Triangle 102">
+            <a:extLst>
+              <a:ext uri="{FF2B5EF4-FFF2-40B4-BE49-F238E27FC236}">
+                <a16:creationId xmlns:a16="http://schemas.microsoft.com/office/drawing/2014/main" id="{BCEDEECA-3E51-4230-B5D1-1F6CE7D89DD6}"/>
+              </a:ext>
+            </a:extLst>
+          </p:cNvPr>
+          <p:cNvSpPr/>
+          <p:nvPr/>
+        </p:nvSpPr>
+        <p:spPr>
           <a:xfrm rot="16200000">
-            <a:off x="5586017" y="2283721"/>
-            <a:ext cx="236048" cy="173380"/>
-          </a:xfrm>
-          <a:prstGeom prst="flowChartDecision">
-            <a:avLst/>
-          </a:prstGeom>
-          <a:noFill/>
+            <a:off x="1618633" y="1687952"/>
+            <a:ext cx="271014" cy="187417"/>
+          </a:xfrm>
+          <a:prstGeom prst="triangle">
+            <a:avLst>
+              <a:gd name="adj" fmla="val 44517"/>
+            </a:avLst>
+          </a:prstGeom>
+          <a:solidFill>
+            <a:schemeClr val="accent4">
+              <a:lumMod val="20000"/>
+              <a:lumOff val="80000"/>
+            </a:schemeClr>
+          </a:solidFill>
           <a:ln w="19050">
             <a:solidFill>
               <a:srgbClr val="7030A0"/>
@@ -8632,39 +8786,42 @@
           <a:lstStyle/>
           <a:p>
             <a:pPr algn="ctr"/>
-            <a:endParaRPr lang="en-US" sz="1050"/>
+            <a:endParaRPr lang="en-SG" sz="1050"/>
           </a:p>
         </p:txBody>
       </p:sp>
       <p:cxnSp>
         <p:nvCxnSpPr>
-          <p:cNvPr id="109" name="Elbow Connector 63">
-            <a:extLst>
-              <a:ext uri="{FF2B5EF4-FFF2-40B4-BE49-F238E27FC236}">
-                <a16:creationId xmlns:a16="http://schemas.microsoft.com/office/drawing/2014/main" id="{BE883396-FE04-4FB4-ADDA-F9C610F928B2}"/>
+          <p:cNvPr id="120" name="Elbow Connector 63">
+            <a:extLst>
+              <a:ext uri="{FF2B5EF4-FFF2-40B4-BE49-F238E27FC236}">
+                <a16:creationId xmlns:a16="http://schemas.microsoft.com/office/drawing/2014/main" id="{A31B7AAE-1596-484B-857D-2B41C6C7632C}"/>
               </a:ext>
             </a:extLst>
           </p:cNvPr>
           <p:cNvCxnSpPr>
-            <a:cxnSpLocks/>
-            <a:endCxn id="110" idx="1"/>
+            <a:stCxn id="119" idx="3"/>
+            <a:endCxn id="118" idx="1"/>
           </p:cNvCxnSpPr>
           <p:nvPr/>
         </p:nvCxnSpPr>
         <p:spPr>
-          <a:xfrm flipV="1">
-            <a:off x="4916815" y="1852006"/>
-            <a:ext cx="432916" cy="111294"/>
+          <a:xfrm>
+            <a:off x="1847849" y="1796521"/>
+            <a:ext cx="271892" cy="2821"/>
           </a:xfrm>
           <a:prstGeom prst="bentConnector3">
-            <a:avLst/>
+            <a:avLst>
+              <a:gd name="adj1" fmla="val 50000"/>
+            </a:avLst>
           </a:prstGeom>
           <a:ln w="19050">
             <a:solidFill>
               <a:srgbClr val="7030A0"/>
             </a:solidFill>
+            <a:prstDash val="sysDot"/>
             <a:headEnd type="none" w="med" len="med"/>
-            <a:tailEnd type="arrow" w="med" len="med"/>
+            <a:tailEnd type="none" w="med" len="med"/>
           </a:ln>
           <a:effectLst/>
         </p:spPr>
@@ -8685,10 +8842,10 @@
       </p:cxnSp>
       <p:sp>
         <p:nvSpPr>
-          <p:cNvPr id="110" name="Rectangle 8">
-            <a:extLst>
-              <a:ext uri="{FF2B5EF4-FFF2-40B4-BE49-F238E27FC236}">
-                <a16:creationId xmlns:a16="http://schemas.microsoft.com/office/drawing/2014/main" id="{A3F3C150-AB2F-4409-A4E7-5F90A300AB4B}"/>
+          <p:cNvPr id="124" name="Rectangle 8">
+            <a:extLst>
+              <a:ext uri="{FF2B5EF4-FFF2-40B4-BE49-F238E27FC236}">
+                <a16:creationId xmlns:a16="http://schemas.microsoft.com/office/drawing/2014/main" id="{8712D3FD-C79B-47F3-9F19-106CFBD5BF84}"/>
               </a:ext>
             </a:extLst>
           </p:cNvPr>
@@ -8697,8 +8854,8 @@
         </p:nvSpPr>
         <p:spPr>
           <a:xfrm>
-            <a:off x="5349731" y="1678626"/>
-            <a:ext cx="708186" cy="346760"/>
+            <a:off x="3754697" y="4561444"/>
+            <a:ext cx="1156969" cy="346760"/>
           </a:xfrm>
           <a:prstGeom prst="rect">
             <a:avLst/>
@@ -8735,7 +8892,7 @@
                   <a:srgbClr val="7030A0"/>
                 </a:solidFill>
               </a:rPr>
-              <a:t>Tag</a:t>
+              <a:t>UniqueGroupList</a:t>
             </a:r>
             <a:endParaRPr lang="en-SG" sz="1050" dirty="0">
               <a:solidFill>
@@ -8745,44 +8902,111 @@
           </a:p>
         </p:txBody>
       </p:sp>
-      <p:sp>
-        <p:nvSpPr>
-          <p:cNvPr id="111" name="TextBox 110">
-            <a:extLst>
-              <a:ext uri="{FF2B5EF4-FFF2-40B4-BE49-F238E27FC236}">
-                <a16:creationId xmlns:a16="http://schemas.microsoft.com/office/drawing/2014/main" id="{22CDE5E4-D6E9-4633-B5D7-A1AE871B7B51}"/>
-              </a:ext>
-            </a:extLst>
-          </p:cNvPr>
-          <p:cNvSpPr txBox="1"/>
-          <p:nvPr/>
-        </p:nvSpPr>
-        <p:spPr>
-          <a:xfrm>
-            <a:off x="5167791" y="1897014"/>
-            <a:ext cx="189257" cy="178683"/>
+      <p:cxnSp>
+        <p:nvCxnSpPr>
+          <p:cNvPr id="126" name="Elbow Connector 29">
+            <a:extLst>
+              <a:ext uri="{FF2B5EF4-FFF2-40B4-BE49-F238E27FC236}">
+                <a16:creationId xmlns:a16="http://schemas.microsoft.com/office/drawing/2014/main" id="{741C5E9A-1D39-421F-9973-8F65DC6CA224}"/>
+              </a:ext>
+            </a:extLst>
+          </p:cNvPr>
+          <p:cNvCxnSpPr>
+            <a:cxnSpLocks/>
+            <a:stCxn id="83" idx="3"/>
+            <a:endCxn id="124" idx="1"/>
+          </p:cNvCxnSpPr>
+          <p:nvPr/>
+        </p:nvCxnSpPr>
+        <p:spPr>
+          <a:xfrm>
+            <a:off x="3501829" y="2653891"/>
+            <a:ext cx="252868" cy="2080933"/>
+          </a:xfrm>
+          <a:prstGeom prst="bentConnector3">
+            <a:avLst>
+              <a:gd name="adj1" fmla="val 1785"/>
+            </a:avLst>
+          </a:prstGeom>
+          <a:ln w="19050">
+            <a:solidFill>
+              <a:srgbClr val="7030A0"/>
+            </a:solidFill>
+            <a:headEnd type="none" w="med" len="med"/>
+            <a:tailEnd type="arrow" w="med" len="med"/>
+          </a:ln>
+          <a:effectLst/>
+        </p:spPr>
+        <p:style>
+          <a:lnRef idx="1">
+            <a:schemeClr val="accent2"/>
+          </a:lnRef>
+          <a:fillRef idx="2">
+            <a:schemeClr val="accent2"/>
+          </a:fillRef>
+          <a:effectRef idx="1">
+            <a:schemeClr val="accent2"/>
+          </a:effectRef>
+          <a:fontRef idx="minor">
+            <a:schemeClr val="dk1"/>
+          </a:fontRef>
+        </p:style>
+      </p:cxnSp>
+      <p:sp>
+        <p:nvSpPr>
+          <p:cNvPr id="127" name="Rectangle 8">
+            <a:extLst>
+              <a:ext uri="{FF2B5EF4-FFF2-40B4-BE49-F238E27FC236}">
+                <a16:creationId xmlns:a16="http://schemas.microsoft.com/office/drawing/2014/main" id="{E7D89583-AEEE-43B8-8362-305207A0A8D7}"/>
+              </a:ext>
+            </a:extLst>
+          </p:cNvPr>
+          <p:cNvSpPr/>
+          <p:nvPr/>
+        </p:nvSpPr>
+        <p:spPr>
+          <a:xfrm>
+            <a:off x="5306165" y="4556076"/>
+            <a:ext cx="708186" cy="346760"/>
           </a:xfrm>
           <a:prstGeom prst="rect">
             <a:avLst/>
           </a:prstGeom>
-          <a:noFill/>
-        </p:spPr>
-        <p:txBody>
-          <a:bodyPr wrap="square" lIns="0" tIns="0" rIns="0" bIns="0" rtlCol="0">
-            <a:noAutofit/>
-          </a:bodyPr>
+          <a:ln w="19050">
+            <a:solidFill>
+              <a:srgbClr val="7030A0"/>
+            </a:solidFill>
+          </a:ln>
+          <a:effectLst/>
+        </p:spPr>
+        <p:style>
+          <a:lnRef idx="1">
+            <a:schemeClr val="accent4"/>
+          </a:lnRef>
+          <a:fillRef idx="2">
+            <a:schemeClr val="accent4"/>
+          </a:fillRef>
+          <a:effectRef idx="1">
+            <a:schemeClr val="accent4"/>
+          </a:effectRef>
+          <a:fontRef idx="minor">
+            <a:schemeClr val="dk1"/>
+          </a:fontRef>
+        </p:style>
+        <p:txBody>
+          <a:bodyPr rtlCol="0" anchor="ctr"/>
           <a:lstStyle/>
           <a:p>
             <a:pPr algn="ctr"/>
             <a:r>
-              <a:rPr lang="en-US" sz="1100" dirty="0">
+              <a:rPr lang="en-US" sz="1050" dirty="0">
                 <a:solidFill>
                   <a:srgbClr val="7030A0"/>
                 </a:solidFill>
               </a:rPr>
-              <a:t>*</a:t>
-            </a:r>
-            <a:endParaRPr lang="en-SG" sz="1100" dirty="0">
+              <a:t>Group</a:t>
+            </a:r>
+            <a:endParaRPr lang="en-SG" sz="1050" dirty="0">
               <a:solidFill>
                 <a:srgbClr val="7030A0"/>
               </a:solidFill>
@@ -8792,72 +9016,25 @@
       </p:sp>
       <p:sp>
         <p:nvSpPr>
-          <p:cNvPr id="112" name="TextBox 111">
-            <a:extLst>
-              <a:ext uri="{FF2B5EF4-FFF2-40B4-BE49-F238E27FC236}">
-                <a16:creationId xmlns:a16="http://schemas.microsoft.com/office/drawing/2014/main" id="{BF08E600-87FF-4DCE-9A1D-6B5B075474AB}"/>
-              </a:ext>
-            </a:extLst>
-          </p:cNvPr>
-          <p:cNvSpPr txBox="1"/>
-          <p:nvPr/>
-        </p:nvSpPr>
-        <p:spPr>
-          <a:xfrm>
-            <a:off x="3399635" y="1791972"/>
-            <a:ext cx="189257" cy="178683"/>
-          </a:xfrm>
-          <a:prstGeom prst="rect">
+          <p:cNvPr id="128" name="Flowchart: Decision 96">
+            <a:extLst>
+              <a:ext uri="{FF2B5EF4-FFF2-40B4-BE49-F238E27FC236}">
+                <a16:creationId xmlns:a16="http://schemas.microsoft.com/office/drawing/2014/main" id="{5B91E798-8A35-402A-937C-C1B3B5FCD630}"/>
+              </a:ext>
+            </a:extLst>
+          </p:cNvPr>
+          <p:cNvSpPr/>
+          <p:nvPr/>
+        </p:nvSpPr>
+        <p:spPr>
+          <a:xfrm>
+            <a:off x="4910948" y="4639075"/>
+            <a:ext cx="236048" cy="173380"/>
+          </a:xfrm>
+          <a:prstGeom prst="flowChartDecision">
             <a:avLst/>
           </a:prstGeom>
           <a:noFill/>
-        </p:spPr>
-        <p:txBody>
-          <a:bodyPr wrap="square" lIns="0" tIns="0" rIns="0" bIns="0" rtlCol="0">
-            <a:noAutofit/>
-          </a:bodyPr>
-          <a:lstStyle/>
-          <a:p>
-            <a:pPr algn="ctr"/>
-            <a:r>
-              <a:rPr lang="en-US" sz="1100" dirty="0">
-                <a:solidFill>
-                  <a:srgbClr val="7030A0"/>
-                </a:solidFill>
-              </a:rPr>
-              <a:t>1</a:t>
-            </a:r>
-            <a:endParaRPr lang="en-SG" sz="1100" dirty="0">
-              <a:solidFill>
-                <a:srgbClr val="7030A0"/>
-              </a:solidFill>
-            </a:endParaRPr>
-          </a:p>
-        </p:txBody>
-      </p:sp>
-      <p:sp>
-        <p:nvSpPr>
-          <p:cNvPr id="113" name="Flowchart: Decision 96">
-            <a:extLst>
-              <a:ext uri="{FF2B5EF4-FFF2-40B4-BE49-F238E27FC236}">
-                <a16:creationId xmlns:a16="http://schemas.microsoft.com/office/drawing/2014/main" id="{D2E5E929-2631-4E78-BDFD-8235718EEF95}"/>
-              </a:ext>
-            </a:extLst>
-          </p:cNvPr>
-          <p:cNvSpPr/>
-          <p:nvPr/>
-        </p:nvSpPr>
-        <p:spPr>
-          <a:xfrm>
-            <a:off x="4943864" y="1881081"/>
-            <a:ext cx="236048" cy="173380"/>
-          </a:xfrm>
-          <a:prstGeom prst="flowChartDecision">
-            <a:avLst/>
-          </a:prstGeom>
-          <a:solidFill>
-            <a:srgbClr val="7030A0"/>
-          </a:solidFill>
           <a:ln w="19050">
             <a:solidFill>
               <a:srgbClr val="7030A0"/>
@@ -8890,29 +9067,27 @@
       </p:sp>
       <p:cxnSp>
         <p:nvCxnSpPr>
-          <p:cNvPr id="114" name="Elbow Connector 78">
-            <a:extLst>
-              <a:ext uri="{FF2B5EF4-FFF2-40B4-BE49-F238E27FC236}">
-                <a16:creationId xmlns:a16="http://schemas.microsoft.com/office/drawing/2014/main" id="{7F7C41C1-701C-4E78-99DA-29CA4CB3B59B}"/>
+          <p:cNvPr id="129" name="Elbow Connector 63">
+            <a:extLst>
+              <a:ext uri="{FF2B5EF4-FFF2-40B4-BE49-F238E27FC236}">
+                <a16:creationId xmlns:a16="http://schemas.microsoft.com/office/drawing/2014/main" id="{E17DE370-3EF0-46F1-B19D-3275AE27067F}"/>
               </a:ext>
             </a:extLst>
           </p:cNvPr>
           <p:cNvCxnSpPr>
             <a:cxnSpLocks/>
-            <a:stCxn id="108" idx="3"/>
-            <a:endCxn id="110" idx="2"/>
+            <a:stCxn id="128" idx="3"/>
+            <a:endCxn id="127" idx="1"/>
           </p:cNvCxnSpPr>
           <p:nvPr/>
         </p:nvCxnSpPr>
         <p:spPr>
-          <a:xfrm rot="16200000" flipV="1">
-            <a:off x="5590433" y="2138778"/>
-            <a:ext cx="227001" cy="217"/>
+          <a:xfrm>
+            <a:off x="5146996" y="4725765"/>
+            <a:ext cx="159169" cy="3691"/>
           </a:xfrm>
           <a:prstGeom prst="bentConnector3">
-            <a:avLst>
-              <a:gd name="adj1" fmla="val 50000"/>
-            </a:avLst>
+            <a:avLst/>
           </a:prstGeom>
           <a:ln w="19050">
             <a:solidFill>
@@ -8938,61 +9113,12 @@
           </a:fontRef>
         </p:style>
       </p:cxnSp>
-      <p:cxnSp>
-        <p:nvCxnSpPr>
-          <p:cNvPr id="115" name="Elbow Connector 63">
-            <a:extLst>
-              <a:ext uri="{FF2B5EF4-FFF2-40B4-BE49-F238E27FC236}">
-                <a16:creationId xmlns:a16="http://schemas.microsoft.com/office/drawing/2014/main" id="{1D0DA199-655E-41FD-A938-359B959927E9}"/>
-              </a:ext>
-            </a:extLst>
-          </p:cNvPr>
-          <p:cNvCxnSpPr>
-            <a:stCxn id="116" idx="3"/>
-          </p:cNvCxnSpPr>
-          <p:nvPr/>
-        </p:nvCxnSpPr>
-        <p:spPr>
-          <a:xfrm rot="5400000">
-            <a:off x="2503171" y="2306353"/>
-            <a:ext cx="293825" cy="5938"/>
-          </a:xfrm>
-          <a:prstGeom prst="bentConnector3">
-            <a:avLst>
-              <a:gd name="adj1" fmla="val 50000"/>
-            </a:avLst>
-          </a:prstGeom>
-          <a:ln w="19050">
-            <a:solidFill>
-              <a:srgbClr val="7030A0"/>
-            </a:solidFill>
-            <a:prstDash val="sysDot"/>
-            <a:headEnd type="none" w="med" len="med"/>
-            <a:tailEnd type="none" w="med" len="med"/>
-          </a:ln>
-          <a:effectLst/>
-        </p:spPr>
-        <p:style>
-          <a:lnRef idx="1">
-            <a:schemeClr val="accent2"/>
-          </a:lnRef>
-          <a:fillRef idx="2">
-            <a:schemeClr val="accent2"/>
-          </a:fillRef>
-          <a:effectRef idx="1">
-            <a:schemeClr val="accent2"/>
-          </a:effectRef>
-          <a:fontRef idx="minor">
-            <a:schemeClr val="dk1"/>
-          </a:fontRef>
-        </p:style>
-      </p:cxnSp>
-      <p:sp>
-        <p:nvSpPr>
-          <p:cNvPr id="116" name="Isosceles Triangle 102">
-            <a:extLst>
-              <a:ext uri="{FF2B5EF4-FFF2-40B4-BE49-F238E27FC236}">
-                <a16:creationId xmlns:a16="http://schemas.microsoft.com/office/drawing/2014/main" id="{D9BD3BCB-F66C-4AAD-8A02-2814AD889493}"/>
+      <p:sp>
+        <p:nvSpPr>
+          <p:cNvPr id="130" name="Rectangle 8">
+            <a:extLst>
+              <a:ext uri="{FF2B5EF4-FFF2-40B4-BE49-F238E27FC236}">
+                <a16:creationId xmlns:a16="http://schemas.microsoft.com/office/drawing/2014/main" id="{91D39219-BB3D-446D-8506-816FA59699B1}"/>
               </a:ext>
             </a:extLst>
           </p:cNvPr>
@@ -9000,11 +9126,11 @@
           <p:nvPr/>
         </p:nvSpPr>
         <p:spPr>
-          <a:xfrm rot="10800000" flipV="1">
-            <a:off x="2511859" y="2005348"/>
-            <a:ext cx="282387" cy="157062"/>
-          </a:xfrm>
-          <a:prstGeom prst="triangle">
+          <a:xfrm>
+            <a:off x="6718276" y="4388980"/>
+            <a:ext cx="872785" cy="285783"/>
+          </a:xfrm>
+          <a:prstGeom prst="rect">
             <a:avLst/>
           </a:prstGeom>
           <a:ln w="19050">
@@ -9033,9 +9159,17 @@
           <a:lstStyle/>
           <a:p>
             <a:pPr algn="ctr"/>
-            <a:endParaRPr lang="en-SG" sz="1050" b="1">
+            <a:r>
+              <a:rPr lang="en-US" sz="1050" dirty="0">
+                <a:solidFill>
+                  <a:srgbClr val="7030A0"/>
+                </a:solidFill>
+              </a:rPr>
+              <a:t>GroupName</a:t>
+            </a:r>
+            <a:endParaRPr lang="en-SG" sz="1050" dirty="0">
               <a:solidFill>
-                <a:srgbClr val="92D050"/>
+                <a:srgbClr val="7030A0"/>
               </a:solidFill>
             </a:endParaRPr>
           </a:p>
@@ -9043,10 +9177,10 @@
       </p:sp>
       <p:sp>
         <p:nvSpPr>
-          <p:cNvPr id="117" name="Rectangle 8">
-            <a:extLst>
-              <a:ext uri="{FF2B5EF4-FFF2-40B4-BE49-F238E27FC236}">
-                <a16:creationId xmlns:a16="http://schemas.microsoft.com/office/drawing/2014/main" id="{AF925E17-F7B8-4427-9833-2CD74A9E3FE8}"/>
+          <p:cNvPr id="131" name="Flowchart: Decision 96">
+            <a:extLst>
+              <a:ext uri="{FF2B5EF4-FFF2-40B4-BE49-F238E27FC236}">
+                <a16:creationId xmlns:a16="http://schemas.microsoft.com/office/drawing/2014/main" id="{47F01E99-ABD2-4DCD-8024-BB0F0903B403}"/>
               </a:ext>
             </a:extLst>
           </p:cNvPr>
@@ -9055,8 +9189,110 @@
         </p:nvSpPr>
         <p:spPr>
           <a:xfrm>
-            <a:off x="210482" y="1617144"/>
-            <a:ext cx="1443661" cy="364396"/>
+            <a:off x="6034435" y="4646211"/>
+            <a:ext cx="236048" cy="173380"/>
+          </a:xfrm>
+          <a:prstGeom prst="flowChartDecision">
+            <a:avLst/>
+          </a:prstGeom>
+          <a:solidFill>
+            <a:srgbClr val="7030A0"/>
+          </a:solidFill>
+          <a:ln w="19050">
+            <a:solidFill>
+              <a:srgbClr val="7030A0"/>
+            </a:solidFill>
+          </a:ln>
+          <a:effectLst/>
+        </p:spPr>
+        <p:style>
+          <a:lnRef idx="1">
+            <a:schemeClr val="accent6"/>
+          </a:lnRef>
+          <a:fillRef idx="2">
+            <a:schemeClr val="accent6"/>
+          </a:fillRef>
+          <a:effectRef idx="1">
+            <a:schemeClr val="accent6"/>
+          </a:effectRef>
+          <a:fontRef idx="minor">
+            <a:schemeClr val="dk1"/>
+          </a:fontRef>
+        </p:style>
+        <p:txBody>
+          <a:bodyPr rtlCol="0" anchor="ctr"/>
+          <a:lstStyle/>
+          <a:p>
+            <a:pPr algn="ctr"/>
+            <a:endParaRPr lang="en-US" sz="1050"/>
+          </a:p>
+        </p:txBody>
+      </p:sp>
+      <p:cxnSp>
+        <p:nvCxnSpPr>
+          <p:cNvPr id="132" name="Elbow Connector 78">
+            <a:extLst>
+              <a:ext uri="{FF2B5EF4-FFF2-40B4-BE49-F238E27FC236}">
+                <a16:creationId xmlns:a16="http://schemas.microsoft.com/office/drawing/2014/main" id="{C0A32DE1-8F7F-4B2C-A7AD-D5D562133E22}"/>
+              </a:ext>
+            </a:extLst>
+          </p:cNvPr>
+          <p:cNvCxnSpPr>
+            <a:cxnSpLocks/>
+            <a:endCxn id="130" idx="1"/>
+          </p:cNvCxnSpPr>
+          <p:nvPr/>
+        </p:nvCxnSpPr>
+        <p:spPr>
+          <a:xfrm flipV="1">
+            <a:off x="6270483" y="4531872"/>
+            <a:ext cx="447793" cy="200722"/>
+          </a:xfrm>
+          <a:prstGeom prst="bentConnector3">
+            <a:avLst>
+              <a:gd name="adj1" fmla="val 56807"/>
+            </a:avLst>
+          </a:prstGeom>
+          <a:ln w="19050">
+            <a:solidFill>
+              <a:srgbClr val="7030A0"/>
+            </a:solidFill>
+            <a:headEnd type="none" w="med" len="med"/>
+            <a:tailEnd type="arrow" w="med" len="med"/>
+          </a:ln>
+          <a:effectLst/>
+        </p:spPr>
+        <p:style>
+          <a:lnRef idx="1">
+            <a:schemeClr val="accent2"/>
+          </a:lnRef>
+          <a:fillRef idx="2">
+            <a:schemeClr val="accent2"/>
+          </a:fillRef>
+          <a:effectRef idx="1">
+            <a:schemeClr val="accent2"/>
+          </a:effectRef>
+          <a:fontRef idx="minor">
+            <a:schemeClr val="dk1"/>
+          </a:fontRef>
+        </p:style>
+      </p:cxnSp>
+      <p:sp>
+        <p:nvSpPr>
+          <p:cNvPr id="133" name="Rectangle 8">
+            <a:extLst>
+              <a:ext uri="{FF2B5EF4-FFF2-40B4-BE49-F238E27FC236}">
+                <a16:creationId xmlns:a16="http://schemas.microsoft.com/office/drawing/2014/main" id="{CB08B0BD-03EB-4281-8B4F-71070F9F1319}"/>
+              </a:ext>
+            </a:extLst>
+          </p:cNvPr>
+          <p:cNvSpPr/>
+          <p:nvPr/>
+        </p:nvSpPr>
+        <p:spPr>
+          <a:xfrm>
+            <a:off x="6704884" y="4742376"/>
+            <a:ext cx="1042921" cy="285783"/>
           </a:xfrm>
           <a:prstGeom prst="rect">
             <a:avLst/>
@@ -9093,22 +9329,7 @@
                   <a:srgbClr val="7030A0"/>
                 </a:solidFill>
               </a:rPr>
-              <a:t>&lt;&lt;interface&gt;&gt;</a:t>
-            </a:r>
-            <a:br>
-              <a:rPr lang="en-US" sz="1050" dirty="0">
-                <a:solidFill>
-                  <a:srgbClr val="7030A0"/>
-                </a:solidFill>
-              </a:rPr>
-            </a:br>
-            <a:r>
-              <a:rPr lang="en-US" sz="1050" dirty="0">
-                <a:solidFill>
-                  <a:srgbClr val="7030A0"/>
-                </a:solidFill>
-              </a:rPr>
-              <a:t>ReadOnlyAddressBook</a:t>
+              <a:t>GroupLocation</a:t>
             </a:r>
             <a:endParaRPr lang="en-SG" sz="1050" dirty="0">
               <a:solidFill>
@@ -9118,262 +9339,30 @@
           </a:p>
         </p:txBody>
       </p:sp>
-      <p:sp>
-        <p:nvSpPr>
-          <p:cNvPr id="118" name="Rectangle 8">
-            <a:extLst>
-              <a:ext uri="{FF2B5EF4-FFF2-40B4-BE49-F238E27FC236}">
-                <a16:creationId xmlns:a16="http://schemas.microsoft.com/office/drawing/2014/main" id="{58C519AB-00A8-4347-887C-20A1EF856C59}"/>
-              </a:ext>
-            </a:extLst>
-          </p:cNvPr>
-          <p:cNvSpPr/>
-          <p:nvPr/>
-        </p:nvSpPr>
-        <p:spPr>
-          <a:xfrm>
-            <a:off x="2119741" y="1617144"/>
-            <a:ext cx="1060683" cy="364396"/>
-          </a:xfrm>
-          <a:prstGeom prst="rect">
-            <a:avLst/>
-          </a:prstGeom>
-          <a:ln w="19050">
-            <a:solidFill>
-              <a:srgbClr val="7030A0"/>
-            </a:solidFill>
-          </a:ln>
-          <a:effectLst/>
-        </p:spPr>
-        <p:style>
-          <a:lnRef idx="1">
-            <a:schemeClr val="accent4"/>
-          </a:lnRef>
-          <a:fillRef idx="2">
-            <a:schemeClr val="accent4"/>
-          </a:fillRef>
-          <a:effectRef idx="1">
-            <a:schemeClr val="accent4"/>
-          </a:effectRef>
-          <a:fontRef idx="minor">
-            <a:schemeClr val="dk1"/>
-          </a:fontRef>
-        </p:style>
-        <p:txBody>
-          <a:bodyPr rtlCol="0" anchor="ctr"/>
-          <a:lstStyle/>
-          <a:p>
-            <a:pPr algn="ctr"/>
-            <a:r>
-              <a:rPr lang="en-US" sz="1050" dirty="0">
-                <a:solidFill>
-                  <a:srgbClr val="7030A0"/>
-                </a:solidFill>
-              </a:rPr>
-              <a:t>AddressBook</a:t>
-            </a:r>
-            <a:endParaRPr lang="en-SG" sz="1050" dirty="0">
-              <a:solidFill>
-                <a:srgbClr val="7030A0"/>
-              </a:solidFill>
-            </a:endParaRPr>
-          </a:p>
-        </p:txBody>
-      </p:sp>
-      <p:sp>
-        <p:nvSpPr>
-          <p:cNvPr id="119" name="Isosceles Triangle 102">
-            <a:extLst>
-              <a:ext uri="{FF2B5EF4-FFF2-40B4-BE49-F238E27FC236}">
-                <a16:creationId xmlns:a16="http://schemas.microsoft.com/office/drawing/2014/main" id="{BCEDEECA-3E51-4230-B5D1-1F6CE7D89DD6}"/>
-              </a:ext>
-            </a:extLst>
-          </p:cNvPr>
-          <p:cNvSpPr/>
-          <p:nvPr/>
-        </p:nvSpPr>
-        <p:spPr>
-          <a:xfrm rot="16200000">
-            <a:off x="1618633" y="1687952"/>
-            <a:ext cx="271014" cy="187417"/>
-          </a:xfrm>
-          <a:prstGeom prst="triangle">
-            <a:avLst>
-              <a:gd name="adj" fmla="val 44517"/>
-            </a:avLst>
-          </a:prstGeom>
-          <a:solidFill>
-            <a:schemeClr val="accent4">
-              <a:lumMod val="20000"/>
-              <a:lumOff val="80000"/>
-            </a:schemeClr>
-          </a:solidFill>
-          <a:ln w="19050">
-            <a:solidFill>
-              <a:srgbClr val="7030A0"/>
-            </a:solidFill>
-          </a:ln>
-          <a:effectLst/>
-        </p:spPr>
-        <p:style>
-          <a:lnRef idx="1">
-            <a:schemeClr val="accent6"/>
-          </a:lnRef>
-          <a:fillRef idx="2">
-            <a:schemeClr val="accent6"/>
-          </a:fillRef>
-          <a:effectRef idx="1">
-            <a:schemeClr val="accent6"/>
-          </a:effectRef>
-          <a:fontRef idx="minor">
-            <a:schemeClr val="dk1"/>
-          </a:fontRef>
-        </p:style>
-        <p:txBody>
-          <a:bodyPr rtlCol="0" anchor="ctr"/>
-          <a:lstStyle/>
-          <a:p>
-            <a:pPr algn="ctr"/>
-            <a:endParaRPr lang="en-SG" sz="1050"/>
-          </a:p>
-        </p:txBody>
-      </p:sp>
       <p:cxnSp>
         <p:nvCxnSpPr>
-          <p:cNvPr id="120" name="Elbow Connector 63">
-            <a:extLst>
-              <a:ext uri="{FF2B5EF4-FFF2-40B4-BE49-F238E27FC236}">
-                <a16:creationId xmlns:a16="http://schemas.microsoft.com/office/drawing/2014/main" id="{A31B7AAE-1596-484B-857D-2B41C6C7632C}"/>
+          <p:cNvPr id="134" name="Elbow Connector 80">
+            <a:extLst>
+              <a:ext uri="{FF2B5EF4-FFF2-40B4-BE49-F238E27FC236}">
+                <a16:creationId xmlns:a16="http://schemas.microsoft.com/office/drawing/2014/main" id="{E67A786C-F4DA-4102-99B4-E9B904571B2C}"/>
               </a:ext>
             </a:extLst>
           </p:cNvPr>
           <p:cNvCxnSpPr>
-            <a:stCxn id="119" idx="3"/>
-            <a:endCxn id="118" idx="1"/>
+            <a:cxnSpLocks/>
+            <a:stCxn id="131" idx="3"/>
+            <a:endCxn id="133" idx="1"/>
           </p:cNvCxnSpPr>
           <p:nvPr/>
         </p:nvCxnSpPr>
         <p:spPr>
           <a:xfrm>
-            <a:off x="1847849" y="1796521"/>
-            <a:ext cx="271892" cy="2821"/>
+            <a:off x="6270483" y="4732901"/>
+            <a:ext cx="434401" cy="152367"/>
           </a:xfrm>
           <a:prstGeom prst="bentConnector3">
             <a:avLst>
-              <a:gd name="adj1" fmla="val 50000"/>
-            </a:avLst>
-          </a:prstGeom>
-          <a:ln w="19050">
-            <a:solidFill>
-              <a:srgbClr val="7030A0"/>
-            </a:solidFill>
-            <a:prstDash val="sysDot"/>
-            <a:headEnd type="none" w="med" len="med"/>
-            <a:tailEnd type="none" w="med" len="med"/>
-          </a:ln>
-          <a:effectLst/>
-        </p:spPr>
-        <p:style>
-          <a:lnRef idx="1">
-            <a:schemeClr val="accent2"/>
-          </a:lnRef>
-          <a:fillRef idx="2">
-            <a:schemeClr val="accent2"/>
-          </a:fillRef>
-          <a:effectRef idx="1">
-            <a:schemeClr val="accent2"/>
-          </a:effectRef>
-          <a:fontRef idx="minor">
-            <a:schemeClr val="dk1"/>
-          </a:fontRef>
-        </p:style>
-      </p:cxnSp>
-      <p:sp>
-        <p:nvSpPr>
-          <p:cNvPr id="124" name="Rectangle 8">
-            <a:extLst>
-              <a:ext uri="{FF2B5EF4-FFF2-40B4-BE49-F238E27FC236}">
-                <a16:creationId xmlns:a16="http://schemas.microsoft.com/office/drawing/2014/main" id="{8712D3FD-C79B-47F3-9F19-106CFBD5BF84}"/>
-              </a:ext>
-            </a:extLst>
-          </p:cNvPr>
-          <p:cNvSpPr/>
-          <p:nvPr/>
-        </p:nvSpPr>
-        <p:spPr>
-          <a:xfrm>
-            <a:off x="3754697" y="4561444"/>
-            <a:ext cx="1156969" cy="346760"/>
-          </a:xfrm>
-          <a:prstGeom prst="rect">
-            <a:avLst/>
-          </a:prstGeom>
-          <a:ln w="19050">
-            <a:solidFill>
-              <a:srgbClr val="7030A0"/>
-            </a:solidFill>
-          </a:ln>
-          <a:effectLst/>
-        </p:spPr>
-        <p:style>
-          <a:lnRef idx="1">
-            <a:schemeClr val="accent4"/>
-          </a:lnRef>
-          <a:fillRef idx="2">
-            <a:schemeClr val="accent4"/>
-          </a:fillRef>
-          <a:effectRef idx="1">
-            <a:schemeClr val="accent4"/>
-          </a:effectRef>
-          <a:fontRef idx="minor">
-            <a:schemeClr val="dk1"/>
-          </a:fontRef>
-        </p:style>
-        <p:txBody>
-          <a:bodyPr rtlCol="0" anchor="ctr"/>
-          <a:lstStyle/>
-          <a:p>
-            <a:pPr algn="ctr"/>
-            <a:r>
-              <a:rPr lang="en-US" sz="1050" dirty="0">
-                <a:solidFill>
-                  <a:srgbClr val="7030A0"/>
-                </a:solidFill>
-              </a:rPr>
-              <a:t>UniqueGroupList</a:t>
-            </a:r>
-            <a:endParaRPr lang="en-SG" sz="1050" dirty="0">
-              <a:solidFill>
-                <a:srgbClr val="7030A0"/>
-              </a:solidFill>
-            </a:endParaRPr>
-          </a:p>
-        </p:txBody>
-      </p:sp>
-      <p:cxnSp>
-        <p:nvCxnSpPr>
-          <p:cNvPr id="126" name="Elbow Connector 29">
-            <a:extLst>
-              <a:ext uri="{FF2B5EF4-FFF2-40B4-BE49-F238E27FC236}">
-                <a16:creationId xmlns:a16="http://schemas.microsoft.com/office/drawing/2014/main" id="{741C5E9A-1D39-421F-9973-8F65DC6CA224}"/>
-              </a:ext>
-            </a:extLst>
-          </p:cNvPr>
-          <p:cNvCxnSpPr>
-            <a:cxnSpLocks/>
-            <a:stCxn id="83" idx="3"/>
-            <a:endCxn id="124" idx="1"/>
-          </p:cNvCxnSpPr>
-          <p:nvPr/>
-        </p:nvCxnSpPr>
-        <p:spPr>
-          <a:xfrm>
-            <a:off x="3501829" y="2653891"/>
-            <a:ext cx="252868" cy="2080933"/>
-          </a:xfrm>
-          <a:prstGeom prst="bentConnector3">
-            <a:avLst>
-              <a:gd name="adj1" fmla="val 1785"/>
+              <a:gd name="adj1" fmla="val 58420"/>
             </a:avLst>
           </a:prstGeom>
           <a:ln w="19050">
@@ -9402,443 +9391,6 @@
       </p:cxnSp>
       <p:sp>
         <p:nvSpPr>
-          <p:cNvPr id="127" name="Rectangle 8">
-            <a:extLst>
-              <a:ext uri="{FF2B5EF4-FFF2-40B4-BE49-F238E27FC236}">
-                <a16:creationId xmlns:a16="http://schemas.microsoft.com/office/drawing/2014/main" id="{E7D89583-AEEE-43B8-8362-305207A0A8D7}"/>
-              </a:ext>
-            </a:extLst>
-          </p:cNvPr>
-          <p:cNvSpPr/>
-          <p:nvPr/>
-        </p:nvSpPr>
-        <p:spPr>
-          <a:xfrm>
-            <a:off x="5306165" y="4556076"/>
-            <a:ext cx="708186" cy="346760"/>
-          </a:xfrm>
-          <a:prstGeom prst="rect">
-            <a:avLst/>
-          </a:prstGeom>
-          <a:ln w="19050">
-            <a:solidFill>
-              <a:srgbClr val="7030A0"/>
-            </a:solidFill>
-          </a:ln>
-          <a:effectLst/>
-        </p:spPr>
-        <p:style>
-          <a:lnRef idx="1">
-            <a:schemeClr val="accent4"/>
-          </a:lnRef>
-          <a:fillRef idx="2">
-            <a:schemeClr val="accent4"/>
-          </a:fillRef>
-          <a:effectRef idx="1">
-            <a:schemeClr val="accent4"/>
-          </a:effectRef>
-          <a:fontRef idx="minor">
-            <a:schemeClr val="dk1"/>
-          </a:fontRef>
-        </p:style>
-        <p:txBody>
-          <a:bodyPr rtlCol="0" anchor="ctr"/>
-          <a:lstStyle/>
-          <a:p>
-            <a:pPr algn="ctr"/>
-            <a:r>
-              <a:rPr lang="en-US" sz="1050" dirty="0">
-                <a:solidFill>
-                  <a:srgbClr val="7030A0"/>
-                </a:solidFill>
-              </a:rPr>
-              <a:t>Group</a:t>
-            </a:r>
-            <a:endParaRPr lang="en-SG" sz="1050" dirty="0">
-              <a:solidFill>
-                <a:srgbClr val="7030A0"/>
-              </a:solidFill>
-            </a:endParaRPr>
-          </a:p>
-        </p:txBody>
-      </p:sp>
-      <p:sp>
-        <p:nvSpPr>
-          <p:cNvPr id="128" name="Flowchart: Decision 96">
-            <a:extLst>
-              <a:ext uri="{FF2B5EF4-FFF2-40B4-BE49-F238E27FC236}">
-                <a16:creationId xmlns:a16="http://schemas.microsoft.com/office/drawing/2014/main" id="{5B91E798-8A35-402A-937C-C1B3B5FCD630}"/>
-              </a:ext>
-            </a:extLst>
-          </p:cNvPr>
-          <p:cNvSpPr/>
-          <p:nvPr/>
-        </p:nvSpPr>
-        <p:spPr>
-          <a:xfrm>
-            <a:off x="4910948" y="4639075"/>
-            <a:ext cx="236048" cy="173380"/>
-          </a:xfrm>
-          <a:prstGeom prst="flowChartDecision">
-            <a:avLst/>
-          </a:prstGeom>
-          <a:noFill/>
-          <a:ln w="19050">
-            <a:solidFill>
-              <a:srgbClr val="7030A0"/>
-            </a:solidFill>
-          </a:ln>
-          <a:effectLst/>
-        </p:spPr>
-        <p:style>
-          <a:lnRef idx="1">
-            <a:schemeClr val="accent6"/>
-          </a:lnRef>
-          <a:fillRef idx="2">
-            <a:schemeClr val="accent6"/>
-          </a:fillRef>
-          <a:effectRef idx="1">
-            <a:schemeClr val="accent6"/>
-          </a:effectRef>
-          <a:fontRef idx="minor">
-            <a:schemeClr val="dk1"/>
-          </a:fontRef>
-        </p:style>
-        <p:txBody>
-          <a:bodyPr rtlCol="0" anchor="ctr"/>
-          <a:lstStyle/>
-          <a:p>
-            <a:pPr algn="ctr"/>
-            <a:endParaRPr lang="en-US" sz="1050"/>
-          </a:p>
-        </p:txBody>
-      </p:sp>
-      <p:cxnSp>
-        <p:nvCxnSpPr>
-          <p:cNvPr id="129" name="Elbow Connector 63">
-            <a:extLst>
-              <a:ext uri="{FF2B5EF4-FFF2-40B4-BE49-F238E27FC236}">
-                <a16:creationId xmlns:a16="http://schemas.microsoft.com/office/drawing/2014/main" id="{E17DE370-3EF0-46F1-B19D-3275AE27067F}"/>
-              </a:ext>
-            </a:extLst>
-          </p:cNvPr>
-          <p:cNvCxnSpPr>
-            <a:cxnSpLocks/>
-            <a:stCxn id="128" idx="3"/>
-            <a:endCxn id="127" idx="1"/>
-          </p:cNvCxnSpPr>
-          <p:nvPr/>
-        </p:nvCxnSpPr>
-        <p:spPr>
-          <a:xfrm>
-            <a:off x="5146996" y="4725765"/>
-            <a:ext cx="159169" cy="3691"/>
-          </a:xfrm>
-          <a:prstGeom prst="bentConnector3">
-            <a:avLst/>
-          </a:prstGeom>
-          <a:ln w="19050">
-            <a:solidFill>
-              <a:srgbClr val="7030A0"/>
-            </a:solidFill>
-            <a:headEnd type="none" w="med" len="med"/>
-            <a:tailEnd type="arrow" w="med" len="med"/>
-          </a:ln>
-          <a:effectLst/>
-        </p:spPr>
-        <p:style>
-          <a:lnRef idx="1">
-            <a:schemeClr val="accent2"/>
-          </a:lnRef>
-          <a:fillRef idx="2">
-            <a:schemeClr val="accent2"/>
-          </a:fillRef>
-          <a:effectRef idx="1">
-            <a:schemeClr val="accent2"/>
-          </a:effectRef>
-          <a:fontRef idx="minor">
-            <a:schemeClr val="dk1"/>
-          </a:fontRef>
-        </p:style>
-      </p:cxnSp>
-      <p:sp>
-        <p:nvSpPr>
-          <p:cNvPr id="130" name="Rectangle 8">
-            <a:extLst>
-              <a:ext uri="{FF2B5EF4-FFF2-40B4-BE49-F238E27FC236}">
-                <a16:creationId xmlns:a16="http://schemas.microsoft.com/office/drawing/2014/main" id="{91D39219-BB3D-446D-8506-816FA59699B1}"/>
-              </a:ext>
-            </a:extLst>
-          </p:cNvPr>
-          <p:cNvSpPr/>
-          <p:nvPr/>
-        </p:nvSpPr>
-        <p:spPr>
-          <a:xfrm>
-            <a:off x="6718276" y="4388980"/>
-            <a:ext cx="872785" cy="285783"/>
-          </a:xfrm>
-          <a:prstGeom prst="rect">
-            <a:avLst/>
-          </a:prstGeom>
-          <a:ln w="19050">
-            <a:solidFill>
-              <a:srgbClr val="7030A0"/>
-            </a:solidFill>
-          </a:ln>
-          <a:effectLst/>
-        </p:spPr>
-        <p:style>
-          <a:lnRef idx="1">
-            <a:schemeClr val="accent4"/>
-          </a:lnRef>
-          <a:fillRef idx="2">
-            <a:schemeClr val="accent4"/>
-          </a:fillRef>
-          <a:effectRef idx="1">
-            <a:schemeClr val="accent4"/>
-          </a:effectRef>
-          <a:fontRef idx="minor">
-            <a:schemeClr val="dk1"/>
-          </a:fontRef>
-        </p:style>
-        <p:txBody>
-          <a:bodyPr rtlCol="0" anchor="ctr"/>
-          <a:lstStyle/>
-          <a:p>
-            <a:pPr algn="ctr"/>
-            <a:r>
-              <a:rPr lang="en-US" sz="1050" dirty="0">
-                <a:solidFill>
-                  <a:srgbClr val="7030A0"/>
-                </a:solidFill>
-              </a:rPr>
-              <a:t>GroupName</a:t>
-            </a:r>
-            <a:endParaRPr lang="en-SG" sz="1050" dirty="0">
-              <a:solidFill>
-                <a:srgbClr val="7030A0"/>
-              </a:solidFill>
-            </a:endParaRPr>
-          </a:p>
-        </p:txBody>
-      </p:sp>
-      <p:sp>
-        <p:nvSpPr>
-          <p:cNvPr id="131" name="Flowchart: Decision 96">
-            <a:extLst>
-              <a:ext uri="{FF2B5EF4-FFF2-40B4-BE49-F238E27FC236}">
-                <a16:creationId xmlns:a16="http://schemas.microsoft.com/office/drawing/2014/main" id="{47F01E99-ABD2-4DCD-8024-BB0F0903B403}"/>
-              </a:ext>
-            </a:extLst>
-          </p:cNvPr>
-          <p:cNvSpPr/>
-          <p:nvPr/>
-        </p:nvSpPr>
-        <p:spPr>
-          <a:xfrm>
-            <a:off x="6034435" y="4646211"/>
-            <a:ext cx="236048" cy="173380"/>
-          </a:xfrm>
-          <a:prstGeom prst="flowChartDecision">
-            <a:avLst/>
-          </a:prstGeom>
-          <a:solidFill>
-            <a:srgbClr val="7030A0"/>
-          </a:solidFill>
-          <a:ln w="19050">
-            <a:solidFill>
-              <a:srgbClr val="7030A0"/>
-            </a:solidFill>
-          </a:ln>
-          <a:effectLst/>
-        </p:spPr>
-        <p:style>
-          <a:lnRef idx="1">
-            <a:schemeClr val="accent6"/>
-          </a:lnRef>
-          <a:fillRef idx="2">
-            <a:schemeClr val="accent6"/>
-          </a:fillRef>
-          <a:effectRef idx="1">
-            <a:schemeClr val="accent6"/>
-          </a:effectRef>
-          <a:fontRef idx="minor">
-            <a:schemeClr val="dk1"/>
-          </a:fontRef>
-        </p:style>
-        <p:txBody>
-          <a:bodyPr rtlCol="0" anchor="ctr"/>
-          <a:lstStyle/>
-          <a:p>
-            <a:pPr algn="ctr"/>
-            <a:endParaRPr lang="en-US" sz="1050"/>
-          </a:p>
-        </p:txBody>
-      </p:sp>
-      <p:cxnSp>
-        <p:nvCxnSpPr>
-          <p:cNvPr id="132" name="Elbow Connector 78">
-            <a:extLst>
-              <a:ext uri="{FF2B5EF4-FFF2-40B4-BE49-F238E27FC236}">
-                <a16:creationId xmlns:a16="http://schemas.microsoft.com/office/drawing/2014/main" id="{C0A32DE1-8F7F-4B2C-A7AD-D5D562133E22}"/>
-              </a:ext>
-            </a:extLst>
-          </p:cNvPr>
-          <p:cNvCxnSpPr>
-            <a:cxnSpLocks/>
-            <a:endCxn id="130" idx="1"/>
-          </p:cNvCxnSpPr>
-          <p:nvPr/>
-        </p:nvCxnSpPr>
-        <p:spPr>
-          <a:xfrm flipV="1">
-            <a:off x="6270483" y="4531872"/>
-            <a:ext cx="447793" cy="200722"/>
-          </a:xfrm>
-          <a:prstGeom prst="bentConnector3">
-            <a:avLst>
-              <a:gd name="adj1" fmla="val 56807"/>
-            </a:avLst>
-          </a:prstGeom>
-          <a:ln w="19050">
-            <a:solidFill>
-              <a:srgbClr val="7030A0"/>
-            </a:solidFill>
-            <a:headEnd type="none" w="med" len="med"/>
-            <a:tailEnd type="arrow" w="med" len="med"/>
-          </a:ln>
-          <a:effectLst/>
-        </p:spPr>
-        <p:style>
-          <a:lnRef idx="1">
-            <a:schemeClr val="accent2"/>
-          </a:lnRef>
-          <a:fillRef idx="2">
-            <a:schemeClr val="accent2"/>
-          </a:fillRef>
-          <a:effectRef idx="1">
-            <a:schemeClr val="accent2"/>
-          </a:effectRef>
-          <a:fontRef idx="minor">
-            <a:schemeClr val="dk1"/>
-          </a:fontRef>
-        </p:style>
-      </p:cxnSp>
-      <p:sp>
-        <p:nvSpPr>
-          <p:cNvPr id="133" name="Rectangle 8">
-            <a:extLst>
-              <a:ext uri="{FF2B5EF4-FFF2-40B4-BE49-F238E27FC236}">
-                <a16:creationId xmlns:a16="http://schemas.microsoft.com/office/drawing/2014/main" id="{CB08B0BD-03EB-4281-8B4F-71070F9F1319}"/>
-              </a:ext>
-            </a:extLst>
-          </p:cNvPr>
-          <p:cNvSpPr/>
-          <p:nvPr/>
-        </p:nvSpPr>
-        <p:spPr>
-          <a:xfrm>
-            <a:off x="6704884" y="4742376"/>
-            <a:ext cx="1042921" cy="285783"/>
-          </a:xfrm>
-          <a:prstGeom prst="rect">
-            <a:avLst/>
-          </a:prstGeom>
-          <a:ln w="19050">
-            <a:solidFill>
-              <a:srgbClr val="7030A0"/>
-            </a:solidFill>
-          </a:ln>
-          <a:effectLst/>
-        </p:spPr>
-        <p:style>
-          <a:lnRef idx="1">
-            <a:schemeClr val="accent4"/>
-          </a:lnRef>
-          <a:fillRef idx="2">
-            <a:schemeClr val="accent4"/>
-          </a:fillRef>
-          <a:effectRef idx="1">
-            <a:schemeClr val="accent4"/>
-          </a:effectRef>
-          <a:fontRef idx="minor">
-            <a:schemeClr val="dk1"/>
-          </a:fontRef>
-        </p:style>
-        <p:txBody>
-          <a:bodyPr rtlCol="0" anchor="ctr"/>
-          <a:lstStyle/>
-          <a:p>
-            <a:pPr algn="ctr"/>
-            <a:r>
-              <a:rPr lang="en-US" sz="1050" dirty="0">
-                <a:solidFill>
-                  <a:srgbClr val="7030A0"/>
-                </a:solidFill>
-              </a:rPr>
-              <a:t>GroupLocation</a:t>
-            </a:r>
-            <a:endParaRPr lang="en-SG" sz="1050" dirty="0">
-              <a:solidFill>
-                <a:srgbClr val="7030A0"/>
-              </a:solidFill>
-            </a:endParaRPr>
-          </a:p>
-        </p:txBody>
-      </p:sp>
-      <p:cxnSp>
-        <p:nvCxnSpPr>
-          <p:cNvPr id="134" name="Elbow Connector 80">
-            <a:extLst>
-              <a:ext uri="{FF2B5EF4-FFF2-40B4-BE49-F238E27FC236}">
-                <a16:creationId xmlns:a16="http://schemas.microsoft.com/office/drawing/2014/main" id="{E67A786C-F4DA-4102-99B4-E9B904571B2C}"/>
-              </a:ext>
-            </a:extLst>
-          </p:cNvPr>
-          <p:cNvCxnSpPr>
-            <a:cxnSpLocks/>
-            <a:stCxn id="131" idx="3"/>
-            <a:endCxn id="133" idx="1"/>
-          </p:cNvCxnSpPr>
-          <p:nvPr/>
-        </p:nvCxnSpPr>
-        <p:spPr>
-          <a:xfrm>
-            <a:off x="6270483" y="4732901"/>
-            <a:ext cx="434401" cy="152367"/>
-          </a:xfrm>
-          <a:prstGeom prst="bentConnector3">
-            <a:avLst>
-              <a:gd name="adj1" fmla="val 58420"/>
-            </a:avLst>
-          </a:prstGeom>
-          <a:ln w="19050">
-            <a:solidFill>
-              <a:srgbClr val="7030A0"/>
-            </a:solidFill>
-            <a:headEnd type="none" w="med" len="med"/>
-            <a:tailEnd type="arrow" w="med" len="med"/>
-          </a:ln>
-          <a:effectLst/>
-        </p:spPr>
-        <p:style>
-          <a:lnRef idx="1">
-            <a:schemeClr val="accent2"/>
-          </a:lnRef>
-          <a:fillRef idx="2">
-            <a:schemeClr val="accent2"/>
-          </a:fillRef>
-          <a:effectRef idx="1">
-            <a:schemeClr val="accent2"/>
-          </a:effectRef>
-          <a:fontRef idx="minor">
-            <a:schemeClr val="dk1"/>
-          </a:fontRef>
-        </p:style>
-      </p:cxnSp>
-      <p:sp>
-        <p:nvSpPr>
           <p:cNvPr id="139" name="TextBox 138">
             <a:extLst>
               <a:ext uri="{FF2B5EF4-FFF2-40B4-BE49-F238E27FC236}">
@@ -10017,466 +9569,6 @@
           </a:p>
         </p:txBody>
       </p:sp>
-      <p:sp>
-        <p:nvSpPr>
-          <p:cNvPr id="143" name="Rectangle 8">
-            <a:extLst>
-              <a:ext uri="{FF2B5EF4-FFF2-40B4-BE49-F238E27FC236}">
-                <a16:creationId xmlns:a16="http://schemas.microsoft.com/office/drawing/2014/main" id="{9B0FA1CF-D00F-4D4D-ABA3-6EE008BB96B1}"/>
-              </a:ext>
-            </a:extLst>
-          </p:cNvPr>
-          <p:cNvSpPr/>
-          <p:nvPr/>
-        </p:nvSpPr>
-        <p:spPr>
-          <a:xfrm>
-            <a:off x="3748360" y="3904871"/>
-            <a:ext cx="1156969" cy="285783"/>
-          </a:xfrm>
-          <a:prstGeom prst="rect">
-            <a:avLst/>
-          </a:prstGeom>
-          <a:ln w="19050">
-            <a:solidFill>
-              <a:srgbClr val="7030A0"/>
-            </a:solidFill>
-          </a:ln>
-          <a:effectLst/>
-        </p:spPr>
-        <p:style>
-          <a:lnRef idx="1">
-            <a:schemeClr val="accent4"/>
-          </a:lnRef>
-          <a:fillRef idx="2">
-            <a:schemeClr val="accent4"/>
-          </a:fillRef>
-          <a:effectRef idx="1">
-            <a:schemeClr val="accent4"/>
-          </a:effectRef>
-          <a:fontRef idx="minor">
-            <a:schemeClr val="dk1"/>
-          </a:fontRef>
-        </p:style>
-        <p:txBody>
-          <a:bodyPr rtlCol="0" anchor="ctr"/>
-          <a:lstStyle/>
-          <a:p>
-            <a:pPr algn="ctr"/>
-            <a:r>
-              <a:rPr lang="en-US" sz="1050" dirty="0">
-                <a:solidFill>
-                  <a:srgbClr val="7030A0"/>
-                </a:solidFill>
-              </a:rPr>
-              <a:t>UniqueTagList</a:t>
-            </a:r>
-            <a:endParaRPr lang="en-SG" sz="1050" dirty="0">
-              <a:solidFill>
-                <a:srgbClr val="7030A0"/>
-              </a:solidFill>
-            </a:endParaRPr>
-          </a:p>
-        </p:txBody>
-      </p:sp>
-      <p:sp>
-        <p:nvSpPr>
-          <p:cNvPr id="145" name="TextBox 144">
-            <a:extLst>
-              <a:ext uri="{FF2B5EF4-FFF2-40B4-BE49-F238E27FC236}">
-                <a16:creationId xmlns:a16="http://schemas.microsoft.com/office/drawing/2014/main" id="{9AAC64C5-F38C-4DA3-A1F1-AA3F4A99338E}"/>
-              </a:ext>
-            </a:extLst>
-          </p:cNvPr>
-          <p:cNvSpPr txBox="1"/>
-          <p:nvPr/>
-        </p:nvSpPr>
-        <p:spPr>
-          <a:xfrm>
-            <a:off x="5706832" y="4128731"/>
-            <a:ext cx="189257" cy="178683"/>
-          </a:xfrm>
-          <a:prstGeom prst="rect">
-            <a:avLst/>
-          </a:prstGeom>
-          <a:noFill/>
-        </p:spPr>
-        <p:txBody>
-          <a:bodyPr wrap="square" lIns="0" tIns="0" rIns="0" bIns="0" rtlCol="0">
-            <a:noAutofit/>
-          </a:bodyPr>
-          <a:lstStyle/>
-          <a:p>
-            <a:pPr algn="ctr"/>
-            <a:r>
-              <a:rPr lang="en-US" sz="1100" dirty="0">
-                <a:solidFill>
-                  <a:srgbClr val="7030A0"/>
-                </a:solidFill>
-              </a:rPr>
-              <a:t>*</a:t>
-            </a:r>
-            <a:endParaRPr lang="en-SG" sz="1100" dirty="0">
-              <a:solidFill>
-                <a:srgbClr val="7030A0"/>
-              </a:solidFill>
-            </a:endParaRPr>
-          </a:p>
-        </p:txBody>
-      </p:sp>
-      <p:sp>
-        <p:nvSpPr>
-          <p:cNvPr id="146" name="Flowchart: Decision 96">
-            <a:extLst>
-              <a:ext uri="{FF2B5EF4-FFF2-40B4-BE49-F238E27FC236}">
-                <a16:creationId xmlns:a16="http://schemas.microsoft.com/office/drawing/2014/main" id="{77FD9996-0C8D-4942-B78A-6F64D50AC944}"/>
-              </a:ext>
-            </a:extLst>
-          </p:cNvPr>
-          <p:cNvSpPr/>
-          <p:nvPr/>
-        </p:nvSpPr>
-        <p:spPr>
-          <a:xfrm rot="16200000">
-            <a:off x="5545970" y="4362731"/>
-            <a:ext cx="236048" cy="173380"/>
-          </a:xfrm>
-          <a:prstGeom prst="flowChartDecision">
-            <a:avLst/>
-          </a:prstGeom>
-          <a:noFill/>
-          <a:ln w="19050">
-            <a:solidFill>
-              <a:srgbClr val="7030A0"/>
-            </a:solidFill>
-          </a:ln>
-          <a:effectLst/>
-        </p:spPr>
-        <p:style>
-          <a:lnRef idx="1">
-            <a:schemeClr val="accent6"/>
-          </a:lnRef>
-          <a:fillRef idx="2">
-            <a:schemeClr val="accent6"/>
-          </a:fillRef>
-          <a:effectRef idx="1">
-            <a:schemeClr val="accent6"/>
-          </a:effectRef>
-          <a:fontRef idx="minor">
-            <a:schemeClr val="dk1"/>
-          </a:fontRef>
-        </p:style>
-        <p:txBody>
-          <a:bodyPr rtlCol="0" anchor="ctr"/>
-          <a:lstStyle/>
-          <a:p>
-            <a:pPr algn="ctr"/>
-            <a:endParaRPr lang="en-US" sz="1050"/>
-          </a:p>
-        </p:txBody>
-      </p:sp>
-      <p:cxnSp>
-        <p:nvCxnSpPr>
-          <p:cNvPr id="147" name="Elbow Connector 63">
-            <a:extLst>
-              <a:ext uri="{FF2B5EF4-FFF2-40B4-BE49-F238E27FC236}">
-                <a16:creationId xmlns:a16="http://schemas.microsoft.com/office/drawing/2014/main" id="{D9B3491D-328F-4200-9DDC-B992735C9F5E}"/>
-              </a:ext>
-            </a:extLst>
-          </p:cNvPr>
-          <p:cNvCxnSpPr>
-            <a:cxnSpLocks/>
-            <a:endCxn id="148" idx="1"/>
-          </p:cNvCxnSpPr>
-          <p:nvPr/>
-        </p:nvCxnSpPr>
-        <p:spPr>
-          <a:xfrm flipV="1">
-            <a:off x="4876768" y="3931016"/>
-            <a:ext cx="432916" cy="111294"/>
-          </a:xfrm>
-          <a:prstGeom prst="bentConnector3">
-            <a:avLst/>
-          </a:prstGeom>
-          <a:ln w="19050">
-            <a:solidFill>
-              <a:srgbClr val="7030A0"/>
-            </a:solidFill>
-            <a:headEnd type="none" w="med" len="med"/>
-            <a:tailEnd type="arrow" w="med" len="med"/>
-          </a:ln>
-          <a:effectLst/>
-        </p:spPr>
-        <p:style>
-          <a:lnRef idx="1">
-            <a:schemeClr val="accent2"/>
-          </a:lnRef>
-          <a:fillRef idx="2">
-            <a:schemeClr val="accent2"/>
-          </a:fillRef>
-          <a:effectRef idx="1">
-            <a:schemeClr val="accent2"/>
-          </a:effectRef>
-          <a:fontRef idx="minor">
-            <a:schemeClr val="dk1"/>
-          </a:fontRef>
-        </p:style>
-      </p:cxnSp>
-      <p:sp>
-        <p:nvSpPr>
-          <p:cNvPr id="148" name="Rectangle 8">
-            <a:extLst>
-              <a:ext uri="{FF2B5EF4-FFF2-40B4-BE49-F238E27FC236}">
-                <a16:creationId xmlns:a16="http://schemas.microsoft.com/office/drawing/2014/main" id="{F474F7D2-A720-46EF-A922-F06320D42D85}"/>
-              </a:ext>
-            </a:extLst>
-          </p:cNvPr>
-          <p:cNvSpPr/>
-          <p:nvPr/>
-        </p:nvSpPr>
-        <p:spPr>
-          <a:xfrm>
-            <a:off x="5309684" y="3757636"/>
-            <a:ext cx="708186" cy="346760"/>
-          </a:xfrm>
-          <a:prstGeom prst="rect">
-            <a:avLst/>
-          </a:prstGeom>
-          <a:ln w="19050">
-            <a:solidFill>
-              <a:srgbClr val="7030A0"/>
-            </a:solidFill>
-          </a:ln>
-          <a:effectLst/>
-        </p:spPr>
-        <p:style>
-          <a:lnRef idx="1">
-            <a:schemeClr val="accent4"/>
-          </a:lnRef>
-          <a:fillRef idx="2">
-            <a:schemeClr val="accent4"/>
-          </a:fillRef>
-          <a:effectRef idx="1">
-            <a:schemeClr val="accent4"/>
-          </a:effectRef>
-          <a:fontRef idx="minor">
-            <a:schemeClr val="dk1"/>
-          </a:fontRef>
-        </p:style>
-        <p:txBody>
-          <a:bodyPr rtlCol="0" anchor="ctr"/>
-          <a:lstStyle/>
-          <a:p>
-            <a:pPr algn="ctr"/>
-            <a:r>
-              <a:rPr lang="en-US" sz="1050" dirty="0">
-                <a:solidFill>
-                  <a:srgbClr val="7030A0"/>
-                </a:solidFill>
-              </a:rPr>
-              <a:t>Tag</a:t>
-            </a:r>
-            <a:endParaRPr lang="en-SG" sz="1050" dirty="0">
-              <a:solidFill>
-                <a:srgbClr val="7030A0"/>
-              </a:solidFill>
-            </a:endParaRPr>
-          </a:p>
-        </p:txBody>
-      </p:sp>
-      <p:sp>
-        <p:nvSpPr>
-          <p:cNvPr id="149" name="TextBox 148">
-            <a:extLst>
-              <a:ext uri="{FF2B5EF4-FFF2-40B4-BE49-F238E27FC236}">
-                <a16:creationId xmlns:a16="http://schemas.microsoft.com/office/drawing/2014/main" id="{45EA90E7-ECD8-418E-A44F-DD98D68986C3}"/>
-              </a:ext>
-            </a:extLst>
-          </p:cNvPr>
-          <p:cNvSpPr txBox="1"/>
-          <p:nvPr/>
-        </p:nvSpPr>
-        <p:spPr>
-          <a:xfrm>
-            <a:off x="5127744" y="3976024"/>
-            <a:ext cx="189257" cy="178683"/>
-          </a:xfrm>
-          <a:prstGeom prst="rect">
-            <a:avLst/>
-          </a:prstGeom>
-          <a:noFill/>
-        </p:spPr>
-        <p:txBody>
-          <a:bodyPr wrap="square" lIns="0" tIns="0" rIns="0" bIns="0" rtlCol="0">
-            <a:noAutofit/>
-          </a:bodyPr>
-          <a:lstStyle/>
-          <a:p>
-            <a:pPr algn="ctr"/>
-            <a:r>
-              <a:rPr lang="en-US" sz="1100" dirty="0">
-                <a:solidFill>
-                  <a:srgbClr val="7030A0"/>
-                </a:solidFill>
-              </a:rPr>
-              <a:t>*</a:t>
-            </a:r>
-            <a:endParaRPr lang="en-SG" sz="1100" dirty="0">
-              <a:solidFill>
-                <a:srgbClr val="7030A0"/>
-              </a:solidFill>
-            </a:endParaRPr>
-          </a:p>
-        </p:txBody>
-      </p:sp>
-      <p:sp>
-        <p:nvSpPr>
-          <p:cNvPr id="150" name="TextBox 149">
-            <a:extLst>
-              <a:ext uri="{FF2B5EF4-FFF2-40B4-BE49-F238E27FC236}">
-                <a16:creationId xmlns:a16="http://schemas.microsoft.com/office/drawing/2014/main" id="{615B7C12-80CC-4E39-AF27-E8AB882638E8}"/>
-              </a:ext>
-            </a:extLst>
-          </p:cNvPr>
-          <p:cNvSpPr txBox="1"/>
-          <p:nvPr/>
-        </p:nvSpPr>
-        <p:spPr>
-          <a:xfrm>
-            <a:off x="3507996" y="4066775"/>
-            <a:ext cx="189257" cy="178683"/>
-          </a:xfrm>
-          <a:prstGeom prst="rect">
-            <a:avLst/>
-          </a:prstGeom>
-          <a:noFill/>
-        </p:spPr>
-        <p:txBody>
-          <a:bodyPr wrap="square" lIns="0" tIns="0" rIns="0" bIns="0" rtlCol="0">
-            <a:noAutofit/>
-          </a:bodyPr>
-          <a:lstStyle/>
-          <a:p>
-            <a:pPr algn="ctr"/>
-            <a:r>
-              <a:rPr lang="en-US" sz="1100" dirty="0">
-                <a:solidFill>
-                  <a:srgbClr val="7030A0"/>
-                </a:solidFill>
-              </a:rPr>
-              <a:t>1</a:t>
-            </a:r>
-            <a:endParaRPr lang="en-SG" sz="1100" dirty="0">
-              <a:solidFill>
-                <a:srgbClr val="7030A0"/>
-              </a:solidFill>
-            </a:endParaRPr>
-          </a:p>
-        </p:txBody>
-      </p:sp>
-      <p:sp>
-        <p:nvSpPr>
-          <p:cNvPr id="151" name="Flowchart: Decision 96">
-            <a:extLst>
-              <a:ext uri="{FF2B5EF4-FFF2-40B4-BE49-F238E27FC236}">
-                <a16:creationId xmlns:a16="http://schemas.microsoft.com/office/drawing/2014/main" id="{8215A6F6-C54A-47C5-8B55-3B77E9A810CE}"/>
-              </a:ext>
-            </a:extLst>
-          </p:cNvPr>
-          <p:cNvSpPr/>
-          <p:nvPr/>
-        </p:nvSpPr>
-        <p:spPr>
-          <a:xfrm>
-            <a:off x="4876800" y="3960091"/>
-            <a:ext cx="236048" cy="173380"/>
-          </a:xfrm>
-          <a:prstGeom prst="flowChartDecision">
-            <a:avLst/>
-          </a:prstGeom>
-          <a:solidFill>
-            <a:srgbClr val="7030A0"/>
-          </a:solidFill>
-          <a:ln w="19050">
-            <a:solidFill>
-              <a:srgbClr val="7030A0"/>
-            </a:solidFill>
-          </a:ln>
-          <a:effectLst/>
-        </p:spPr>
-        <p:style>
-          <a:lnRef idx="1">
-            <a:schemeClr val="accent6"/>
-          </a:lnRef>
-          <a:fillRef idx="2">
-            <a:schemeClr val="accent6"/>
-          </a:fillRef>
-          <a:effectRef idx="1">
-            <a:schemeClr val="accent6"/>
-          </a:effectRef>
-          <a:fontRef idx="minor">
-            <a:schemeClr val="dk1"/>
-          </a:fontRef>
-        </p:style>
-        <p:txBody>
-          <a:bodyPr rtlCol="0" anchor="ctr"/>
-          <a:lstStyle/>
-          <a:p>
-            <a:pPr algn="ctr"/>
-            <a:endParaRPr lang="en-US" sz="1050"/>
-          </a:p>
-        </p:txBody>
-      </p:sp>
-      <p:cxnSp>
-        <p:nvCxnSpPr>
-          <p:cNvPr id="152" name="Elbow Connector 78">
-            <a:extLst>
-              <a:ext uri="{FF2B5EF4-FFF2-40B4-BE49-F238E27FC236}">
-                <a16:creationId xmlns:a16="http://schemas.microsoft.com/office/drawing/2014/main" id="{1AD1E3FF-4BF9-4128-9489-C337750D9B24}"/>
-              </a:ext>
-            </a:extLst>
-          </p:cNvPr>
-          <p:cNvCxnSpPr>
-            <a:cxnSpLocks/>
-            <a:stCxn id="146" idx="3"/>
-            <a:endCxn id="148" idx="2"/>
-          </p:cNvCxnSpPr>
-          <p:nvPr/>
-        </p:nvCxnSpPr>
-        <p:spPr>
-          <a:xfrm rot="16200000" flipV="1">
-            <a:off x="5550386" y="4217788"/>
-            <a:ext cx="227001" cy="217"/>
-          </a:xfrm>
-          <a:prstGeom prst="bentConnector3">
-            <a:avLst>
-              <a:gd name="adj1" fmla="val 50000"/>
-            </a:avLst>
-          </a:prstGeom>
-          <a:ln w="19050">
-            <a:solidFill>
-              <a:srgbClr val="7030A0"/>
-            </a:solidFill>
-            <a:headEnd type="none" w="med" len="med"/>
-            <a:tailEnd type="arrow" w="med" len="med"/>
-          </a:ln>
-          <a:effectLst/>
-        </p:spPr>
-        <p:style>
-          <a:lnRef idx="1">
-            <a:schemeClr val="accent2"/>
-          </a:lnRef>
-          <a:fillRef idx="2">
-            <a:schemeClr val="accent2"/>
-          </a:fillRef>
-          <a:effectRef idx="1">
-            <a:schemeClr val="accent2"/>
-          </a:effectRef>
-          <a:fontRef idx="minor">
-            <a:schemeClr val="dk1"/>
-          </a:fontRef>
-        </p:style>
-      </p:cxnSp>
       <p:cxnSp>
         <p:nvCxnSpPr>
           <p:cNvPr id="153" name="Elbow Connector 106">
@@ -10525,52 +9617,6 @@
           </a:effectRef>
           <a:fontRef idx="minor">
             <a:schemeClr val="dk1"/>
-          </a:fontRef>
-        </p:style>
-      </p:cxnSp>
-      <p:cxnSp>
-        <p:nvCxnSpPr>
-          <p:cNvPr id="169" name="Straight Arrow Connector 168">
-            <a:extLst>
-              <a:ext uri="{FF2B5EF4-FFF2-40B4-BE49-F238E27FC236}">
-                <a16:creationId xmlns:a16="http://schemas.microsoft.com/office/drawing/2014/main" id="{4E5B9F9F-8210-4208-AE37-3B7AFAA686A1}"/>
-              </a:ext>
-            </a:extLst>
-          </p:cNvPr>
-          <p:cNvCxnSpPr>
-            <a:cxnSpLocks/>
-            <a:endCxn id="143" idx="1"/>
-          </p:cNvCxnSpPr>
-          <p:nvPr/>
-        </p:nvCxnSpPr>
-        <p:spPr>
-          <a:xfrm>
-            <a:off x="3501829" y="4047763"/>
-            <a:ext cx="246531" cy="0"/>
-          </a:xfrm>
-          <a:prstGeom prst="straightConnector1">
-            <a:avLst/>
-          </a:prstGeom>
-          <a:ln w="19050">
-            <a:solidFill>
-              <a:srgbClr val="7030A0"/>
-            </a:solidFill>
-            <a:headEnd type="none" w="med" len="med"/>
-            <a:tailEnd type="arrow" w="med" len="med"/>
-          </a:ln>
-        </p:spPr>
-        <p:style>
-          <a:lnRef idx="1">
-            <a:schemeClr val="accent1"/>
-          </a:lnRef>
-          <a:fillRef idx="0">
-            <a:schemeClr val="accent1"/>
-          </a:fillRef>
-          <a:effectRef idx="0">
-            <a:schemeClr val="accent1"/>
-          </a:effectRef>
-          <a:fontRef idx="minor">
-            <a:schemeClr val="tx1"/>
           </a:fontRef>
         </p:style>
       </p:cxnSp>
@@ -12193,6 +11239,706 @@
           <a:xfrm>
             <a:off x="7401025" y="6318928"/>
             <a:ext cx="117514" cy="178683"/>
+          </a:xfrm>
+          <a:prstGeom prst="rect">
+            <a:avLst/>
+          </a:prstGeom>
+          <a:noFill/>
+        </p:spPr>
+        <p:txBody>
+          <a:bodyPr wrap="square" lIns="0" tIns="0" rIns="0" bIns="0" rtlCol="0">
+            <a:noAutofit/>
+          </a:bodyPr>
+          <a:lstStyle/>
+          <a:p>
+            <a:pPr algn="ctr"/>
+            <a:r>
+              <a:rPr lang="en-US" sz="1100" dirty="0">
+                <a:solidFill>
+                  <a:srgbClr val="7030A0"/>
+                </a:solidFill>
+              </a:rPr>
+              <a:t>1</a:t>
+            </a:r>
+            <a:endParaRPr lang="en-SG" sz="1100" dirty="0">
+              <a:solidFill>
+                <a:srgbClr val="7030A0"/>
+              </a:solidFill>
+            </a:endParaRPr>
+          </a:p>
+        </p:txBody>
+      </p:sp>
+      <p:cxnSp>
+        <p:nvCxnSpPr>
+          <p:cNvPr id="157" name="Elbow Connector 78">
+            <a:extLst>
+              <a:ext uri="{FF2B5EF4-FFF2-40B4-BE49-F238E27FC236}">
+                <a16:creationId xmlns:a16="http://schemas.microsoft.com/office/drawing/2014/main" id="{9A61AF8A-CFAF-4B93-88AC-F026F7060A0E}"/>
+              </a:ext>
+            </a:extLst>
+          </p:cNvPr>
+          <p:cNvCxnSpPr>
+            <a:cxnSpLocks/>
+            <a:stCxn id="89" idx="3"/>
+            <a:endCxn id="110" idx="1"/>
+          </p:cNvCxnSpPr>
+          <p:nvPr/>
+        </p:nvCxnSpPr>
+        <p:spPr>
+          <a:xfrm flipV="1">
+            <a:off x="6310530" y="1991428"/>
+            <a:ext cx="434402" cy="662463"/>
+          </a:xfrm>
+          <a:prstGeom prst="bentConnector3">
+            <a:avLst/>
+          </a:prstGeom>
+          <a:ln w="19050">
+            <a:solidFill>
+              <a:srgbClr val="7030A0"/>
+            </a:solidFill>
+            <a:headEnd type="none" w="med" len="med"/>
+            <a:tailEnd type="arrow" w="med" len="med"/>
+          </a:ln>
+          <a:effectLst/>
+        </p:spPr>
+        <p:style>
+          <a:lnRef idx="1">
+            <a:schemeClr val="accent2"/>
+          </a:lnRef>
+          <a:fillRef idx="2">
+            <a:schemeClr val="accent2"/>
+          </a:fillRef>
+          <a:effectRef idx="1">
+            <a:schemeClr val="accent2"/>
+          </a:effectRef>
+          <a:fontRef idx="minor">
+            <a:schemeClr val="dk1"/>
+          </a:fontRef>
+        </p:style>
+      </p:cxnSp>
+      <p:sp>
+        <p:nvSpPr>
+          <p:cNvPr id="158" name="Rectangle 8">
+            <a:extLst>
+              <a:ext uri="{FF2B5EF4-FFF2-40B4-BE49-F238E27FC236}">
+                <a16:creationId xmlns:a16="http://schemas.microsoft.com/office/drawing/2014/main" id="{C408CC9D-580C-4C1D-9E0B-AF2CFD7F2F5A}"/>
+              </a:ext>
+            </a:extLst>
+          </p:cNvPr>
+          <p:cNvSpPr/>
+          <p:nvPr/>
+        </p:nvSpPr>
+        <p:spPr>
+          <a:xfrm>
+            <a:off x="6718276" y="4042323"/>
+            <a:ext cx="872785" cy="285783"/>
+          </a:xfrm>
+          <a:prstGeom prst="rect">
+            <a:avLst/>
+          </a:prstGeom>
+          <a:ln w="19050">
+            <a:solidFill>
+              <a:srgbClr val="7030A0"/>
+            </a:solidFill>
+          </a:ln>
+          <a:effectLst/>
+        </p:spPr>
+        <p:style>
+          <a:lnRef idx="1">
+            <a:schemeClr val="accent4"/>
+          </a:lnRef>
+          <a:fillRef idx="2">
+            <a:schemeClr val="accent4"/>
+          </a:fillRef>
+          <a:effectRef idx="1">
+            <a:schemeClr val="accent4"/>
+          </a:effectRef>
+          <a:fontRef idx="minor">
+            <a:schemeClr val="dk1"/>
+          </a:fontRef>
+        </p:style>
+        <p:txBody>
+          <a:bodyPr rtlCol="0" anchor="ctr"/>
+          <a:lstStyle/>
+          <a:p>
+            <a:pPr algn="ctr"/>
+            <a:r>
+              <a:rPr lang="en-US" sz="1050" dirty="0">
+                <a:solidFill>
+                  <a:srgbClr val="7030A0"/>
+                </a:solidFill>
+              </a:rPr>
+              <a:t>Tag</a:t>
+            </a:r>
+            <a:endParaRPr lang="en-SG" sz="1050" dirty="0">
+              <a:solidFill>
+                <a:srgbClr val="7030A0"/>
+              </a:solidFill>
+            </a:endParaRPr>
+          </a:p>
+        </p:txBody>
+      </p:sp>
+      <p:cxnSp>
+        <p:nvCxnSpPr>
+          <p:cNvPr id="159" name="Straight Arrow Connector 158">
+            <a:extLst>
+              <a:ext uri="{FF2B5EF4-FFF2-40B4-BE49-F238E27FC236}">
+                <a16:creationId xmlns:a16="http://schemas.microsoft.com/office/drawing/2014/main" id="{E86C93F9-499A-40E7-9C41-9ADB05F30539}"/>
+              </a:ext>
+            </a:extLst>
+          </p:cNvPr>
+          <p:cNvCxnSpPr>
+            <a:cxnSpLocks/>
+          </p:cNvCxnSpPr>
+          <p:nvPr/>
+        </p:nvCxnSpPr>
+        <p:spPr>
+          <a:xfrm flipV="1">
+            <a:off x="5827052" y="2823826"/>
+            <a:ext cx="0" cy="844944"/>
+          </a:xfrm>
+          <a:prstGeom prst="straightConnector1">
+            <a:avLst/>
+          </a:prstGeom>
+          <a:ln w="19050">
+            <a:solidFill>
+              <a:srgbClr val="7030A0"/>
+            </a:solidFill>
+            <a:headEnd type="none" w="med" len="med"/>
+            <a:tailEnd type="arrow" w="med" len="med"/>
+          </a:ln>
+        </p:spPr>
+        <p:style>
+          <a:lnRef idx="1">
+            <a:schemeClr val="accent1"/>
+          </a:lnRef>
+          <a:fillRef idx="0">
+            <a:schemeClr val="accent1"/>
+          </a:fillRef>
+          <a:effectRef idx="0">
+            <a:schemeClr val="accent1"/>
+          </a:effectRef>
+          <a:fontRef idx="minor">
+            <a:schemeClr val="tx1"/>
+          </a:fontRef>
+        </p:style>
+      </p:cxnSp>
+      <p:cxnSp>
+        <p:nvCxnSpPr>
+          <p:cNvPr id="160" name="Straight Arrow Connector 159">
+            <a:extLst>
+              <a:ext uri="{FF2B5EF4-FFF2-40B4-BE49-F238E27FC236}">
+                <a16:creationId xmlns:a16="http://schemas.microsoft.com/office/drawing/2014/main" id="{08E086C1-2087-4F2E-AEA1-4402211DA255}"/>
+              </a:ext>
+            </a:extLst>
+          </p:cNvPr>
+          <p:cNvCxnSpPr>
+            <a:cxnSpLocks/>
+          </p:cNvCxnSpPr>
+          <p:nvPr/>
+        </p:nvCxnSpPr>
+        <p:spPr>
+          <a:xfrm>
+            <a:off x="5827052" y="3648484"/>
+            <a:ext cx="0" cy="883387"/>
+          </a:xfrm>
+          <a:prstGeom prst="straightConnector1">
+            <a:avLst/>
+          </a:prstGeom>
+          <a:ln w="19050">
+            <a:solidFill>
+              <a:srgbClr val="7030A0"/>
+            </a:solidFill>
+            <a:headEnd type="none" w="med" len="med"/>
+            <a:tailEnd type="arrow" w="med" len="med"/>
+          </a:ln>
+        </p:spPr>
+        <p:style>
+          <a:lnRef idx="1">
+            <a:schemeClr val="accent1"/>
+          </a:lnRef>
+          <a:fillRef idx="0">
+            <a:schemeClr val="accent1"/>
+          </a:fillRef>
+          <a:effectRef idx="0">
+            <a:schemeClr val="accent1"/>
+          </a:effectRef>
+          <a:fontRef idx="minor">
+            <a:schemeClr val="tx1"/>
+          </a:fontRef>
+        </p:style>
+      </p:cxnSp>
+      <p:sp>
+        <p:nvSpPr>
+          <p:cNvPr id="161" name="TextBox 160">
+            <a:extLst>
+              <a:ext uri="{FF2B5EF4-FFF2-40B4-BE49-F238E27FC236}">
+                <a16:creationId xmlns:a16="http://schemas.microsoft.com/office/drawing/2014/main" id="{24E04B7B-2AB0-47C1-88A8-2A1F30694392}"/>
+              </a:ext>
+            </a:extLst>
+          </p:cNvPr>
+          <p:cNvSpPr txBox="1"/>
+          <p:nvPr/>
+        </p:nvSpPr>
+        <p:spPr>
+          <a:xfrm>
+            <a:off x="5849510" y="2942963"/>
+            <a:ext cx="117514" cy="178683"/>
+          </a:xfrm>
+          <a:prstGeom prst="rect">
+            <a:avLst/>
+          </a:prstGeom>
+          <a:noFill/>
+        </p:spPr>
+        <p:txBody>
+          <a:bodyPr wrap="square" lIns="0" tIns="0" rIns="0" bIns="0" rtlCol="0">
+            <a:noAutofit/>
+          </a:bodyPr>
+          <a:lstStyle/>
+          <a:p>
+            <a:pPr algn="ctr"/>
+            <a:r>
+              <a:rPr lang="en-US" sz="1100" dirty="0">
+                <a:solidFill>
+                  <a:srgbClr val="7030A0"/>
+                </a:solidFill>
+              </a:rPr>
+              <a:t>*</a:t>
+            </a:r>
+            <a:endParaRPr lang="en-SG" sz="1100" dirty="0">
+              <a:solidFill>
+                <a:srgbClr val="7030A0"/>
+              </a:solidFill>
+            </a:endParaRPr>
+          </a:p>
+        </p:txBody>
+      </p:sp>
+      <p:sp>
+        <p:nvSpPr>
+          <p:cNvPr id="162" name="TextBox 161">
+            <a:extLst>
+              <a:ext uri="{FF2B5EF4-FFF2-40B4-BE49-F238E27FC236}">
+                <a16:creationId xmlns:a16="http://schemas.microsoft.com/office/drawing/2014/main" id="{9ED2DF66-9BCF-457F-ABD9-9B41D247F5DE}"/>
+              </a:ext>
+            </a:extLst>
+          </p:cNvPr>
+          <p:cNvSpPr txBox="1"/>
+          <p:nvPr/>
+        </p:nvSpPr>
+        <p:spPr>
+          <a:xfrm>
+            <a:off x="5829789" y="4292982"/>
+            <a:ext cx="189257" cy="178683"/>
+          </a:xfrm>
+          <a:prstGeom prst="rect">
+            <a:avLst/>
+          </a:prstGeom>
+          <a:noFill/>
+        </p:spPr>
+        <p:txBody>
+          <a:bodyPr wrap="square" lIns="0" tIns="0" rIns="0" bIns="0" rtlCol="0">
+            <a:noAutofit/>
+          </a:bodyPr>
+          <a:lstStyle/>
+          <a:p>
+            <a:pPr algn="ctr"/>
+            <a:r>
+              <a:rPr lang="en-US" sz="1100" dirty="0">
+                <a:solidFill>
+                  <a:srgbClr val="7030A0"/>
+                </a:solidFill>
+              </a:rPr>
+              <a:t>1</a:t>
+            </a:r>
+            <a:endParaRPr lang="en-SG" sz="1100" dirty="0">
+              <a:solidFill>
+                <a:srgbClr val="7030A0"/>
+              </a:solidFill>
+            </a:endParaRPr>
+          </a:p>
+        </p:txBody>
+      </p:sp>
+      <p:cxnSp>
+        <p:nvCxnSpPr>
+          <p:cNvPr id="163" name="Elbow Connector 78">
+            <a:extLst>
+              <a:ext uri="{FF2B5EF4-FFF2-40B4-BE49-F238E27FC236}">
+                <a16:creationId xmlns:a16="http://schemas.microsoft.com/office/drawing/2014/main" id="{F091A673-85B7-444C-BA96-5AB6C227E005}"/>
+              </a:ext>
+            </a:extLst>
+          </p:cNvPr>
+          <p:cNvCxnSpPr>
+            <a:cxnSpLocks/>
+            <a:stCxn id="131" idx="3"/>
+            <a:endCxn id="158" idx="1"/>
+          </p:cNvCxnSpPr>
+          <p:nvPr/>
+        </p:nvCxnSpPr>
+        <p:spPr>
+          <a:xfrm flipV="1">
+            <a:off x="6270483" y="4185215"/>
+            <a:ext cx="447793" cy="547686"/>
+          </a:xfrm>
+          <a:prstGeom prst="bentConnector3">
+            <a:avLst>
+              <a:gd name="adj1" fmla="val 56807"/>
+            </a:avLst>
+          </a:prstGeom>
+          <a:ln w="19050">
+            <a:solidFill>
+              <a:srgbClr val="7030A0"/>
+            </a:solidFill>
+            <a:headEnd type="none" w="med" len="med"/>
+            <a:tailEnd type="arrow" w="med" len="med"/>
+          </a:ln>
+          <a:effectLst/>
+        </p:spPr>
+        <p:style>
+          <a:lnRef idx="1">
+            <a:schemeClr val="accent2"/>
+          </a:lnRef>
+          <a:fillRef idx="2">
+            <a:schemeClr val="accent2"/>
+          </a:fillRef>
+          <a:effectRef idx="1">
+            <a:schemeClr val="accent2"/>
+          </a:effectRef>
+          <a:fontRef idx="minor">
+            <a:schemeClr val="dk1"/>
+          </a:fontRef>
+        </p:style>
+      </p:cxnSp>
+      <p:sp>
+        <p:nvSpPr>
+          <p:cNvPr id="164" name="TextBox 163">
+            <a:extLst>
+              <a:ext uri="{FF2B5EF4-FFF2-40B4-BE49-F238E27FC236}">
+                <a16:creationId xmlns:a16="http://schemas.microsoft.com/office/drawing/2014/main" id="{5BDA1D2A-5D9D-45D0-8FA8-2CD5EB8EF6BE}"/>
+              </a:ext>
+            </a:extLst>
+          </p:cNvPr>
+          <p:cNvSpPr txBox="1"/>
+          <p:nvPr/>
+        </p:nvSpPr>
+        <p:spPr>
+          <a:xfrm>
+            <a:off x="6494379" y="4010583"/>
+            <a:ext cx="189257" cy="178683"/>
+          </a:xfrm>
+          <a:prstGeom prst="rect">
+            <a:avLst/>
+          </a:prstGeom>
+          <a:noFill/>
+        </p:spPr>
+        <p:txBody>
+          <a:bodyPr wrap="square" lIns="0" tIns="0" rIns="0" bIns="0" rtlCol="0">
+            <a:noAutofit/>
+          </a:bodyPr>
+          <a:lstStyle/>
+          <a:p>
+            <a:pPr algn="ctr"/>
+            <a:r>
+              <a:rPr lang="en-US" sz="1100" dirty="0">
+                <a:solidFill>
+                  <a:srgbClr val="7030A0"/>
+                </a:solidFill>
+              </a:rPr>
+              <a:t>*</a:t>
+            </a:r>
+            <a:endParaRPr lang="en-SG" sz="1100" dirty="0">
+              <a:solidFill>
+                <a:srgbClr val="7030A0"/>
+              </a:solidFill>
+            </a:endParaRPr>
+          </a:p>
+        </p:txBody>
+      </p:sp>
+      <p:sp>
+        <p:nvSpPr>
+          <p:cNvPr id="165" name="TextBox 164">
+            <a:extLst>
+              <a:ext uri="{FF2B5EF4-FFF2-40B4-BE49-F238E27FC236}">
+                <a16:creationId xmlns:a16="http://schemas.microsoft.com/office/drawing/2014/main" id="{93676E8D-B3FE-400E-834C-685755E51BA0}"/>
+              </a:ext>
+            </a:extLst>
+          </p:cNvPr>
+          <p:cNvSpPr txBox="1"/>
+          <p:nvPr/>
+        </p:nvSpPr>
+        <p:spPr>
+          <a:xfrm>
+            <a:off x="6503848" y="4310133"/>
+            <a:ext cx="189257" cy="178683"/>
+          </a:xfrm>
+          <a:prstGeom prst="rect">
+            <a:avLst/>
+          </a:prstGeom>
+          <a:noFill/>
+        </p:spPr>
+        <p:txBody>
+          <a:bodyPr wrap="square" lIns="0" tIns="0" rIns="0" bIns="0" rtlCol="0">
+            <a:noAutofit/>
+          </a:bodyPr>
+          <a:lstStyle/>
+          <a:p>
+            <a:pPr algn="ctr"/>
+            <a:r>
+              <a:rPr lang="en-US" sz="1100" dirty="0">
+                <a:solidFill>
+                  <a:srgbClr val="7030A0"/>
+                </a:solidFill>
+              </a:rPr>
+              <a:t>1</a:t>
+            </a:r>
+            <a:endParaRPr lang="en-SG" sz="1100" dirty="0">
+              <a:solidFill>
+                <a:srgbClr val="7030A0"/>
+              </a:solidFill>
+            </a:endParaRPr>
+          </a:p>
+        </p:txBody>
+      </p:sp>
+      <p:sp>
+        <p:nvSpPr>
+          <p:cNvPr id="166" name="TextBox 165">
+            <a:extLst>
+              <a:ext uri="{FF2B5EF4-FFF2-40B4-BE49-F238E27FC236}">
+                <a16:creationId xmlns:a16="http://schemas.microsoft.com/office/drawing/2014/main" id="{619C7A6B-AD22-4C9C-9E2D-C8D2951CEA6F}"/>
+              </a:ext>
+            </a:extLst>
+          </p:cNvPr>
+          <p:cNvSpPr txBox="1"/>
+          <p:nvPr/>
+        </p:nvSpPr>
+        <p:spPr>
+          <a:xfrm>
+            <a:off x="6503848" y="4694729"/>
+            <a:ext cx="189257" cy="178683"/>
+          </a:xfrm>
+          <a:prstGeom prst="rect">
+            <a:avLst/>
+          </a:prstGeom>
+          <a:noFill/>
+        </p:spPr>
+        <p:txBody>
+          <a:bodyPr wrap="square" lIns="0" tIns="0" rIns="0" bIns="0" rtlCol="0">
+            <a:noAutofit/>
+          </a:bodyPr>
+          <a:lstStyle/>
+          <a:p>
+            <a:pPr algn="ctr"/>
+            <a:r>
+              <a:rPr lang="en-US" sz="1100" dirty="0">
+                <a:solidFill>
+                  <a:srgbClr val="7030A0"/>
+                </a:solidFill>
+              </a:rPr>
+              <a:t>1</a:t>
+            </a:r>
+            <a:endParaRPr lang="en-SG" sz="1100" dirty="0">
+              <a:solidFill>
+                <a:srgbClr val="7030A0"/>
+              </a:solidFill>
+            </a:endParaRPr>
+          </a:p>
+        </p:txBody>
+      </p:sp>
+      <p:sp>
+        <p:nvSpPr>
+          <p:cNvPr id="168" name="TextBox 167">
+            <a:extLst>
+              <a:ext uri="{FF2B5EF4-FFF2-40B4-BE49-F238E27FC236}">
+                <a16:creationId xmlns:a16="http://schemas.microsoft.com/office/drawing/2014/main" id="{FC1549C8-A42D-4D85-9C66-4EC939A85D18}"/>
+              </a:ext>
+            </a:extLst>
+          </p:cNvPr>
+          <p:cNvSpPr txBox="1"/>
+          <p:nvPr/>
+        </p:nvSpPr>
+        <p:spPr>
+          <a:xfrm>
+            <a:off x="6517875" y="1828876"/>
+            <a:ext cx="189257" cy="178683"/>
+          </a:xfrm>
+          <a:prstGeom prst="rect">
+            <a:avLst/>
+          </a:prstGeom>
+          <a:noFill/>
+        </p:spPr>
+        <p:txBody>
+          <a:bodyPr wrap="square" lIns="0" tIns="0" rIns="0" bIns="0" rtlCol="0">
+            <a:noAutofit/>
+          </a:bodyPr>
+          <a:lstStyle/>
+          <a:p>
+            <a:pPr algn="ctr"/>
+            <a:r>
+              <a:rPr lang="en-US" sz="1100" dirty="0">
+                <a:solidFill>
+                  <a:srgbClr val="7030A0"/>
+                </a:solidFill>
+              </a:rPr>
+              <a:t>*</a:t>
+            </a:r>
+            <a:endParaRPr lang="en-SG" sz="1100" dirty="0">
+              <a:solidFill>
+                <a:srgbClr val="7030A0"/>
+              </a:solidFill>
+            </a:endParaRPr>
+          </a:p>
+        </p:txBody>
+      </p:sp>
+      <p:sp>
+        <p:nvSpPr>
+          <p:cNvPr id="170" name="TextBox 169">
+            <a:extLst>
+              <a:ext uri="{FF2B5EF4-FFF2-40B4-BE49-F238E27FC236}">
+                <a16:creationId xmlns:a16="http://schemas.microsoft.com/office/drawing/2014/main" id="{F1F9DCF8-3F72-4926-9CD1-7A7F0D8A106E}"/>
+              </a:ext>
+            </a:extLst>
+          </p:cNvPr>
+          <p:cNvSpPr txBox="1"/>
+          <p:nvPr/>
+        </p:nvSpPr>
+        <p:spPr>
+          <a:xfrm>
+            <a:off x="6517875" y="2182191"/>
+            <a:ext cx="189257" cy="178683"/>
+          </a:xfrm>
+          <a:prstGeom prst="rect">
+            <a:avLst/>
+          </a:prstGeom>
+          <a:noFill/>
+        </p:spPr>
+        <p:txBody>
+          <a:bodyPr wrap="square" lIns="0" tIns="0" rIns="0" bIns="0" rtlCol="0">
+            <a:noAutofit/>
+          </a:bodyPr>
+          <a:lstStyle/>
+          <a:p>
+            <a:pPr algn="ctr"/>
+            <a:r>
+              <a:rPr lang="en-US" sz="1100" dirty="0">
+                <a:solidFill>
+                  <a:srgbClr val="7030A0"/>
+                </a:solidFill>
+              </a:rPr>
+              <a:t>1</a:t>
+            </a:r>
+            <a:endParaRPr lang="en-SG" sz="1100" dirty="0">
+              <a:solidFill>
+                <a:srgbClr val="7030A0"/>
+              </a:solidFill>
+            </a:endParaRPr>
+          </a:p>
+        </p:txBody>
+      </p:sp>
+      <p:sp>
+        <p:nvSpPr>
+          <p:cNvPr id="171" name="TextBox 170">
+            <a:extLst>
+              <a:ext uri="{FF2B5EF4-FFF2-40B4-BE49-F238E27FC236}">
+                <a16:creationId xmlns:a16="http://schemas.microsoft.com/office/drawing/2014/main" id="{C1A49CDB-1599-4650-9BCD-1F2A48A04661}"/>
+              </a:ext>
+            </a:extLst>
+          </p:cNvPr>
+          <p:cNvSpPr txBox="1"/>
+          <p:nvPr/>
+        </p:nvSpPr>
+        <p:spPr>
+          <a:xfrm>
+            <a:off x="6508439" y="2480543"/>
+            <a:ext cx="189257" cy="178683"/>
+          </a:xfrm>
+          <a:prstGeom prst="rect">
+            <a:avLst/>
+          </a:prstGeom>
+          <a:noFill/>
+        </p:spPr>
+        <p:txBody>
+          <a:bodyPr wrap="square" lIns="0" tIns="0" rIns="0" bIns="0" rtlCol="0">
+            <a:noAutofit/>
+          </a:bodyPr>
+          <a:lstStyle/>
+          <a:p>
+            <a:pPr algn="ctr"/>
+            <a:r>
+              <a:rPr lang="en-US" sz="1100" dirty="0">
+                <a:solidFill>
+                  <a:srgbClr val="7030A0"/>
+                </a:solidFill>
+              </a:rPr>
+              <a:t>1</a:t>
+            </a:r>
+            <a:endParaRPr lang="en-SG" sz="1100" dirty="0">
+              <a:solidFill>
+                <a:srgbClr val="7030A0"/>
+              </a:solidFill>
+            </a:endParaRPr>
+          </a:p>
+        </p:txBody>
+      </p:sp>
+      <p:sp>
+        <p:nvSpPr>
+          <p:cNvPr id="172" name="TextBox 171">
+            <a:extLst>
+              <a:ext uri="{FF2B5EF4-FFF2-40B4-BE49-F238E27FC236}">
+                <a16:creationId xmlns:a16="http://schemas.microsoft.com/office/drawing/2014/main" id="{311112FC-EA45-4C78-9609-200913F76C51}"/>
+              </a:ext>
+            </a:extLst>
+          </p:cNvPr>
+          <p:cNvSpPr txBox="1"/>
+          <p:nvPr/>
+        </p:nvSpPr>
+        <p:spPr>
+          <a:xfrm>
+            <a:off x="6529494" y="2786080"/>
+            <a:ext cx="189257" cy="178683"/>
+          </a:xfrm>
+          <a:prstGeom prst="rect">
+            <a:avLst/>
+          </a:prstGeom>
+          <a:noFill/>
+        </p:spPr>
+        <p:txBody>
+          <a:bodyPr wrap="square" lIns="0" tIns="0" rIns="0" bIns="0" rtlCol="0">
+            <a:noAutofit/>
+          </a:bodyPr>
+          <a:lstStyle/>
+          <a:p>
+            <a:pPr algn="ctr"/>
+            <a:r>
+              <a:rPr lang="en-US" sz="1100" dirty="0">
+                <a:solidFill>
+                  <a:srgbClr val="7030A0"/>
+                </a:solidFill>
+              </a:rPr>
+              <a:t>1</a:t>
+            </a:r>
+            <a:endParaRPr lang="en-SG" sz="1100" dirty="0">
+              <a:solidFill>
+                <a:srgbClr val="7030A0"/>
+              </a:solidFill>
+            </a:endParaRPr>
+          </a:p>
+        </p:txBody>
+      </p:sp>
+      <p:sp>
+        <p:nvSpPr>
+          <p:cNvPr id="173" name="TextBox 172">
+            <a:extLst>
+              <a:ext uri="{FF2B5EF4-FFF2-40B4-BE49-F238E27FC236}">
+                <a16:creationId xmlns:a16="http://schemas.microsoft.com/office/drawing/2014/main" id="{21DC5475-BBE0-4D8D-B236-AC9718E856DE}"/>
+              </a:ext>
+            </a:extLst>
+          </p:cNvPr>
+          <p:cNvSpPr txBox="1"/>
+          <p:nvPr/>
+        </p:nvSpPr>
+        <p:spPr>
+          <a:xfrm>
+            <a:off x="6503848" y="3115651"/>
+            <a:ext cx="189257" cy="178683"/>
           </a:xfrm>
           <a:prstGeom prst="rect">
             <a:avLst/>

</xml_diff>

<commit_message>
Moved DistributeUtil to Model Component. Moved DistributeUtilTest to ModelTest Component. All files commited are affected by the refactoring. Redesigned Sequence Diagram and UML Class diagram due to restructuring
</commit_message>
<xml_diff>
--- a/docs/diagrams/DistributeComponentClassDiagram.pptx
+++ b/docs/diagrams/DistributeComponentClassDiagram.pptx
@@ -9924,78 +9924,6 @@
           </a:p>
         </p:txBody>
       </p:sp>
-      <p:sp>
-        <p:nvSpPr>
-          <p:cNvPr id="215" name="Rectangle 8">
-            <a:extLst>
-              <a:ext uri="{FF2B5EF4-FFF2-40B4-BE49-F238E27FC236}">
-                <a16:creationId xmlns:a16="http://schemas.microsoft.com/office/drawing/2014/main" id="{4AAE8570-2F3F-439F-A187-C2278F4D3822}"/>
-              </a:ext>
-            </a:extLst>
-          </p:cNvPr>
-          <p:cNvSpPr/>
-          <p:nvPr/>
-        </p:nvSpPr>
-        <p:spPr>
-          <a:xfrm>
-            <a:off x="3994696" y="5627817"/>
-            <a:ext cx="1447688" cy="346760"/>
-          </a:xfrm>
-          <a:prstGeom prst="rect">
-            <a:avLst/>
-          </a:prstGeom>
-          <a:solidFill>
-            <a:schemeClr val="accent6">
-              <a:lumMod val="40000"/>
-              <a:lumOff val="60000"/>
-            </a:schemeClr>
-          </a:solidFill>
-          <a:ln w="19050">
-            <a:solidFill>
-              <a:schemeClr val="accent6"/>
-            </a:solidFill>
-          </a:ln>
-          <a:effectLst/>
-        </p:spPr>
-        <p:style>
-          <a:lnRef idx="1">
-            <a:schemeClr val="accent4"/>
-          </a:lnRef>
-          <a:fillRef idx="2">
-            <a:schemeClr val="accent4"/>
-          </a:fillRef>
-          <a:effectRef idx="1">
-            <a:schemeClr val="accent4"/>
-          </a:effectRef>
-          <a:fontRef idx="minor">
-            <a:schemeClr val="dk1"/>
-          </a:fontRef>
-        </p:style>
-        <p:txBody>
-          <a:bodyPr rtlCol="0" anchor="ctr"/>
-          <a:lstStyle/>
-          <a:p>
-            <a:pPr algn="ctr"/>
-            <a:r>
-              <a:rPr lang="en-US" sz="1050" dirty="0">
-                <a:solidFill>
-                  <a:schemeClr val="accent6">
-                    <a:lumMod val="75000"/>
-                  </a:schemeClr>
-                </a:solidFill>
-              </a:rPr>
-              <a:t>DistributeUtil</a:t>
-            </a:r>
-            <a:endParaRPr lang="en-SG" sz="1050" dirty="0">
-              <a:solidFill>
-                <a:schemeClr val="accent6">
-                  <a:lumMod val="75000"/>
-                </a:schemeClr>
-              </a:solidFill>
-            </a:endParaRPr>
-          </a:p>
-        </p:txBody>
-      </p:sp>
       <p:cxnSp>
         <p:nvCxnSpPr>
           <p:cNvPr id="216" name="Elbow Connector 63">
@@ -10008,7 +9936,6 @@
           <p:cNvCxnSpPr>
             <a:cxnSpLocks/>
             <a:stCxn id="195" idx="3"/>
-            <a:endCxn id="215" idx="1"/>
           </p:cNvCxnSpPr>
           <p:nvPr/>
         </p:nvCxnSpPr>
@@ -10100,7 +10027,6 @@
           </p:cNvPr>
           <p:cNvCxnSpPr>
             <a:cxnSpLocks/>
-            <a:endCxn id="215" idx="2"/>
           </p:cNvCxnSpPr>
           <p:nvPr/>
         </p:nvCxnSpPr>
@@ -11961,6 +11887,68 @@
               <a:t>1</a:t>
             </a:r>
             <a:endParaRPr lang="en-SG" sz="1100" dirty="0">
+              <a:solidFill>
+                <a:srgbClr val="7030A0"/>
+              </a:solidFill>
+            </a:endParaRPr>
+          </a:p>
+        </p:txBody>
+      </p:sp>
+      <p:sp>
+        <p:nvSpPr>
+          <p:cNvPr id="109" name="Rectangle 8">
+            <a:extLst>
+              <a:ext uri="{FF2B5EF4-FFF2-40B4-BE49-F238E27FC236}">
+                <a16:creationId xmlns:a16="http://schemas.microsoft.com/office/drawing/2014/main" id="{26A38EB3-0D2F-48B9-8CEB-BCCBA0DC639D}"/>
+              </a:ext>
+            </a:extLst>
+          </p:cNvPr>
+          <p:cNvSpPr/>
+          <p:nvPr/>
+        </p:nvSpPr>
+        <p:spPr>
+          <a:xfrm>
+            <a:off x="3999176" y="5582857"/>
+            <a:ext cx="1447688" cy="346760"/>
+          </a:xfrm>
+          <a:prstGeom prst="rect">
+            <a:avLst/>
+          </a:prstGeom>
+          <a:ln w="19050">
+            <a:solidFill>
+              <a:srgbClr val="7030A0"/>
+            </a:solidFill>
+          </a:ln>
+          <a:effectLst/>
+        </p:spPr>
+        <p:style>
+          <a:lnRef idx="1">
+            <a:schemeClr val="accent4"/>
+          </a:lnRef>
+          <a:fillRef idx="2">
+            <a:schemeClr val="accent4"/>
+          </a:fillRef>
+          <a:effectRef idx="1">
+            <a:schemeClr val="accent4"/>
+          </a:effectRef>
+          <a:fontRef idx="minor">
+            <a:schemeClr val="dk1"/>
+          </a:fontRef>
+        </p:style>
+        <p:txBody>
+          <a:bodyPr rtlCol="0" anchor="ctr"/>
+          <a:lstStyle/>
+          <a:p>
+            <a:pPr algn="ctr"/>
+            <a:r>
+              <a:rPr lang="en-US" sz="1050" dirty="0">
+                <a:solidFill>
+                  <a:srgbClr val="7030A0"/>
+                </a:solidFill>
+              </a:rPr>
+              <a:t>DistributeUtil</a:t>
+            </a:r>
+            <a:endParaRPr lang="en-SG" sz="1050" dirty="0">
               <a:solidFill>
                 <a:srgbClr val="7030A0"/>
               </a:solidFill>

</xml_diff>